<commit_message>
ajout de la slide sur la livraison
</commit_message>
<xml_diff>
--- a/diapo_presentation_solution.pptx
+++ b/diapo_presentation_solution.pptx
@@ -4,16 +4,17 @@
   <p:sldMasterIdLst>
     <p:sldMasterId id="2147483648" r:id="rId2"/>
     <p:sldMasterId id="2147483661" r:id="rId3"/>
+    <p:sldMasterId id="2147483674" r:id="rId4"/>
   </p:sldMasterIdLst>
   <p:sldIdLst>
-    <p:sldId id="256" r:id="rId4"/>
-    <p:sldId id="257" r:id="rId5"/>
-    <p:sldId id="258" r:id="rId6"/>
-    <p:sldId id="259" r:id="rId7"/>
-    <p:sldId id="260" r:id="rId8"/>
-    <p:sldId id="261" r:id="rId9"/>
-    <p:sldId id="262" r:id="rId10"/>
-    <p:sldId id="263" r:id="rId11"/>
+    <p:sldId id="256" r:id="rId5"/>
+    <p:sldId id="257" r:id="rId6"/>
+    <p:sldId id="258" r:id="rId7"/>
+    <p:sldId id="259" r:id="rId8"/>
+    <p:sldId id="260" r:id="rId9"/>
+    <p:sldId id="261" r:id="rId10"/>
+    <p:sldId id="262" r:id="rId11"/>
+    <p:sldId id="263" r:id="rId12"/>
   </p:sldIdLst>
   <p:sldSz cx="10080625" cy="7559675"/>
   <p:notesSz cx="7772400" cy="10058400"/>
@@ -2001,6 +2002,361 @@
 </p:sldLayout>
 </file>
 
+<file path=ppt/slideLayouts/slideLayout25.xml><?xml version="1.0" encoding="utf-8"?>
+<p:sldLayout xmlns:a="http://schemas.openxmlformats.org/drawingml/2006/main" xmlns:p="http://schemas.openxmlformats.org/presentationml/2006/main" xmlns:r="http://schemas.openxmlformats.org/officeDocument/2006/relationships" xmlns:p14="http://schemas.microsoft.com/office/powerpoint/2010/main" xmlns:p15="http://schemas.microsoft.com/office/powerpoint/2012/main" xmlns:mc="http://schemas.openxmlformats.org/markup-compatibility/2006" type="blank" preserve="1">
+  <p:cSld name="Blank Slide">
+    <p:spTree>
+      <p:nvGrpSpPr>
+        <p:cNvPr id="1" name=""/>
+        <p:cNvGrpSpPr/>
+        <p:nvPr/>
+      </p:nvGrpSpPr>
+      <p:grpSpPr>
+        <a:xfrm>
+          <a:off x="0" y="0"/>
+          <a:ext cx="0" cy="0"/>
+          <a:chOff x="0" y="0"/>
+          <a:chExt cx="0" cy="0"/>
+        </a:xfrm>
+      </p:grpSpPr>
+    </p:spTree>
+  </p:cSld>
+</p:sldLayout>
+</file>
+
+<file path=ppt/slideLayouts/slideLayout26.xml><?xml version="1.0" encoding="utf-8"?>
+<p:sldLayout xmlns:a="http://schemas.openxmlformats.org/drawingml/2006/main" xmlns:p="http://schemas.openxmlformats.org/presentationml/2006/main" xmlns:r="http://schemas.openxmlformats.org/officeDocument/2006/relationships" xmlns:p14="http://schemas.microsoft.com/office/powerpoint/2010/main" xmlns:p15="http://schemas.microsoft.com/office/powerpoint/2012/main" xmlns:mc="http://schemas.openxmlformats.org/markup-compatibility/2006" type="tx" preserve="1">
+  <p:cSld name="Title Slide">
+    <p:spTree>
+      <p:nvGrpSpPr>
+        <p:cNvPr id="1" name=""/>
+        <p:cNvGrpSpPr/>
+        <p:nvPr/>
+      </p:nvGrpSpPr>
+      <p:grpSpPr>
+        <a:xfrm>
+          <a:off x="0" y="0"/>
+          <a:ext cx="0" cy="0"/>
+          <a:chOff x="0" y="0"/>
+          <a:chExt cx="0" cy="0"/>
+        </a:xfrm>
+      </p:grpSpPr>
+      <p:sp>
+        <p:nvSpPr>
+          <p:cNvPr id="87" name="PlaceHolder 1"/>
+          <p:cNvSpPr>
+            <a:spLocks noGrp="1"/>
+          </p:cNvSpPr>
+          <p:nvPr>
+            <p:ph type="title"/>
+          </p:nvPr>
+        </p:nvSpPr>
+        <p:spPr>
+          <a:xfrm>
+            <a:off x="504000" y="301320"/>
+            <a:ext cx="9072000" cy="1261800"/>
+          </a:xfrm>
+          <a:prstGeom prst="rect">
+            <a:avLst/>
+          </a:prstGeom>
+        </p:spPr>
+        <p:txBody>
+          <a:bodyPr lIns="0" rIns="0" tIns="0" bIns="0" anchor="ctr">
+            <a:spAutoFit/>
+          </a:bodyPr>
+          <a:p>
+            <a:pPr algn="ctr"/>
+            <a:endParaRPr b="0" lang="en-US" sz="4400" spc="-1" strike="noStrike">
+              <a:latin typeface="Arial"/>
+            </a:endParaRPr>
+          </a:p>
+        </p:txBody>
+      </p:sp>
+      <p:sp>
+        <p:nvSpPr>
+          <p:cNvPr id="88" name="PlaceHolder 2"/>
+          <p:cNvSpPr>
+            <a:spLocks noGrp="1"/>
+          </p:cNvSpPr>
+          <p:nvPr>
+            <p:ph type="subTitle"/>
+          </p:nvPr>
+        </p:nvSpPr>
+        <p:spPr>
+          <a:xfrm>
+            <a:off x="504000" y="1768680"/>
+            <a:ext cx="9072000" cy="4384080"/>
+          </a:xfrm>
+          <a:prstGeom prst="rect">
+            <a:avLst/>
+          </a:prstGeom>
+        </p:spPr>
+        <p:txBody>
+          <a:bodyPr lIns="0" rIns="0" tIns="0" bIns="0" anchor="ctr">
+            <a:spAutoFit/>
+          </a:bodyPr>
+          <a:p>
+            <a:pPr algn="ctr"/>
+            <a:endParaRPr b="0" lang="en-US" sz="3200" spc="-1" strike="noStrike">
+              <a:latin typeface="Arial"/>
+            </a:endParaRPr>
+          </a:p>
+        </p:txBody>
+      </p:sp>
+    </p:spTree>
+  </p:cSld>
+</p:sldLayout>
+</file>
+
+<file path=ppt/slideLayouts/slideLayout27.xml><?xml version="1.0" encoding="utf-8"?>
+<p:sldLayout xmlns:a="http://schemas.openxmlformats.org/drawingml/2006/main" xmlns:p="http://schemas.openxmlformats.org/presentationml/2006/main" xmlns:r="http://schemas.openxmlformats.org/officeDocument/2006/relationships" xmlns:p14="http://schemas.microsoft.com/office/powerpoint/2010/main" xmlns:p15="http://schemas.microsoft.com/office/powerpoint/2012/main" xmlns:mc="http://schemas.openxmlformats.org/markup-compatibility/2006" type="obj" preserve="1">
+  <p:cSld name="Title, Content">
+    <p:spTree>
+      <p:nvGrpSpPr>
+        <p:cNvPr id="1" name=""/>
+        <p:cNvGrpSpPr/>
+        <p:nvPr/>
+      </p:nvGrpSpPr>
+      <p:grpSpPr>
+        <a:xfrm>
+          <a:off x="0" y="0"/>
+          <a:ext cx="0" cy="0"/>
+          <a:chOff x="0" y="0"/>
+          <a:chExt cx="0" cy="0"/>
+        </a:xfrm>
+      </p:grpSpPr>
+      <p:sp>
+        <p:nvSpPr>
+          <p:cNvPr id="89" name="PlaceHolder 1"/>
+          <p:cNvSpPr>
+            <a:spLocks noGrp="1"/>
+          </p:cNvSpPr>
+          <p:nvPr>
+            <p:ph type="title"/>
+          </p:nvPr>
+        </p:nvSpPr>
+        <p:spPr>
+          <a:xfrm>
+            <a:off x="504000" y="301320"/>
+            <a:ext cx="9072000" cy="1261800"/>
+          </a:xfrm>
+          <a:prstGeom prst="rect">
+            <a:avLst/>
+          </a:prstGeom>
+        </p:spPr>
+        <p:txBody>
+          <a:bodyPr lIns="0" rIns="0" tIns="0" bIns="0" anchor="ctr">
+            <a:spAutoFit/>
+          </a:bodyPr>
+          <a:p>
+            <a:pPr algn="ctr"/>
+            <a:endParaRPr b="0" lang="en-US" sz="4400" spc="-1" strike="noStrike">
+              <a:latin typeface="Arial"/>
+            </a:endParaRPr>
+          </a:p>
+        </p:txBody>
+      </p:sp>
+      <p:sp>
+        <p:nvSpPr>
+          <p:cNvPr id="90" name="PlaceHolder 2"/>
+          <p:cNvSpPr>
+            <a:spLocks noGrp="1"/>
+          </p:cNvSpPr>
+          <p:nvPr>
+            <p:ph type="body"/>
+          </p:nvPr>
+        </p:nvSpPr>
+        <p:spPr>
+          <a:xfrm>
+            <a:off x="504000" y="1768680"/>
+            <a:ext cx="9072000" cy="4384080"/>
+          </a:xfrm>
+          <a:prstGeom prst="rect">
+            <a:avLst/>
+          </a:prstGeom>
+        </p:spPr>
+        <p:txBody>
+          <a:bodyPr lIns="0" rIns="0" tIns="0" bIns="0">
+            <a:normAutofit/>
+          </a:bodyPr>
+          <a:p>
+            <a:endParaRPr b="0" lang="en-US" sz="3200" spc="-1" strike="noStrike">
+              <a:latin typeface="Arial"/>
+            </a:endParaRPr>
+          </a:p>
+        </p:txBody>
+      </p:sp>
+    </p:spTree>
+  </p:cSld>
+</p:sldLayout>
+</file>
+
+<file path=ppt/slideLayouts/slideLayout28.xml><?xml version="1.0" encoding="utf-8"?>
+<p:sldLayout xmlns:a="http://schemas.openxmlformats.org/drawingml/2006/main" xmlns:p="http://schemas.openxmlformats.org/presentationml/2006/main" xmlns:r="http://schemas.openxmlformats.org/officeDocument/2006/relationships" xmlns:p14="http://schemas.microsoft.com/office/powerpoint/2010/main" xmlns:p15="http://schemas.microsoft.com/office/powerpoint/2012/main" xmlns:mc="http://schemas.openxmlformats.org/markup-compatibility/2006" type="twoObj" preserve="1">
+  <p:cSld name="Title, 2 Content">
+    <p:spTree>
+      <p:nvGrpSpPr>
+        <p:cNvPr id="1" name=""/>
+        <p:cNvGrpSpPr/>
+        <p:nvPr/>
+      </p:nvGrpSpPr>
+      <p:grpSpPr>
+        <a:xfrm>
+          <a:off x="0" y="0"/>
+          <a:ext cx="0" cy="0"/>
+          <a:chOff x="0" y="0"/>
+          <a:chExt cx="0" cy="0"/>
+        </a:xfrm>
+      </p:grpSpPr>
+      <p:sp>
+        <p:nvSpPr>
+          <p:cNvPr id="91" name="PlaceHolder 1"/>
+          <p:cNvSpPr>
+            <a:spLocks noGrp="1"/>
+          </p:cNvSpPr>
+          <p:nvPr>
+            <p:ph type="title"/>
+          </p:nvPr>
+        </p:nvSpPr>
+        <p:spPr>
+          <a:xfrm>
+            <a:off x="504000" y="301320"/>
+            <a:ext cx="9072000" cy="1261800"/>
+          </a:xfrm>
+          <a:prstGeom prst="rect">
+            <a:avLst/>
+          </a:prstGeom>
+        </p:spPr>
+        <p:txBody>
+          <a:bodyPr lIns="0" rIns="0" tIns="0" bIns="0" anchor="ctr">
+            <a:spAutoFit/>
+          </a:bodyPr>
+          <a:p>
+            <a:pPr algn="ctr"/>
+            <a:endParaRPr b="0" lang="en-US" sz="4400" spc="-1" strike="noStrike">
+              <a:latin typeface="Arial"/>
+            </a:endParaRPr>
+          </a:p>
+        </p:txBody>
+      </p:sp>
+      <p:sp>
+        <p:nvSpPr>
+          <p:cNvPr id="92" name="PlaceHolder 2"/>
+          <p:cNvSpPr>
+            <a:spLocks noGrp="1"/>
+          </p:cNvSpPr>
+          <p:nvPr>
+            <p:ph type="body"/>
+          </p:nvPr>
+        </p:nvSpPr>
+        <p:spPr>
+          <a:xfrm>
+            <a:off x="504000" y="1768680"/>
+            <a:ext cx="4426920" cy="4384080"/>
+          </a:xfrm>
+          <a:prstGeom prst="rect">
+            <a:avLst/>
+          </a:prstGeom>
+        </p:spPr>
+        <p:txBody>
+          <a:bodyPr lIns="0" rIns="0" tIns="0" bIns="0">
+            <a:normAutofit/>
+          </a:bodyPr>
+          <a:p>
+            <a:endParaRPr b="0" lang="en-US" sz="3200" spc="-1" strike="noStrike">
+              <a:latin typeface="Arial"/>
+            </a:endParaRPr>
+          </a:p>
+        </p:txBody>
+      </p:sp>
+      <p:sp>
+        <p:nvSpPr>
+          <p:cNvPr id="93" name="PlaceHolder 3"/>
+          <p:cNvSpPr>
+            <a:spLocks noGrp="1"/>
+          </p:cNvSpPr>
+          <p:nvPr>
+            <p:ph type="body"/>
+          </p:nvPr>
+        </p:nvSpPr>
+        <p:spPr>
+          <a:xfrm>
+            <a:off x="5152680" y="1768680"/>
+            <a:ext cx="4426920" cy="4384080"/>
+          </a:xfrm>
+          <a:prstGeom prst="rect">
+            <a:avLst/>
+          </a:prstGeom>
+        </p:spPr>
+        <p:txBody>
+          <a:bodyPr lIns="0" rIns="0" tIns="0" bIns="0">
+            <a:normAutofit/>
+          </a:bodyPr>
+          <a:p>
+            <a:endParaRPr b="0" lang="en-US" sz="3200" spc="-1" strike="noStrike">
+              <a:latin typeface="Arial"/>
+            </a:endParaRPr>
+          </a:p>
+        </p:txBody>
+      </p:sp>
+    </p:spTree>
+  </p:cSld>
+</p:sldLayout>
+</file>
+
+<file path=ppt/slideLayouts/slideLayout29.xml><?xml version="1.0" encoding="utf-8"?>
+<p:sldLayout xmlns:a="http://schemas.openxmlformats.org/drawingml/2006/main" xmlns:p="http://schemas.openxmlformats.org/presentationml/2006/main" xmlns:r="http://schemas.openxmlformats.org/officeDocument/2006/relationships" xmlns:p14="http://schemas.microsoft.com/office/powerpoint/2010/main" xmlns:p15="http://schemas.microsoft.com/office/powerpoint/2012/main" xmlns:mc="http://schemas.openxmlformats.org/markup-compatibility/2006" type="titleOnly" preserve="1">
+  <p:cSld name="Title Only">
+    <p:spTree>
+      <p:nvGrpSpPr>
+        <p:cNvPr id="1" name=""/>
+        <p:cNvGrpSpPr/>
+        <p:nvPr/>
+      </p:nvGrpSpPr>
+      <p:grpSpPr>
+        <a:xfrm>
+          <a:off x="0" y="0"/>
+          <a:ext cx="0" cy="0"/>
+          <a:chOff x="0" y="0"/>
+          <a:chExt cx="0" cy="0"/>
+        </a:xfrm>
+      </p:grpSpPr>
+      <p:sp>
+        <p:nvSpPr>
+          <p:cNvPr id="94" name="PlaceHolder 1"/>
+          <p:cNvSpPr>
+            <a:spLocks noGrp="1"/>
+          </p:cNvSpPr>
+          <p:nvPr>
+            <p:ph type="title"/>
+          </p:nvPr>
+        </p:nvSpPr>
+        <p:spPr>
+          <a:xfrm>
+            <a:off x="504000" y="301320"/>
+            <a:ext cx="9072000" cy="1261800"/>
+          </a:xfrm>
+          <a:prstGeom prst="rect">
+            <a:avLst/>
+          </a:prstGeom>
+        </p:spPr>
+        <p:txBody>
+          <a:bodyPr lIns="0" rIns="0" tIns="0" bIns="0" anchor="ctr">
+            <a:spAutoFit/>
+          </a:bodyPr>
+          <a:p>
+            <a:pPr algn="ctr"/>
+            <a:endParaRPr b="0" lang="en-US" sz="4400" spc="-1" strike="noStrike">
+              <a:latin typeface="Arial"/>
+            </a:endParaRPr>
+          </a:p>
+        </p:txBody>
+      </p:sp>
+    </p:spTree>
+  </p:cSld>
+</p:sldLayout>
+</file>
+
 <file path=ppt/slideLayouts/slideLayout3.xml><?xml version="1.0" encoding="utf-8"?>
 <p:sldLayout xmlns:a="http://schemas.openxmlformats.org/drawingml/2006/main" xmlns:p="http://schemas.openxmlformats.org/presentationml/2006/main" xmlns:r="http://schemas.openxmlformats.org/officeDocument/2006/relationships" xmlns:p14="http://schemas.microsoft.com/office/powerpoint/2010/main" xmlns:p15="http://schemas.microsoft.com/office/powerpoint/2012/main" xmlns:mc="http://schemas.openxmlformats.org/markup-compatibility/2006" type="obj" preserve="1">
   <p:cSld name="Title, Content">
@@ -2063,6 +2419,1007 @@
           <a:xfrm>
             <a:off x="504000" y="1768680"/>
             <a:ext cx="9072000" cy="4384080"/>
+          </a:xfrm>
+          <a:prstGeom prst="rect">
+            <a:avLst/>
+          </a:prstGeom>
+        </p:spPr>
+        <p:txBody>
+          <a:bodyPr lIns="0" rIns="0" tIns="0" bIns="0">
+            <a:normAutofit/>
+          </a:bodyPr>
+          <a:p>
+            <a:endParaRPr b="0" lang="en-US" sz="3200" spc="-1" strike="noStrike">
+              <a:latin typeface="Arial"/>
+            </a:endParaRPr>
+          </a:p>
+        </p:txBody>
+      </p:sp>
+    </p:spTree>
+  </p:cSld>
+</p:sldLayout>
+</file>
+
+<file path=ppt/slideLayouts/slideLayout30.xml><?xml version="1.0" encoding="utf-8"?>
+<p:sldLayout xmlns:a="http://schemas.openxmlformats.org/drawingml/2006/main" xmlns:p="http://schemas.openxmlformats.org/presentationml/2006/main" xmlns:r="http://schemas.openxmlformats.org/officeDocument/2006/relationships" xmlns:p14="http://schemas.microsoft.com/office/powerpoint/2010/main" xmlns:p15="http://schemas.microsoft.com/office/powerpoint/2012/main" xmlns:mc="http://schemas.openxmlformats.org/markup-compatibility/2006" type="objOnly" preserve="1">
+  <p:cSld name="Centered Text">
+    <p:spTree>
+      <p:nvGrpSpPr>
+        <p:cNvPr id="1" name=""/>
+        <p:cNvGrpSpPr/>
+        <p:nvPr/>
+      </p:nvGrpSpPr>
+      <p:grpSpPr>
+        <a:xfrm>
+          <a:off x="0" y="0"/>
+          <a:ext cx="0" cy="0"/>
+          <a:chOff x="0" y="0"/>
+          <a:chExt cx="0" cy="0"/>
+        </a:xfrm>
+      </p:grpSpPr>
+      <p:sp>
+        <p:nvSpPr>
+          <p:cNvPr id="95" name="PlaceHolder 1"/>
+          <p:cNvSpPr>
+            <a:spLocks noGrp="1"/>
+          </p:cNvSpPr>
+          <p:nvPr>
+            <p:ph type="subTitle"/>
+          </p:nvPr>
+        </p:nvSpPr>
+        <p:spPr>
+          <a:xfrm>
+            <a:off x="504000" y="301320"/>
+            <a:ext cx="9072000" cy="5850360"/>
+          </a:xfrm>
+          <a:prstGeom prst="rect">
+            <a:avLst/>
+          </a:prstGeom>
+        </p:spPr>
+        <p:txBody>
+          <a:bodyPr lIns="0" rIns="0" tIns="0" bIns="0" anchor="ctr">
+            <a:spAutoFit/>
+          </a:bodyPr>
+          <a:p>
+            <a:pPr algn="ctr"/>
+            <a:endParaRPr b="0" lang="en-US" sz="3200" spc="-1" strike="noStrike">
+              <a:latin typeface="Arial"/>
+            </a:endParaRPr>
+          </a:p>
+        </p:txBody>
+      </p:sp>
+    </p:spTree>
+  </p:cSld>
+</p:sldLayout>
+</file>
+
+<file path=ppt/slideLayouts/slideLayout31.xml><?xml version="1.0" encoding="utf-8"?>
+<p:sldLayout xmlns:a="http://schemas.openxmlformats.org/drawingml/2006/main" xmlns:p="http://schemas.openxmlformats.org/presentationml/2006/main" xmlns:r="http://schemas.openxmlformats.org/officeDocument/2006/relationships" xmlns:p14="http://schemas.microsoft.com/office/powerpoint/2010/main" xmlns:p15="http://schemas.microsoft.com/office/powerpoint/2012/main" xmlns:mc="http://schemas.openxmlformats.org/markup-compatibility/2006" type="twoObjAndObj" preserve="1">
+  <p:cSld name="Title, 2 Content and Content">
+    <p:spTree>
+      <p:nvGrpSpPr>
+        <p:cNvPr id="1" name=""/>
+        <p:cNvGrpSpPr/>
+        <p:nvPr/>
+      </p:nvGrpSpPr>
+      <p:grpSpPr>
+        <a:xfrm>
+          <a:off x="0" y="0"/>
+          <a:ext cx="0" cy="0"/>
+          <a:chOff x="0" y="0"/>
+          <a:chExt cx="0" cy="0"/>
+        </a:xfrm>
+      </p:grpSpPr>
+      <p:sp>
+        <p:nvSpPr>
+          <p:cNvPr id="96" name="PlaceHolder 1"/>
+          <p:cNvSpPr>
+            <a:spLocks noGrp="1"/>
+          </p:cNvSpPr>
+          <p:nvPr>
+            <p:ph type="title"/>
+          </p:nvPr>
+        </p:nvSpPr>
+        <p:spPr>
+          <a:xfrm>
+            <a:off x="504000" y="301320"/>
+            <a:ext cx="9072000" cy="1261800"/>
+          </a:xfrm>
+          <a:prstGeom prst="rect">
+            <a:avLst/>
+          </a:prstGeom>
+        </p:spPr>
+        <p:txBody>
+          <a:bodyPr lIns="0" rIns="0" tIns="0" bIns="0" anchor="ctr">
+            <a:spAutoFit/>
+          </a:bodyPr>
+          <a:p>
+            <a:pPr algn="ctr"/>
+            <a:endParaRPr b="0" lang="en-US" sz="4400" spc="-1" strike="noStrike">
+              <a:latin typeface="Arial"/>
+            </a:endParaRPr>
+          </a:p>
+        </p:txBody>
+      </p:sp>
+      <p:sp>
+        <p:nvSpPr>
+          <p:cNvPr id="97" name="PlaceHolder 2"/>
+          <p:cNvSpPr>
+            <a:spLocks noGrp="1"/>
+          </p:cNvSpPr>
+          <p:nvPr>
+            <p:ph type="body"/>
+          </p:nvPr>
+        </p:nvSpPr>
+        <p:spPr>
+          <a:xfrm>
+            <a:off x="504000" y="1768680"/>
+            <a:ext cx="4426920" cy="2090880"/>
+          </a:xfrm>
+          <a:prstGeom prst="rect">
+            <a:avLst/>
+          </a:prstGeom>
+        </p:spPr>
+        <p:txBody>
+          <a:bodyPr lIns="0" rIns="0" tIns="0" bIns="0">
+            <a:normAutofit/>
+          </a:bodyPr>
+          <a:p>
+            <a:endParaRPr b="0" lang="en-US" sz="3200" spc="-1" strike="noStrike">
+              <a:latin typeface="Arial"/>
+            </a:endParaRPr>
+          </a:p>
+        </p:txBody>
+      </p:sp>
+      <p:sp>
+        <p:nvSpPr>
+          <p:cNvPr id="98" name="PlaceHolder 3"/>
+          <p:cNvSpPr>
+            <a:spLocks noGrp="1"/>
+          </p:cNvSpPr>
+          <p:nvPr>
+            <p:ph type="body"/>
+          </p:nvPr>
+        </p:nvSpPr>
+        <p:spPr>
+          <a:xfrm>
+            <a:off x="5152680" y="1768680"/>
+            <a:ext cx="4426920" cy="4384080"/>
+          </a:xfrm>
+          <a:prstGeom prst="rect">
+            <a:avLst/>
+          </a:prstGeom>
+        </p:spPr>
+        <p:txBody>
+          <a:bodyPr lIns="0" rIns="0" tIns="0" bIns="0">
+            <a:normAutofit/>
+          </a:bodyPr>
+          <a:p>
+            <a:endParaRPr b="0" lang="en-US" sz="3200" spc="-1" strike="noStrike">
+              <a:latin typeface="Arial"/>
+            </a:endParaRPr>
+          </a:p>
+        </p:txBody>
+      </p:sp>
+      <p:sp>
+        <p:nvSpPr>
+          <p:cNvPr id="99" name="PlaceHolder 4"/>
+          <p:cNvSpPr>
+            <a:spLocks noGrp="1"/>
+          </p:cNvSpPr>
+          <p:nvPr>
+            <p:ph type="body"/>
+          </p:nvPr>
+        </p:nvSpPr>
+        <p:spPr>
+          <a:xfrm>
+            <a:off x="504000" y="4058640"/>
+            <a:ext cx="4426920" cy="2090880"/>
+          </a:xfrm>
+          <a:prstGeom prst="rect">
+            <a:avLst/>
+          </a:prstGeom>
+        </p:spPr>
+        <p:txBody>
+          <a:bodyPr lIns="0" rIns="0" tIns="0" bIns="0">
+            <a:normAutofit/>
+          </a:bodyPr>
+          <a:p>
+            <a:endParaRPr b="0" lang="en-US" sz="3200" spc="-1" strike="noStrike">
+              <a:latin typeface="Arial"/>
+            </a:endParaRPr>
+          </a:p>
+        </p:txBody>
+      </p:sp>
+    </p:spTree>
+  </p:cSld>
+</p:sldLayout>
+</file>
+
+<file path=ppt/slideLayouts/slideLayout32.xml><?xml version="1.0" encoding="utf-8"?>
+<p:sldLayout xmlns:a="http://schemas.openxmlformats.org/drawingml/2006/main" xmlns:p="http://schemas.openxmlformats.org/presentationml/2006/main" xmlns:r="http://schemas.openxmlformats.org/officeDocument/2006/relationships" xmlns:p14="http://schemas.microsoft.com/office/powerpoint/2010/main" xmlns:p15="http://schemas.microsoft.com/office/powerpoint/2012/main" xmlns:mc="http://schemas.openxmlformats.org/markup-compatibility/2006" type="objAndTwoObj" preserve="1">
+  <p:cSld name="Title Content and 2 Content">
+    <p:spTree>
+      <p:nvGrpSpPr>
+        <p:cNvPr id="1" name=""/>
+        <p:cNvGrpSpPr/>
+        <p:nvPr/>
+      </p:nvGrpSpPr>
+      <p:grpSpPr>
+        <a:xfrm>
+          <a:off x="0" y="0"/>
+          <a:ext cx="0" cy="0"/>
+          <a:chOff x="0" y="0"/>
+          <a:chExt cx="0" cy="0"/>
+        </a:xfrm>
+      </p:grpSpPr>
+      <p:sp>
+        <p:nvSpPr>
+          <p:cNvPr id="100" name="PlaceHolder 1"/>
+          <p:cNvSpPr>
+            <a:spLocks noGrp="1"/>
+          </p:cNvSpPr>
+          <p:nvPr>
+            <p:ph type="title"/>
+          </p:nvPr>
+        </p:nvSpPr>
+        <p:spPr>
+          <a:xfrm>
+            <a:off x="504000" y="301320"/>
+            <a:ext cx="9072000" cy="1261800"/>
+          </a:xfrm>
+          <a:prstGeom prst="rect">
+            <a:avLst/>
+          </a:prstGeom>
+        </p:spPr>
+        <p:txBody>
+          <a:bodyPr lIns="0" rIns="0" tIns="0" bIns="0" anchor="ctr">
+            <a:spAutoFit/>
+          </a:bodyPr>
+          <a:p>
+            <a:pPr algn="ctr"/>
+            <a:endParaRPr b="0" lang="en-US" sz="4400" spc="-1" strike="noStrike">
+              <a:latin typeface="Arial"/>
+            </a:endParaRPr>
+          </a:p>
+        </p:txBody>
+      </p:sp>
+      <p:sp>
+        <p:nvSpPr>
+          <p:cNvPr id="101" name="PlaceHolder 2"/>
+          <p:cNvSpPr>
+            <a:spLocks noGrp="1"/>
+          </p:cNvSpPr>
+          <p:nvPr>
+            <p:ph type="body"/>
+          </p:nvPr>
+        </p:nvSpPr>
+        <p:spPr>
+          <a:xfrm>
+            <a:off x="504000" y="1768680"/>
+            <a:ext cx="4426920" cy="4384080"/>
+          </a:xfrm>
+          <a:prstGeom prst="rect">
+            <a:avLst/>
+          </a:prstGeom>
+        </p:spPr>
+        <p:txBody>
+          <a:bodyPr lIns="0" rIns="0" tIns="0" bIns="0">
+            <a:normAutofit/>
+          </a:bodyPr>
+          <a:p>
+            <a:endParaRPr b="0" lang="en-US" sz="3200" spc="-1" strike="noStrike">
+              <a:latin typeface="Arial"/>
+            </a:endParaRPr>
+          </a:p>
+        </p:txBody>
+      </p:sp>
+      <p:sp>
+        <p:nvSpPr>
+          <p:cNvPr id="102" name="PlaceHolder 3"/>
+          <p:cNvSpPr>
+            <a:spLocks noGrp="1"/>
+          </p:cNvSpPr>
+          <p:nvPr>
+            <p:ph type="body"/>
+          </p:nvPr>
+        </p:nvSpPr>
+        <p:spPr>
+          <a:xfrm>
+            <a:off x="5152680" y="1768680"/>
+            <a:ext cx="4426920" cy="2090880"/>
+          </a:xfrm>
+          <a:prstGeom prst="rect">
+            <a:avLst/>
+          </a:prstGeom>
+        </p:spPr>
+        <p:txBody>
+          <a:bodyPr lIns="0" rIns="0" tIns="0" bIns="0">
+            <a:normAutofit/>
+          </a:bodyPr>
+          <a:p>
+            <a:endParaRPr b="0" lang="en-US" sz="3200" spc="-1" strike="noStrike">
+              <a:latin typeface="Arial"/>
+            </a:endParaRPr>
+          </a:p>
+        </p:txBody>
+      </p:sp>
+      <p:sp>
+        <p:nvSpPr>
+          <p:cNvPr id="103" name="PlaceHolder 4"/>
+          <p:cNvSpPr>
+            <a:spLocks noGrp="1"/>
+          </p:cNvSpPr>
+          <p:nvPr>
+            <p:ph type="body"/>
+          </p:nvPr>
+        </p:nvSpPr>
+        <p:spPr>
+          <a:xfrm>
+            <a:off x="5152680" y="4058640"/>
+            <a:ext cx="4426920" cy="2090880"/>
+          </a:xfrm>
+          <a:prstGeom prst="rect">
+            <a:avLst/>
+          </a:prstGeom>
+        </p:spPr>
+        <p:txBody>
+          <a:bodyPr lIns="0" rIns="0" tIns="0" bIns="0">
+            <a:normAutofit/>
+          </a:bodyPr>
+          <a:p>
+            <a:endParaRPr b="0" lang="en-US" sz="3200" spc="-1" strike="noStrike">
+              <a:latin typeface="Arial"/>
+            </a:endParaRPr>
+          </a:p>
+        </p:txBody>
+      </p:sp>
+    </p:spTree>
+  </p:cSld>
+</p:sldLayout>
+</file>
+
+<file path=ppt/slideLayouts/slideLayout33.xml><?xml version="1.0" encoding="utf-8"?>
+<p:sldLayout xmlns:a="http://schemas.openxmlformats.org/drawingml/2006/main" xmlns:p="http://schemas.openxmlformats.org/presentationml/2006/main" xmlns:r="http://schemas.openxmlformats.org/officeDocument/2006/relationships" xmlns:p14="http://schemas.microsoft.com/office/powerpoint/2010/main" xmlns:p15="http://schemas.microsoft.com/office/powerpoint/2012/main" xmlns:mc="http://schemas.openxmlformats.org/markup-compatibility/2006" type="twoObjOverTx" preserve="1">
+  <p:cSld name="Title, 2 Content over Content">
+    <p:spTree>
+      <p:nvGrpSpPr>
+        <p:cNvPr id="1" name=""/>
+        <p:cNvGrpSpPr/>
+        <p:nvPr/>
+      </p:nvGrpSpPr>
+      <p:grpSpPr>
+        <a:xfrm>
+          <a:off x="0" y="0"/>
+          <a:ext cx="0" cy="0"/>
+          <a:chOff x="0" y="0"/>
+          <a:chExt cx="0" cy="0"/>
+        </a:xfrm>
+      </p:grpSpPr>
+      <p:sp>
+        <p:nvSpPr>
+          <p:cNvPr id="104" name="PlaceHolder 1"/>
+          <p:cNvSpPr>
+            <a:spLocks noGrp="1"/>
+          </p:cNvSpPr>
+          <p:nvPr>
+            <p:ph type="title"/>
+          </p:nvPr>
+        </p:nvSpPr>
+        <p:spPr>
+          <a:xfrm>
+            <a:off x="504000" y="301320"/>
+            <a:ext cx="9072000" cy="1261800"/>
+          </a:xfrm>
+          <a:prstGeom prst="rect">
+            <a:avLst/>
+          </a:prstGeom>
+        </p:spPr>
+        <p:txBody>
+          <a:bodyPr lIns="0" rIns="0" tIns="0" bIns="0" anchor="ctr">
+            <a:spAutoFit/>
+          </a:bodyPr>
+          <a:p>
+            <a:pPr algn="ctr"/>
+            <a:endParaRPr b="0" lang="en-US" sz="4400" spc="-1" strike="noStrike">
+              <a:latin typeface="Arial"/>
+            </a:endParaRPr>
+          </a:p>
+        </p:txBody>
+      </p:sp>
+      <p:sp>
+        <p:nvSpPr>
+          <p:cNvPr id="105" name="PlaceHolder 2"/>
+          <p:cNvSpPr>
+            <a:spLocks noGrp="1"/>
+          </p:cNvSpPr>
+          <p:nvPr>
+            <p:ph type="body"/>
+          </p:nvPr>
+        </p:nvSpPr>
+        <p:spPr>
+          <a:xfrm>
+            <a:off x="504000" y="1768680"/>
+            <a:ext cx="4426920" cy="2090880"/>
+          </a:xfrm>
+          <a:prstGeom prst="rect">
+            <a:avLst/>
+          </a:prstGeom>
+        </p:spPr>
+        <p:txBody>
+          <a:bodyPr lIns="0" rIns="0" tIns="0" bIns="0">
+            <a:normAutofit/>
+          </a:bodyPr>
+          <a:p>
+            <a:endParaRPr b="0" lang="en-US" sz="3200" spc="-1" strike="noStrike">
+              <a:latin typeface="Arial"/>
+            </a:endParaRPr>
+          </a:p>
+        </p:txBody>
+      </p:sp>
+      <p:sp>
+        <p:nvSpPr>
+          <p:cNvPr id="106" name="PlaceHolder 3"/>
+          <p:cNvSpPr>
+            <a:spLocks noGrp="1"/>
+          </p:cNvSpPr>
+          <p:nvPr>
+            <p:ph type="body"/>
+          </p:nvPr>
+        </p:nvSpPr>
+        <p:spPr>
+          <a:xfrm>
+            <a:off x="5152680" y="1768680"/>
+            <a:ext cx="4426920" cy="2090880"/>
+          </a:xfrm>
+          <a:prstGeom prst="rect">
+            <a:avLst/>
+          </a:prstGeom>
+        </p:spPr>
+        <p:txBody>
+          <a:bodyPr lIns="0" rIns="0" tIns="0" bIns="0">
+            <a:normAutofit/>
+          </a:bodyPr>
+          <a:p>
+            <a:endParaRPr b="0" lang="en-US" sz="3200" spc="-1" strike="noStrike">
+              <a:latin typeface="Arial"/>
+            </a:endParaRPr>
+          </a:p>
+        </p:txBody>
+      </p:sp>
+      <p:sp>
+        <p:nvSpPr>
+          <p:cNvPr id="107" name="PlaceHolder 4"/>
+          <p:cNvSpPr>
+            <a:spLocks noGrp="1"/>
+          </p:cNvSpPr>
+          <p:nvPr>
+            <p:ph type="body"/>
+          </p:nvPr>
+        </p:nvSpPr>
+        <p:spPr>
+          <a:xfrm>
+            <a:off x="504000" y="4058640"/>
+            <a:ext cx="9072000" cy="2090880"/>
+          </a:xfrm>
+          <a:prstGeom prst="rect">
+            <a:avLst/>
+          </a:prstGeom>
+        </p:spPr>
+        <p:txBody>
+          <a:bodyPr lIns="0" rIns="0" tIns="0" bIns="0">
+            <a:normAutofit/>
+          </a:bodyPr>
+          <a:p>
+            <a:endParaRPr b="0" lang="en-US" sz="3200" spc="-1" strike="noStrike">
+              <a:latin typeface="Arial"/>
+            </a:endParaRPr>
+          </a:p>
+        </p:txBody>
+      </p:sp>
+    </p:spTree>
+  </p:cSld>
+</p:sldLayout>
+</file>
+
+<file path=ppt/slideLayouts/slideLayout34.xml><?xml version="1.0" encoding="utf-8"?>
+<p:sldLayout xmlns:a="http://schemas.openxmlformats.org/drawingml/2006/main" xmlns:p="http://schemas.openxmlformats.org/presentationml/2006/main" xmlns:r="http://schemas.openxmlformats.org/officeDocument/2006/relationships" xmlns:p14="http://schemas.microsoft.com/office/powerpoint/2010/main" xmlns:p15="http://schemas.microsoft.com/office/powerpoint/2012/main" xmlns:mc="http://schemas.openxmlformats.org/markup-compatibility/2006" type="objOverTx" preserve="1">
+  <p:cSld name="Title, Content over Content">
+    <p:spTree>
+      <p:nvGrpSpPr>
+        <p:cNvPr id="1" name=""/>
+        <p:cNvGrpSpPr/>
+        <p:nvPr/>
+      </p:nvGrpSpPr>
+      <p:grpSpPr>
+        <a:xfrm>
+          <a:off x="0" y="0"/>
+          <a:ext cx="0" cy="0"/>
+          <a:chOff x="0" y="0"/>
+          <a:chExt cx="0" cy="0"/>
+        </a:xfrm>
+      </p:grpSpPr>
+      <p:sp>
+        <p:nvSpPr>
+          <p:cNvPr id="108" name="PlaceHolder 1"/>
+          <p:cNvSpPr>
+            <a:spLocks noGrp="1"/>
+          </p:cNvSpPr>
+          <p:nvPr>
+            <p:ph type="title"/>
+          </p:nvPr>
+        </p:nvSpPr>
+        <p:spPr>
+          <a:xfrm>
+            <a:off x="504000" y="301320"/>
+            <a:ext cx="9072000" cy="1261800"/>
+          </a:xfrm>
+          <a:prstGeom prst="rect">
+            <a:avLst/>
+          </a:prstGeom>
+        </p:spPr>
+        <p:txBody>
+          <a:bodyPr lIns="0" rIns="0" tIns="0" bIns="0" anchor="ctr">
+            <a:spAutoFit/>
+          </a:bodyPr>
+          <a:p>
+            <a:pPr algn="ctr"/>
+            <a:endParaRPr b="0" lang="en-US" sz="4400" spc="-1" strike="noStrike">
+              <a:latin typeface="Arial"/>
+            </a:endParaRPr>
+          </a:p>
+        </p:txBody>
+      </p:sp>
+      <p:sp>
+        <p:nvSpPr>
+          <p:cNvPr id="109" name="PlaceHolder 2"/>
+          <p:cNvSpPr>
+            <a:spLocks noGrp="1"/>
+          </p:cNvSpPr>
+          <p:nvPr>
+            <p:ph type="body"/>
+          </p:nvPr>
+        </p:nvSpPr>
+        <p:spPr>
+          <a:xfrm>
+            <a:off x="504000" y="1768680"/>
+            <a:ext cx="9072000" cy="2090880"/>
+          </a:xfrm>
+          <a:prstGeom prst="rect">
+            <a:avLst/>
+          </a:prstGeom>
+        </p:spPr>
+        <p:txBody>
+          <a:bodyPr lIns="0" rIns="0" tIns="0" bIns="0">
+            <a:normAutofit/>
+          </a:bodyPr>
+          <a:p>
+            <a:endParaRPr b="0" lang="en-US" sz="3200" spc="-1" strike="noStrike">
+              <a:latin typeface="Arial"/>
+            </a:endParaRPr>
+          </a:p>
+        </p:txBody>
+      </p:sp>
+      <p:sp>
+        <p:nvSpPr>
+          <p:cNvPr id="110" name="PlaceHolder 3"/>
+          <p:cNvSpPr>
+            <a:spLocks noGrp="1"/>
+          </p:cNvSpPr>
+          <p:nvPr>
+            <p:ph type="body"/>
+          </p:nvPr>
+        </p:nvSpPr>
+        <p:spPr>
+          <a:xfrm>
+            <a:off x="504000" y="4058640"/>
+            <a:ext cx="9072000" cy="2090880"/>
+          </a:xfrm>
+          <a:prstGeom prst="rect">
+            <a:avLst/>
+          </a:prstGeom>
+        </p:spPr>
+        <p:txBody>
+          <a:bodyPr lIns="0" rIns="0" tIns="0" bIns="0">
+            <a:normAutofit/>
+          </a:bodyPr>
+          <a:p>
+            <a:endParaRPr b="0" lang="en-US" sz="3200" spc="-1" strike="noStrike">
+              <a:latin typeface="Arial"/>
+            </a:endParaRPr>
+          </a:p>
+        </p:txBody>
+      </p:sp>
+    </p:spTree>
+  </p:cSld>
+</p:sldLayout>
+</file>
+
+<file path=ppt/slideLayouts/slideLayout35.xml><?xml version="1.0" encoding="utf-8"?>
+<p:sldLayout xmlns:a="http://schemas.openxmlformats.org/drawingml/2006/main" xmlns:p="http://schemas.openxmlformats.org/presentationml/2006/main" xmlns:r="http://schemas.openxmlformats.org/officeDocument/2006/relationships" xmlns:p14="http://schemas.microsoft.com/office/powerpoint/2010/main" xmlns:p15="http://schemas.microsoft.com/office/powerpoint/2012/main" xmlns:mc="http://schemas.openxmlformats.org/markup-compatibility/2006" type="fourObj" preserve="1">
+  <p:cSld name="Title, 4 Content">
+    <p:spTree>
+      <p:nvGrpSpPr>
+        <p:cNvPr id="1" name=""/>
+        <p:cNvGrpSpPr/>
+        <p:nvPr/>
+      </p:nvGrpSpPr>
+      <p:grpSpPr>
+        <a:xfrm>
+          <a:off x="0" y="0"/>
+          <a:ext cx="0" cy="0"/>
+          <a:chOff x="0" y="0"/>
+          <a:chExt cx="0" cy="0"/>
+        </a:xfrm>
+      </p:grpSpPr>
+      <p:sp>
+        <p:nvSpPr>
+          <p:cNvPr id="111" name="PlaceHolder 1"/>
+          <p:cNvSpPr>
+            <a:spLocks noGrp="1"/>
+          </p:cNvSpPr>
+          <p:nvPr>
+            <p:ph type="title"/>
+          </p:nvPr>
+        </p:nvSpPr>
+        <p:spPr>
+          <a:xfrm>
+            <a:off x="504000" y="301320"/>
+            <a:ext cx="9072000" cy="1261800"/>
+          </a:xfrm>
+          <a:prstGeom prst="rect">
+            <a:avLst/>
+          </a:prstGeom>
+        </p:spPr>
+        <p:txBody>
+          <a:bodyPr lIns="0" rIns="0" tIns="0" bIns="0" anchor="ctr">
+            <a:spAutoFit/>
+          </a:bodyPr>
+          <a:p>
+            <a:pPr algn="ctr"/>
+            <a:endParaRPr b="0" lang="en-US" sz="4400" spc="-1" strike="noStrike">
+              <a:latin typeface="Arial"/>
+            </a:endParaRPr>
+          </a:p>
+        </p:txBody>
+      </p:sp>
+      <p:sp>
+        <p:nvSpPr>
+          <p:cNvPr id="112" name="PlaceHolder 2"/>
+          <p:cNvSpPr>
+            <a:spLocks noGrp="1"/>
+          </p:cNvSpPr>
+          <p:nvPr>
+            <p:ph type="body"/>
+          </p:nvPr>
+        </p:nvSpPr>
+        <p:spPr>
+          <a:xfrm>
+            <a:off x="504000" y="1768680"/>
+            <a:ext cx="4426920" cy="2090880"/>
+          </a:xfrm>
+          <a:prstGeom prst="rect">
+            <a:avLst/>
+          </a:prstGeom>
+        </p:spPr>
+        <p:txBody>
+          <a:bodyPr lIns="0" rIns="0" tIns="0" bIns="0">
+            <a:normAutofit/>
+          </a:bodyPr>
+          <a:p>
+            <a:endParaRPr b="0" lang="en-US" sz="3200" spc="-1" strike="noStrike">
+              <a:latin typeface="Arial"/>
+            </a:endParaRPr>
+          </a:p>
+        </p:txBody>
+      </p:sp>
+      <p:sp>
+        <p:nvSpPr>
+          <p:cNvPr id="113" name="PlaceHolder 3"/>
+          <p:cNvSpPr>
+            <a:spLocks noGrp="1"/>
+          </p:cNvSpPr>
+          <p:nvPr>
+            <p:ph type="body"/>
+          </p:nvPr>
+        </p:nvSpPr>
+        <p:spPr>
+          <a:xfrm>
+            <a:off x="5152680" y="1768680"/>
+            <a:ext cx="4426920" cy="2090880"/>
+          </a:xfrm>
+          <a:prstGeom prst="rect">
+            <a:avLst/>
+          </a:prstGeom>
+        </p:spPr>
+        <p:txBody>
+          <a:bodyPr lIns="0" rIns="0" tIns="0" bIns="0">
+            <a:normAutofit/>
+          </a:bodyPr>
+          <a:p>
+            <a:endParaRPr b="0" lang="en-US" sz="3200" spc="-1" strike="noStrike">
+              <a:latin typeface="Arial"/>
+            </a:endParaRPr>
+          </a:p>
+        </p:txBody>
+      </p:sp>
+      <p:sp>
+        <p:nvSpPr>
+          <p:cNvPr id="114" name="PlaceHolder 4"/>
+          <p:cNvSpPr>
+            <a:spLocks noGrp="1"/>
+          </p:cNvSpPr>
+          <p:nvPr>
+            <p:ph type="body"/>
+          </p:nvPr>
+        </p:nvSpPr>
+        <p:spPr>
+          <a:xfrm>
+            <a:off x="504000" y="4058640"/>
+            <a:ext cx="4426920" cy="2090880"/>
+          </a:xfrm>
+          <a:prstGeom prst="rect">
+            <a:avLst/>
+          </a:prstGeom>
+        </p:spPr>
+        <p:txBody>
+          <a:bodyPr lIns="0" rIns="0" tIns="0" bIns="0">
+            <a:normAutofit/>
+          </a:bodyPr>
+          <a:p>
+            <a:endParaRPr b="0" lang="en-US" sz="3200" spc="-1" strike="noStrike">
+              <a:latin typeface="Arial"/>
+            </a:endParaRPr>
+          </a:p>
+        </p:txBody>
+      </p:sp>
+      <p:sp>
+        <p:nvSpPr>
+          <p:cNvPr id="115" name="PlaceHolder 5"/>
+          <p:cNvSpPr>
+            <a:spLocks noGrp="1"/>
+          </p:cNvSpPr>
+          <p:nvPr>
+            <p:ph type="body"/>
+          </p:nvPr>
+        </p:nvSpPr>
+        <p:spPr>
+          <a:xfrm>
+            <a:off x="5152680" y="4058640"/>
+            <a:ext cx="4426920" cy="2090880"/>
+          </a:xfrm>
+          <a:prstGeom prst="rect">
+            <a:avLst/>
+          </a:prstGeom>
+        </p:spPr>
+        <p:txBody>
+          <a:bodyPr lIns="0" rIns="0" tIns="0" bIns="0">
+            <a:normAutofit/>
+          </a:bodyPr>
+          <a:p>
+            <a:endParaRPr b="0" lang="en-US" sz="3200" spc="-1" strike="noStrike">
+              <a:latin typeface="Arial"/>
+            </a:endParaRPr>
+          </a:p>
+        </p:txBody>
+      </p:sp>
+    </p:spTree>
+  </p:cSld>
+</p:sldLayout>
+</file>
+
+<file path=ppt/slideLayouts/slideLayout36.xml><?xml version="1.0" encoding="utf-8"?>
+<p:sldLayout xmlns:a="http://schemas.openxmlformats.org/drawingml/2006/main" xmlns:p="http://schemas.openxmlformats.org/presentationml/2006/main" xmlns:r="http://schemas.openxmlformats.org/officeDocument/2006/relationships" xmlns:p14="http://schemas.microsoft.com/office/powerpoint/2010/main" xmlns:p15="http://schemas.microsoft.com/office/powerpoint/2012/main" xmlns:mc="http://schemas.openxmlformats.org/markup-compatibility/2006" type="blank" preserve="1">
+  <p:cSld name="Title, 6 Content">
+    <p:spTree>
+      <p:nvGrpSpPr>
+        <p:cNvPr id="1" name=""/>
+        <p:cNvGrpSpPr/>
+        <p:nvPr/>
+      </p:nvGrpSpPr>
+      <p:grpSpPr>
+        <a:xfrm>
+          <a:off x="0" y="0"/>
+          <a:ext cx="0" cy="0"/>
+          <a:chOff x="0" y="0"/>
+          <a:chExt cx="0" cy="0"/>
+        </a:xfrm>
+      </p:grpSpPr>
+      <p:sp>
+        <p:nvSpPr>
+          <p:cNvPr id="116" name="PlaceHolder 1"/>
+          <p:cNvSpPr>
+            <a:spLocks noGrp="1"/>
+          </p:cNvSpPr>
+          <p:nvPr>
+            <p:ph type="title"/>
+          </p:nvPr>
+        </p:nvSpPr>
+        <p:spPr>
+          <a:xfrm>
+            <a:off x="504000" y="301320"/>
+            <a:ext cx="9072000" cy="1261800"/>
+          </a:xfrm>
+          <a:prstGeom prst="rect">
+            <a:avLst/>
+          </a:prstGeom>
+        </p:spPr>
+        <p:txBody>
+          <a:bodyPr lIns="0" rIns="0" tIns="0" bIns="0" anchor="ctr">
+            <a:spAutoFit/>
+          </a:bodyPr>
+          <a:p>
+            <a:pPr algn="ctr"/>
+            <a:endParaRPr b="0" lang="en-US" sz="4400" spc="-1" strike="noStrike">
+              <a:latin typeface="Arial"/>
+            </a:endParaRPr>
+          </a:p>
+        </p:txBody>
+      </p:sp>
+      <p:sp>
+        <p:nvSpPr>
+          <p:cNvPr id="117" name="PlaceHolder 2"/>
+          <p:cNvSpPr>
+            <a:spLocks noGrp="1"/>
+          </p:cNvSpPr>
+          <p:nvPr>
+            <p:ph type="body"/>
+          </p:nvPr>
+        </p:nvSpPr>
+        <p:spPr>
+          <a:xfrm>
+            <a:off x="504000" y="1768680"/>
+            <a:ext cx="2921040" cy="2090880"/>
+          </a:xfrm>
+          <a:prstGeom prst="rect">
+            <a:avLst/>
+          </a:prstGeom>
+        </p:spPr>
+        <p:txBody>
+          <a:bodyPr lIns="0" rIns="0" tIns="0" bIns="0">
+            <a:normAutofit/>
+          </a:bodyPr>
+          <a:p>
+            <a:endParaRPr b="0" lang="en-US" sz="3200" spc="-1" strike="noStrike">
+              <a:latin typeface="Arial"/>
+            </a:endParaRPr>
+          </a:p>
+        </p:txBody>
+      </p:sp>
+      <p:sp>
+        <p:nvSpPr>
+          <p:cNvPr id="118" name="PlaceHolder 3"/>
+          <p:cNvSpPr>
+            <a:spLocks noGrp="1"/>
+          </p:cNvSpPr>
+          <p:nvPr>
+            <p:ph type="body"/>
+          </p:nvPr>
+        </p:nvSpPr>
+        <p:spPr>
+          <a:xfrm>
+            <a:off x="3571560" y="1768680"/>
+            <a:ext cx="2921040" cy="2090880"/>
+          </a:xfrm>
+          <a:prstGeom prst="rect">
+            <a:avLst/>
+          </a:prstGeom>
+        </p:spPr>
+        <p:txBody>
+          <a:bodyPr lIns="0" rIns="0" tIns="0" bIns="0">
+            <a:normAutofit/>
+          </a:bodyPr>
+          <a:p>
+            <a:endParaRPr b="0" lang="en-US" sz="3200" spc="-1" strike="noStrike">
+              <a:latin typeface="Arial"/>
+            </a:endParaRPr>
+          </a:p>
+        </p:txBody>
+      </p:sp>
+      <p:sp>
+        <p:nvSpPr>
+          <p:cNvPr id="119" name="PlaceHolder 4"/>
+          <p:cNvSpPr>
+            <a:spLocks noGrp="1"/>
+          </p:cNvSpPr>
+          <p:nvPr>
+            <p:ph type="body"/>
+          </p:nvPr>
+        </p:nvSpPr>
+        <p:spPr>
+          <a:xfrm>
+            <a:off x="6639120" y="1768680"/>
+            <a:ext cx="2921040" cy="2090880"/>
+          </a:xfrm>
+          <a:prstGeom prst="rect">
+            <a:avLst/>
+          </a:prstGeom>
+        </p:spPr>
+        <p:txBody>
+          <a:bodyPr lIns="0" rIns="0" tIns="0" bIns="0">
+            <a:normAutofit/>
+          </a:bodyPr>
+          <a:p>
+            <a:endParaRPr b="0" lang="en-US" sz="3200" spc="-1" strike="noStrike">
+              <a:latin typeface="Arial"/>
+            </a:endParaRPr>
+          </a:p>
+        </p:txBody>
+      </p:sp>
+      <p:sp>
+        <p:nvSpPr>
+          <p:cNvPr id="120" name="PlaceHolder 5"/>
+          <p:cNvSpPr>
+            <a:spLocks noGrp="1"/>
+          </p:cNvSpPr>
+          <p:nvPr>
+            <p:ph type="body"/>
+          </p:nvPr>
+        </p:nvSpPr>
+        <p:spPr>
+          <a:xfrm>
+            <a:off x="504000" y="4058640"/>
+            <a:ext cx="2921040" cy="2090880"/>
+          </a:xfrm>
+          <a:prstGeom prst="rect">
+            <a:avLst/>
+          </a:prstGeom>
+        </p:spPr>
+        <p:txBody>
+          <a:bodyPr lIns="0" rIns="0" tIns="0" bIns="0">
+            <a:normAutofit/>
+          </a:bodyPr>
+          <a:p>
+            <a:endParaRPr b="0" lang="en-US" sz="3200" spc="-1" strike="noStrike">
+              <a:latin typeface="Arial"/>
+            </a:endParaRPr>
+          </a:p>
+        </p:txBody>
+      </p:sp>
+      <p:sp>
+        <p:nvSpPr>
+          <p:cNvPr id="121" name="PlaceHolder 6"/>
+          <p:cNvSpPr>
+            <a:spLocks noGrp="1"/>
+          </p:cNvSpPr>
+          <p:nvPr>
+            <p:ph type="body"/>
+          </p:nvPr>
+        </p:nvSpPr>
+        <p:spPr>
+          <a:xfrm>
+            <a:off x="3571560" y="4058640"/>
+            <a:ext cx="2921040" cy="2090880"/>
+          </a:xfrm>
+          <a:prstGeom prst="rect">
+            <a:avLst/>
+          </a:prstGeom>
+        </p:spPr>
+        <p:txBody>
+          <a:bodyPr lIns="0" rIns="0" tIns="0" bIns="0">
+            <a:normAutofit/>
+          </a:bodyPr>
+          <a:p>
+            <a:endParaRPr b="0" lang="en-US" sz="3200" spc="-1" strike="noStrike">
+              <a:latin typeface="Arial"/>
+            </a:endParaRPr>
+          </a:p>
+        </p:txBody>
+      </p:sp>
+      <p:sp>
+        <p:nvSpPr>
+          <p:cNvPr id="122" name="PlaceHolder 7"/>
+          <p:cNvSpPr>
+            <a:spLocks noGrp="1"/>
+          </p:cNvSpPr>
+          <p:nvPr>
+            <p:ph type="body"/>
+          </p:nvPr>
+        </p:nvSpPr>
+        <p:spPr>
+          <a:xfrm>
+            <a:off x="6639120" y="4058640"/>
+            <a:ext cx="2921040" cy="2090880"/>
           </a:xfrm>
           <a:prstGeom prst="rect">
             <a:avLst/>
@@ -2765,7 +4122,7 @@
         <p:spPr>
           <a:xfrm>
             <a:off x="0" y="3150000"/>
-            <a:ext cx="9719280" cy="1259280"/>
+            <a:ext cx="9718920" cy="1258920"/>
           </a:xfrm>
           <a:prstGeom prst="rect">
             <a:avLst/>
@@ -2796,8 +4153,8 @@
         </p:nvSpPr>
         <p:spPr>
           <a:xfrm>
-            <a:off x="360000" y="178560"/>
-            <a:ext cx="9359280" cy="1262160"/>
+            <a:off x="504000" y="301320"/>
+            <a:ext cx="9072000" cy="1261800"/>
           </a:xfrm>
           <a:prstGeom prst="rect">
             <a:avLst/>
@@ -2805,16 +4162,17 @@
         </p:spPr>
         <p:txBody>
           <a:bodyPr lIns="0" rIns="0" tIns="0" bIns="0" anchor="ctr">
-            <a:spAutoFit/>
-          </a:bodyPr>
-          <a:p>
-            <a:r>
-              <a:rPr b="0" lang="en-US" sz="1800" spc="-1" strike="noStrike">
+            <a:noAutofit/>
+          </a:bodyPr>
+          <a:p>
+            <a:pPr algn="ctr"/>
+            <a:r>
+              <a:rPr b="0" lang="en-US" sz="4400" spc="-1" strike="noStrike">
                 <a:latin typeface="Arial"/>
               </a:rPr>
               <a:t>Click to edit the title text format</a:t>
             </a:r>
-            <a:endParaRPr b="0" lang="en-US" sz="1800" spc="-1" strike="noStrike">
+            <a:endParaRPr b="0" lang="en-US" sz="4400" spc="-1" strike="noStrike">
               <a:latin typeface="Arial"/>
             </a:endParaRPr>
           </a:p>
@@ -2832,8 +4190,8 @@
         </p:nvSpPr>
         <p:spPr>
           <a:xfrm>
-            <a:off x="360000" y="1980000"/>
-            <a:ext cx="9179280" cy="4679280"/>
+            <a:off x="504000" y="1768680"/>
+            <a:ext cx="9072000" cy="4384080"/>
           </a:xfrm>
           <a:prstGeom prst="rect">
             <a:avLst/>
@@ -2856,12 +4214,12 @@
               <a:buChar char=""/>
             </a:pPr>
             <a:r>
-              <a:rPr b="0" lang="en-US" sz="1800" spc="-1" strike="noStrike">
+              <a:rPr b="0" lang="en-US" sz="3200" spc="-1" strike="noStrike">
                 <a:latin typeface="Arial"/>
               </a:rPr>
               <a:t>Click to edit the outline text format</a:t>
             </a:r>
-            <a:endParaRPr b="0" lang="en-US" sz="1800" spc="-1" strike="noStrike">
+            <a:endParaRPr b="0" lang="en-US" sz="3200" spc="-1" strike="noStrike">
               <a:latin typeface="Arial"/>
             </a:endParaRPr>
           </a:p>
@@ -2878,12 +4236,12 @@
               <a:buChar char=""/>
             </a:pPr>
             <a:r>
-              <a:rPr b="0" lang="en-US" sz="1800" spc="-1" strike="noStrike">
+              <a:rPr b="0" lang="en-US" sz="2800" spc="-1" strike="noStrike">
                 <a:latin typeface="Arial"/>
               </a:rPr>
               <a:t>Second Outline Level</a:t>
             </a:r>
-            <a:endParaRPr b="0" lang="en-US" sz="1800" spc="-1" strike="noStrike">
+            <a:endParaRPr b="0" lang="en-US" sz="2800" spc="-1" strike="noStrike">
               <a:latin typeface="Arial"/>
             </a:endParaRPr>
           </a:p>
@@ -2900,12 +4258,12 @@
               <a:buChar char=""/>
             </a:pPr>
             <a:r>
-              <a:rPr b="0" lang="en-US" sz="1800" spc="-1" strike="noStrike">
+              <a:rPr b="0" lang="en-US" sz="2400" spc="-1" strike="noStrike">
                 <a:latin typeface="Arial"/>
               </a:rPr>
               <a:t>Third Outline Level</a:t>
             </a:r>
-            <a:endParaRPr b="0" lang="en-US" sz="1800" spc="-1" strike="noStrike">
+            <a:endParaRPr b="0" lang="en-US" sz="2400" spc="-1" strike="noStrike">
               <a:latin typeface="Arial"/>
             </a:endParaRPr>
           </a:p>
@@ -2922,12 +4280,12 @@
               <a:buChar char=""/>
             </a:pPr>
             <a:r>
-              <a:rPr b="0" lang="en-US" sz="1800" spc="-1" strike="noStrike">
+              <a:rPr b="0" lang="en-US" sz="2000" spc="-1" strike="noStrike">
                 <a:latin typeface="Arial"/>
               </a:rPr>
               <a:t>Fourth Outline Level</a:t>
             </a:r>
-            <a:endParaRPr b="0" lang="en-US" sz="1800" spc="-1" strike="noStrike">
+            <a:endParaRPr b="0" lang="en-US" sz="2000" spc="-1" strike="noStrike">
               <a:latin typeface="Arial"/>
             </a:endParaRPr>
           </a:p>
@@ -2944,12 +4302,12 @@
               <a:buChar char=""/>
             </a:pPr>
             <a:r>
-              <a:rPr b="0" lang="en-US" sz="1800" spc="-1" strike="noStrike">
+              <a:rPr b="0" lang="en-US" sz="2000" spc="-1" strike="noStrike">
                 <a:latin typeface="Arial"/>
               </a:rPr>
               <a:t>Fifth Outline Level</a:t>
             </a:r>
-            <a:endParaRPr b="0" lang="en-US" sz="1800" spc="-1" strike="noStrike">
+            <a:endParaRPr b="0" lang="en-US" sz="2000" spc="-1" strike="noStrike">
               <a:latin typeface="Arial"/>
             </a:endParaRPr>
           </a:p>
@@ -2966,12 +4324,12 @@
               <a:buChar char=""/>
             </a:pPr>
             <a:r>
-              <a:rPr b="0" lang="en-US" sz="1800" spc="-1" strike="noStrike">
+              <a:rPr b="0" lang="en-US" sz="2000" spc="-1" strike="noStrike">
                 <a:latin typeface="Arial"/>
               </a:rPr>
               <a:t>Sixth Outline Level</a:t>
             </a:r>
-            <a:endParaRPr b="0" lang="en-US" sz="1800" spc="-1" strike="noStrike">
+            <a:endParaRPr b="0" lang="en-US" sz="2000" spc="-1" strike="noStrike">
               <a:latin typeface="Arial"/>
             </a:endParaRPr>
           </a:p>
@@ -2988,12 +4346,12 @@
               <a:buChar char=""/>
             </a:pPr>
             <a:r>
-              <a:rPr b="0" lang="en-US" sz="1800" spc="-1" strike="noStrike">
+              <a:rPr b="0" lang="en-US" sz="2000" spc="-1" strike="noStrike">
                 <a:latin typeface="Arial"/>
               </a:rPr>
               <a:t>Seventh Outline Level</a:t>
             </a:r>
-            <a:endParaRPr b="0" lang="en-US" sz="1800" spc="-1" strike="noStrike">
+            <a:endParaRPr b="0" lang="en-US" sz="2000" spc="-1" strike="noStrike">
               <a:latin typeface="Arial"/>
             </a:endParaRPr>
           </a:p>
@@ -3052,7 +4410,7 @@
         <p:spPr>
           <a:xfrm>
             <a:off x="0" y="180000"/>
-            <a:ext cx="9719280" cy="1259280"/>
+            <a:ext cx="9718920" cy="1258920"/>
           </a:xfrm>
           <a:prstGeom prst="rect">
             <a:avLst/>
@@ -3080,7 +4438,7 @@
         <p:spPr>
           <a:xfrm>
             <a:off x="7560000" y="6840000"/>
-            <a:ext cx="2519280" cy="539280"/>
+            <a:ext cx="2518920" cy="538920"/>
           </a:xfrm>
           <a:prstGeom prst="rect">
             <a:avLst/>
@@ -3108,7 +4466,7 @@
         <p:spPr>
           <a:xfrm>
             <a:off x="900000" y="6840000"/>
-            <a:ext cx="6479280" cy="539280"/>
+            <a:ext cx="6478920" cy="538920"/>
           </a:xfrm>
           <a:prstGeom prst="rect">
             <a:avLst/>
@@ -3136,7 +4494,7 @@
         <p:spPr>
           <a:xfrm>
             <a:off x="180000" y="6840000"/>
-            <a:ext cx="539280" cy="539280"/>
+            <a:ext cx="538920" cy="538920"/>
           </a:xfrm>
           <a:prstGeom prst="rect">
             <a:avLst/>
@@ -3385,6 +4743,375 @@
     <p:sldLayoutId id="2147483671" r:id="rId11"/>
     <p:sldLayoutId id="2147483672" r:id="rId12"/>
     <p:sldLayoutId id="2147483673" r:id="rId13"/>
+  </p:sldLayoutIdLst>
+</p:sldMaster>
+</file>
+
+<file path=ppt/slideMasters/slideMaster3.xml><?xml version="1.0" encoding="utf-8"?>
+<p:sldMaster xmlns:a="http://schemas.openxmlformats.org/drawingml/2006/main" xmlns:p="http://schemas.openxmlformats.org/presentationml/2006/main" xmlns:r="http://schemas.openxmlformats.org/officeDocument/2006/relationships" xmlns:p14="http://schemas.microsoft.com/office/powerpoint/2010/main" xmlns:p15="http://schemas.microsoft.com/office/powerpoint/2012/main" xmlns:mc="http://schemas.openxmlformats.org/markup-compatibility/2006">
+  <p:cSld>
+    <p:bg>
+      <p:bgPr>
+        <a:solidFill>
+          <a:srgbClr val="ffffff"/>
+        </a:solidFill>
+      </p:bgPr>
+    </p:bg>
+    <p:spTree>
+      <p:nvGrpSpPr>
+        <p:cNvPr id="1" name=""/>
+        <p:cNvGrpSpPr/>
+        <p:nvPr/>
+      </p:nvGrpSpPr>
+      <p:grpSpPr>
+        <a:xfrm>
+          <a:off x="0" y="0"/>
+          <a:ext cx="0" cy="0"/>
+          <a:chOff x="0" y="0"/>
+          <a:chExt cx="0" cy="0"/>
+        </a:xfrm>
+      </p:grpSpPr>
+      <p:sp>
+        <p:nvSpPr>
+          <p:cNvPr id="81" name="CustomShape 1"/>
+          <p:cNvSpPr/>
+          <p:nvPr/>
+        </p:nvSpPr>
+        <p:spPr>
+          <a:xfrm>
+            <a:off x="0" y="180000"/>
+            <a:ext cx="9718920" cy="1258920"/>
+          </a:xfrm>
+          <a:prstGeom prst="rect">
+            <a:avLst/>
+          </a:prstGeom>
+          <a:solidFill>
+            <a:srgbClr val="e74c3c"/>
+          </a:solidFill>
+          <a:ln w="72000">
+            <a:noFill/>
+          </a:ln>
+        </p:spPr>
+        <p:style>
+          <a:lnRef idx="0"/>
+          <a:fillRef idx="0"/>
+          <a:effectRef idx="0"/>
+          <a:fontRef idx="minor"/>
+        </p:style>
+      </p:sp>
+      <p:sp>
+        <p:nvSpPr>
+          <p:cNvPr id="82" name="CustomShape 2"/>
+          <p:cNvSpPr/>
+          <p:nvPr/>
+        </p:nvSpPr>
+        <p:spPr>
+          <a:xfrm>
+            <a:off x="7560000" y="6840000"/>
+            <a:ext cx="2518920" cy="538920"/>
+          </a:xfrm>
+          <a:prstGeom prst="rect">
+            <a:avLst/>
+          </a:prstGeom>
+          <a:solidFill>
+            <a:srgbClr val="e74c3c"/>
+          </a:solidFill>
+          <a:ln w="72000">
+            <a:noFill/>
+          </a:ln>
+        </p:spPr>
+        <p:style>
+          <a:lnRef idx="0"/>
+          <a:fillRef idx="0"/>
+          <a:effectRef idx="0"/>
+          <a:fontRef idx="minor"/>
+        </p:style>
+      </p:sp>
+      <p:sp>
+        <p:nvSpPr>
+          <p:cNvPr id="83" name="CustomShape 3"/>
+          <p:cNvSpPr/>
+          <p:nvPr/>
+        </p:nvSpPr>
+        <p:spPr>
+          <a:xfrm>
+            <a:off x="900000" y="6840000"/>
+            <a:ext cx="6478920" cy="538920"/>
+          </a:xfrm>
+          <a:prstGeom prst="rect">
+            <a:avLst/>
+          </a:prstGeom>
+          <a:solidFill>
+            <a:srgbClr val="bdc3c7"/>
+          </a:solidFill>
+          <a:ln w="72000">
+            <a:noFill/>
+          </a:ln>
+        </p:spPr>
+        <p:style>
+          <a:lnRef idx="0"/>
+          <a:fillRef idx="0"/>
+          <a:effectRef idx="0"/>
+          <a:fontRef idx="minor"/>
+        </p:style>
+      </p:sp>
+      <p:sp>
+        <p:nvSpPr>
+          <p:cNvPr id="84" name="CustomShape 4"/>
+          <p:cNvSpPr/>
+          <p:nvPr/>
+        </p:nvSpPr>
+        <p:spPr>
+          <a:xfrm>
+            <a:off x="180000" y="6840000"/>
+            <a:ext cx="538920" cy="538920"/>
+          </a:xfrm>
+          <a:prstGeom prst="rect">
+            <a:avLst/>
+          </a:prstGeom>
+          <a:noFill/>
+          <a:ln w="72000">
+            <a:noFill/>
+          </a:ln>
+        </p:spPr>
+        <p:style>
+          <a:lnRef idx="0"/>
+          <a:fillRef idx="0"/>
+          <a:effectRef idx="0"/>
+          <a:fontRef idx="minor"/>
+        </p:style>
+      </p:sp>
+      <p:sp>
+        <p:nvSpPr>
+          <p:cNvPr id="85" name="PlaceHolder 5"/>
+          <p:cNvSpPr>
+            <a:spLocks noGrp="1"/>
+          </p:cNvSpPr>
+          <p:nvPr>
+            <p:ph type="title"/>
+          </p:nvPr>
+        </p:nvSpPr>
+        <p:spPr>
+          <a:xfrm>
+            <a:off x="504000" y="300960"/>
+            <a:ext cx="9071640" cy="1262160"/>
+          </a:xfrm>
+          <a:prstGeom prst="rect">
+            <a:avLst/>
+          </a:prstGeom>
+        </p:spPr>
+        <p:txBody>
+          <a:bodyPr lIns="0" rIns="0" tIns="0" bIns="0" anchor="ctr">
+            <a:spAutoFit/>
+          </a:bodyPr>
+          <a:p>
+            <a:r>
+              <a:rPr b="0" lang="en-US" sz="1800" spc="-1" strike="noStrike">
+                <a:latin typeface="Arial"/>
+              </a:rPr>
+              <a:t>Click to edit the title text format</a:t>
+            </a:r>
+            <a:endParaRPr b="0" lang="en-US" sz="1800" spc="-1" strike="noStrike">
+              <a:latin typeface="Arial"/>
+            </a:endParaRPr>
+          </a:p>
+        </p:txBody>
+      </p:sp>
+      <p:sp>
+        <p:nvSpPr>
+          <p:cNvPr id="86" name="PlaceHolder 6"/>
+          <p:cNvSpPr>
+            <a:spLocks noGrp="1"/>
+          </p:cNvSpPr>
+          <p:nvPr>
+            <p:ph type="body"/>
+          </p:nvPr>
+        </p:nvSpPr>
+        <p:spPr>
+          <a:xfrm>
+            <a:off x="504000" y="1768680"/>
+            <a:ext cx="9072000" cy="4384080"/>
+          </a:xfrm>
+          <a:prstGeom prst="rect">
+            <a:avLst/>
+          </a:prstGeom>
+        </p:spPr>
+        <p:txBody>
+          <a:bodyPr lIns="0" rIns="0" tIns="0" bIns="0">
+            <a:normAutofit/>
+          </a:bodyPr>
+          <a:p>
+            <a:pPr marL="432000" indent="-324000">
+              <a:spcBef>
+                <a:spcPts val="1417"/>
+              </a:spcBef>
+              <a:buClr>
+                <a:srgbClr val="000000"/>
+              </a:buClr>
+              <a:buSzPct val="45000"/>
+              <a:buFont typeface="Wingdings" charset="2"/>
+              <a:buChar char=""/>
+            </a:pPr>
+            <a:r>
+              <a:rPr b="0" lang="en-US" sz="3200" spc="-1" strike="noStrike">
+                <a:latin typeface="Arial"/>
+              </a:rPr>
+              <a:t>Click to edit the outline text format</a:t>
+            </a:r>
+            <a:endParaRPr b="0" lang="en-US" sz="3200" spc="-1" strike="noStrike">
+              <a:latin typeface="Arial"/>
+            </a:endParaRPr>
+          </a:p>
+          <a:p>
+            <a:pPr lvl="1" marL="864000" indent="-324000">
+              <a:spcBef>
+                <a:spcPts val="1134"/>
+              </a:spcBef>
+              <a:buClr>
+                <a:srgbClr val="000000"/>
+              </a:buClr>
+              <a:buSzPct val="75000"/>
+              <a:buFont typeface="Symbol" charset="2"/>
+              <a:buChar char=""/>
+            </a:pPr>
+            <a:r>
+              <a:rPr b="0" lang="en-US" sz="2800" spc="-1" strike="noStrike">
+                <a:latin typeface="Arial"/>
+              </a:rPr>
+              <a:t>Second Outline Level</a:t>
+            </a:r>
+            <a:endParaRPr b="0" lang="en-US" sz="2800" spc="-1" strike="noStrike">
+              <a:latin typeface="Arial"/>
+            </a:endParaRPr>
+          </a:p>
+          <a:p>
+            <a:pPr lvl="2" marL="1296000" indent="-288000">
+              <a:spcBef>
+                <a:spcPts val="850"/>
+              </a:spcBef>
+              <a:buClr>
+                <a:srgbClr val="000000"/>
+              </a:buClr>
+              <a:buSzPct val="45000"/>
+              <a:buFont typeface="Wingdings" charset="2"/>
+              <a:buChar char=""/>
+            </a:pPr>
+            <a:r>
+              <a:rPr b="0" lang="en-US" sz="2400" spc="-1" strike="noStrike">
+                <a:latin typeface="Arial"/>
+              </a:rPr>
+              <a:t>Third Outline Level</a:t>
+            </a:r>
+            <a:endParaRPr b="0" lang="en-US" sz="2400" spc="-1" strike="noStrike">
+              <a:latin typeface="Arial"/>
+            </a:endParaRPr>
+          </a:p>
+          <a:p>
+            <a:pPr lvl="3" marL="1728000" indent="-216000">
+              <a:spcBef>
+                <a:spcPts val="567"/>
+              </a:spcBef>
+              <a:buClr>
+                <a:srgbClr val="000000"/>
+              </a:buClr>
+              <a:buSzPct val="75000"/>
+              <a:buFont typeface="Symbol" charset="2"/>
+              <a:buChar char=""/>
+            </a:pPr>
+            <a:r>
+              <a:rPr b="0" lang="en-US" sz="2000" spc="-1" strike="noStrike">
+                <a:latin typeface="Arial"/>
+              </a:rPr>
+              <a:t>Fourth Outline Level</a:t>
+            </a:r>
+            <a:endParaRPr b="0" lang="en-US" sz="2000" spc="-1" strike="noStrike">
+              <a:latin typeface="Arial"/>
+            </a:endParaRPr>
+          </a:p>
+          <a:p>
+            <a:pPr lvl="4" marL="2160000" indent="-216000">
+              <a:spcBef>
+                <a:spcPts val="283"/>
+              </a:spcBef>
+              <a:buClr>
+                <a:srgbClr val="000000"/>
+              </a:buClr>
+              <a:buSzPct val="45000"/>
+              <a:buFont typeface="Wingdings" charset="2"/>
+              <a:buChar char=""/>
+            </a:pPr>
+            <a:r>
+              <a:rPr b="0" lang="en-US" sz="2000" spc="-1" strike="noStrike">
+                <a:latin typeface="Arial"/>
+              </a:rPr>
+              <a:t>Fifth Outline Level</a:t>
+            </a:r>
+            <a:endParaRPr b="0" lang="en-US" sz="2000" spc="-1" strike="noStrike">
+              <a:latin typeface="Arial"/>
+            </a:endParaRPr>
+          </a:p>
+          <a:p>
+            <a:pPr lvl="5" marL="2592000" indent="-216000">
+              <a:spcBef>
+                <a:spcPts val="283"/>
+              </a:spcBef>
+              <a:buClr>
+                <a:srgbClr val="000000"/>
+              </a:buClr>
+              <a:buSzPct val="45000"/>
+              <a:buFont typeface="Wingdings" charset="2"/>
+              <a:buChar char=""/>
+            </a:pPr>
+            <a:r>
+              <a:rPr b="0" lang="en-US" sz="2000" spc="-1" strike="noStrike">
+                <a:latin typeface="Arial"/>
+              </a:rPr>
+              <a:t>Sixth Outline Level</a:t>
+            </a:r>
+            <a:endParaRPr b="0" lang="en-US" sz="2000" spc="-1" strike="noStrike">
+              <a:latin typeface="Arial"/>
+            </a:endParaRPr>
+          </a:p>
+          <a:p>
+            <a:pPr lvl="6" marL="3024000" indent="-216000">
+              <a:spcBef>
+                <a:spcPts val="283"/>
+              </a:spcBef>
+              <a:buClr>
+                <a:srgbClr val="000000"/>
+              </a:buClr>
+              <a:buSzPct val="45000"/>
+              <a:buFont typeface="Wingdings" charset="2"/>
+              <a:buChar char=""/>
+            </a:pPr>
+            <a:r>
+              <a:rPr b="0" lang="en-US" sz="2000" spc="-1" strike="noStrike">
+                <a:latin typeface="Arial"/>
+              </a:rPr>
+              <a:t>Seventh Outline Level</a:t>
+            </a:r>
+            <a:endParaRPr b="0" lang="en-US" sz="2000" spc="-1" strike="noStrike">
+              <a:latin typeface="Arial"/>
+            </a:endParaRPr>
+          </a:p>
+        </p:txBody>
+      </p:sp>
+    </p:spTree>
+  </p:cSld>
+  <p:clrMap bg1="lt1" bg2="lt2" tx1="dk1" tx2="dk2" accent1="accent1" accent2="accent2" accent3="accent3" accent4="accent4" accent5="accent5" accent6="accent6" hlink="hlink" folHlink="folHlink"/>
+  <p:sldLayoutIdLst>
+    <p:sldLayoutId id="2147483675" r:id="rId2"/>
+    <p:sldLayoutId id="2147483676" r:id="rId3"/>
+    <p:sldLayoutId id="2147483677" r:id="rId4"/>
+    <p:sldLayoutId id="2147483678" r:id="rId5"/>
+    <p:sldLayoutId id="2147483679" r:id="rId6"/>
+    <p:sldLayoutId id="2147483680" r:id="rId7"/>
+    <p:sldLayoutId id="2147483681" r:id="rId8"/>
+    <p:sldLayoutId id="2147483682" r:id="rId9"/>
+    <p:sldLayoutId id="2147483683" r:id="rId10"/>
+    <p:sldLayoutId id="2147483684" r:id="rId11"/>
+    <p:sldLayoutId id="2147483685" r:id="rId12"/>
+    <p:sldLayoutId id="2147483686" r:id="rId13"/>
   </p:sldLayoutIdLst>
 </p:sldMaster>
 </file>
@@ -3408,14 +5135,14 @@
       </p:grpSpPr>
       <p:sp>
         <p:nvSpPr>
-          <p:cNvPr id="81" name="CustomShape 1"/>
+          <p:cNvPr id="123" name="CustomShape 1"/>
           <p:cNvSpPr/>
           <p:nvPr/>
         </p:nvSpPr>
         <p:spPr>
           <a:xfrm>
             <a:off x="360000" y="3330000"/>
-            <a:ext cx="9359280" cy="899280"/>
+            <a:ext cx="9358920" cy="898920"/>
           </a:xfrm>
           <a:prstGeom prst="rect">
             <a:avLst/>
@@ -3459,14 +5186,14 @@
       </p:sp>
       <p:sp>
         <p:nvSpPr>
-          <p:cNvPr id="82" name="CustomShape 2"/>
+          <p:cNvPr id="124" name="CustomShape 2"/>
           <p:cNvSpPr/>
           <p:nvPr/>
         </p:nvSpPr>
         <p:spPr>
           <a:xfrm>
             <a:off x="5869440" y="6699240"/>
-            <a:ext cx="3849840" cy="500040"/>
+            <a:ext cx="3849480" cy="499680"/>
           </a:xfrm>
           <a:prstGeom prst="rect">
             <a:avLst/>
@@ -3567,14 +5294,14 @@
       </p:grpSpPr>
       <p:sp>
         <p:nvSpPr>
-          <p:cNvPr id="83" name="CustomShape 1"/>
+          <p:cNvPr id="125" name="CustomShape 1"/>
           <p:cNvSpPr/>
           <p:nvPr/>
         </p:nvSpPr>
         <p:spPr>
           <a:xfrm>
             <a:off x="360000" y="360000"/>
-            <a:ext cx="9359280" cy="899280"/>
+            <a:ext cx="9358920" cy="898920"/>
           </a:xfrm>
           <a:prstGeom prst="rect">
             <a:avLst/>
@@ -3618,14 +5345,14 @@
       </p:sp>
       <p:sp>
         <p:nvSpPr>
-          <p:cNvPr id="84" name="CustomShape 2"/>
+          <p:cNvPr id="126" name="CustomShape 2"/>
           <p:cNvSpPr/>
           <p:nvPr/>
         </p:nvSpPr>
         <p:spPr>
           <a:xfrm>
             <a:off x="360000" y="1980000"/>
-            <a:ext cx="9179280" cy="4679280"/>
+            <a:ext cx="9178920" cy="4678920"/>
           </a:xfrm>
           <a:prstGeom prst="rect">
             <a:avLst/>
@@ -3913,14 +5640,14 @@
       </p:grpSpPr>
       <p:sp>
         <p:nvSpPr>
-          <p:cNvPr id="85" name="CustomShape 1"/>
+          <p:cNvPr id="127" name="CustomShape 1"/>
           <p:cNvSpPr/>
           <p:nvPr/>
         </p:nvSpPr>
         <p:spPr>
           <a:xfrm>
             <a:off x="360000" y="360000"/>
-            <a:ext cx="9359280" cy="899280"/>
+            <a:ext cx="9358920" cy="898920"/>
           </a:xfrm>
           <a:prstGeom prst="rect">
             <a:avLst/>
@@ -3964,14 +5691,14 @@
       </p:sp>
       <p:sp>
         <p:nvSpPr>
-          <p:cNvPr id="86" name="CustomShape 2"/>
+          <p:cNvPr id="128" name="CustomShape 2"/>
           <p:cNvSpPr/>
           <p:nvPr/>
         </p:nvSpPr>
         <p:spPr>
           <a:xfrm>
             <a:off x="360000" y="1980000"/>
-            <a:ext cx="9179280" cy="4679280"/>
+            <a:ext cx="9178920" cy="4678920"/>
           </a:xfrm>
           <a:prstGeom prst="rect">
             <a:avLst/>
@@ -4167,14 +5894,14 @@
       </p:grpSpPr>
       <p:sp>
         <p:nvSpPr>
-          <p:cNvPr id="87" name="CustomShape 1"/>
+          <p:cNvPr id="129" name="CustomShape 1"/>
           <p:cNvSpPr/>
           <p:nvPr/>
         </p:nvSpPr>
         <p:spPr>
           <a:xfrm>
             <a:off x="360000" y="360000"/>
-            <a:ext cx="9359280" cy="899280"/>
+            <a:ext cx="9358920" cy="898920"/>
           </a:xfrm>
           <a:prstGeom prst="rect">
             <a:avLst/>
@@ -4218,14 +5945,14 @@
       </p:sp>
       <p:sp>
         <p:nvSpPr>
-          <p:cNvPr id="88" name="CustomShape 2"/>
+          <p:cNvPr id="130" name="CustomShape 2"/>
           <p:cNvSpPr/>
           <p:nvPr/>
         </p:nvSpPr>
         <p:spPr>
           <a:xfrm>
             <a:off x="360000" y="1980000"/>
-            <a:ext cx="9179280" cy="4679280"/>
+            <a:ext cx="9178920" cy="4678920"/>
           </a:xfrm>
           <a:prstGeom prst="rect">
             <a:avLst/>
@@ -4480,14 +6207,14 @@
       </p:grpSpPr>
       <p:sp>
         <p:nvSpPr>
-          <p:cNvPr id="89" name="CustomShape 1"/>
+          <p:cNvPr id="131" name="CustomShape 1"/>
           <p:cNvSpPr/>
           <p:nvPr/>
         </p:nvSpPr>
         <p:spPr>
           <a:xfrm>
             <a:off x="360000" y="360000"/>
-            <a:ext cx="9359280" cy="899280"/>
+            <a:ext cx="9358920" cy="898920"/>
           </a:xfrm>
           <a:prstGeom prst="rect">
             <a:avLst/>
@@ -4531,14 +6258,14 @@
       </p:sp>
       <p:sp>
         <p:nvSpPr>
-          <p:cNvPr id="90" name="CustomShape 2"/>
+          <p:cNvPr id="132" name="CustomShape 2"/>
           <p:cNvSpPr/>
           <p:nvPr/>
         </p:nvSpPr>
         <p:spPr>
           <a:xfrm>
             <a:off x="360000" y="1980000"/>
-            <a:ext cx="9179280" cy="4679280"/>
+            <a:ext cx="9178920" cy="4678920"/>
           </a:xfrm>
           <a:prstGeom prst="rect">
             <a:avLst/>
@@ -4608,7 +6335,7 @@
                 <a:latin typeface="Arial"/>
                 <a:ea typeface="DejaVu Sans"/>
               </a:rPr>
-              <a:t>: « Réglée » ou « Non réglée »</a:t>
+              <a:t>: « Payée » ou « Non payée »</a:t>
             </a:r>
             <a:endParaRPr b="0" lang="en-US" sz="2200" spc="-1" strike="noStrike">
               <a:latin typeface="Arial"/>
@@ -4731,14 +6458,14 @@
       </p:grpSpPr>
       <p:sp>
         <p:nvSpPr>
-          <p:cNvPr id="91" name="CustomShape 1"/>
+          <p:cNvPr id="133" name="CustomShape 1"/>
           <p:cNvSpPr/>
           <p:nvPr/>
         </p:nvSpPr>
         <p:spPr>
           <a:xfrm>
             <a:off x="360000" y="360000"/>
-            <a:ext cx="9359280" cy="899280"/>
+            <a:ext cx="9358920" cy="898920"/>
           </a:xfrm>
           <a:prstGeom prst="rect">
             <a:avLst/>
@@ -4782,14 +6509,14 @@
       </p:sp>
       <p:sp>
         <p:nvSpPr>
-          <p:cNvPr id="92" name="CustomShape 2"/>
+          <p:cNvPr id="134" name="CustomShape 2"/>
           <p:cNvSpPr/>
           <p:nvPr/>
         </p:nvSpPr>
         <p:spPr>
           <a:xfrm>
             <a:off x="360000" y="1980000"/>
-            <a:ext cx="9179280" cy="4679280"/>
+            <a:ext cx="9178920" cy="4678920"/>
           </a:xfrm>
           <a:prstGeom prst="rect">
             <a:avLst/>
@@ -4879,17 +6606,7 @@
                 <a:latin typeface="Arial"/>
                 <a:ea typeface="DejaVu Sans"/>
               </a:rPr>
-              <a:t>Détermination</a:t>
-            </a:r>
-            <a:r>
-              <a:rPr b="1" lang="en-US" sz="2200" spc="-1" strike="noStrike">
-                <a:solidFill>
-                  <a:srgbClr val="1c1c1c"/>
-                </a:solidFill>
-                <a:latin typeface="Arial"/>
-                <a:ea typeface="DejaVu Sans"/>
-              </a:rPr>
-              <a:t> du lieu de production</a:t>
+              <a:t>Détermination du lieu de production</a:t>
             </a:r>
             <a:r>
               <a:rPr b="0" lang="en-US" sz="2200" spc="-1" strike="noStrike">
@@ -5095,14 +6812,14 @@
       </p:grpSpPr>
       <p:sp>
         <p:nvSpPr>
-          <p:cNvPr id="93" name="TextShape 1"/>
-          <p:cNvSpPr txBox="1"/>
+          <p:cNvPr id="135" name="CustomShape 1"/>
+          <p:cNvSpPr/>
           <p:nvPr/>
         </p:nvSpPr>
         <p:spPr>
           <a:xfrm>
-            <a:off x="504000" y="301320"/>
-            <a:ext cx="9072000" cy="1261800"/>
+            <a:off x="504000" y="687960"/>
+            <a:ext cx="9071640" cy="488160"/>
           </a:xfrm>
           <a:prstGeom prst="rect">
             <a:avLst/>
@@ -5112,11 +6829,22 @@
             <a:noFill/>
           </a:ln>
         </p:spPr>
+        <p:style>
+          <a:lnRef idx="0"/>
+          <a:fillRef idx="0"/>
+          <a:effectRef idx="0"/>
+          <a:fontRef idx="minor"/>
+        </p:style>
         <p:txBody>
           <a:bodyPr lIns="0" rIns="0" tIns="0" bIns="0" anchor="ctr">
             <a:spAutoFit/>
           </a:bodyPr>
           <a:p>
+            <a:pPr>
+              <a:lnSpc>
+                <a:spcPct val="100000"/>
+              </a:lnSpc>
+            </a:pPr>
             <a:r>
               <a:rPr b="1" lang="en-US" sz="3200" spc="-1" strike="noStrike">
                 <a:solidFill>
@@ -5128,24 +6856,21 @@
               <a:t>Parcours de la livraison</a:t>
             </a:r>
             <a:endParaRPr b="0" lang="en-US" sz="3200" spc="-1" strike="noStrike">
-              <a:solidFill>
-                <a:srgbClr val="ffffff"/>
-              </a:solidFill>
-              <a:latin typeface="source"/>
-            </a:endParaRPr>
-          </a:p>
-        </p:txBody>
-      </p:sp>
-      <p:sp>
-        <p:nvSpPr>
-          <p:cNvPr id="94" name="TextShape 2"/>
-          <p:cNvSpPr txBox="1"/>
+              <a:latin typeface="Arial"/>
+            </a:endParaRPr>
+          </a:p>
+        </p:txBody>
+      </p:sp>
+      <p:sp>
+        <p:nvSpPr>
+          <p:cNvPr id="136" name="CustomShape 2"/>
+          <p:cNvSpPr/>
           <p:nvPr/>
         </p:nvSpPr>
         <p:spPr>
           <a:xfrm>
-            <a:off x="504000" y="1768680"/>
-            <a:ext cx="9072000" cy="4384080"/>
+            <a:off x="504000" y="2527560"/>
+            <a:ext cx="9071640" cy="2865960"/>
           </a:xfrm>
           <a:prstGeom prst="rect">
             <a:avLst/>
@@ -5155,6 +6880,12 @@
             <a:noFill/>
           </a:ln>
         </p:spPr>
+        <p:style>
+          <a:lnRef idx="0"/>
+          <a:fillRef idx="0"/>
+          <a:effectRef idx="0"/>
+          <a:fontRef idx="minor"/>
+        </p:style>
         <p:txBody>
           <a:bodyPr lIns="0" rIns="0" tIns="0" bIns="0" anchor="ctr">
             <a:spAutoFit/>
@@ -5205,7 +6936,7 @@
                 <a:latin typeface="Arial"/>
                 <a:ea typeface="DejaVu Sans"/>
               </a:rPr>
-              <a:t>2 – Si la commande n’a pas le statut de paiement “Réglée”, le livreur encaisse la commande et met à jour le statut</a:t>
+              <a:t>2 – Si la commande n’a pas le statut de paiement “Payée”, le livreur encaisse la commande et met à jour le statut</a:t>
             </a:r>
             <a:endParaRPr b="0" lang="en-US" sz="2000" spc="-1" strike="noStrike">
               <a:latin typeface="Arial"/>
@@ -5311,14 +7042,14 @@
       </p:grpSpPr>
       <p:sp>
         <p:nvSpPr>
-          <p:cNvPr id="95" name="CustomShape 1"/>
+          <p:cNvPr id="137" name="CustomShape 1"/>
           <p:cNvSpPr/>
           <p:nvPr/>
         </p:nvSpPr>
         <p:spPr>
           <a:xfrm>
             <a:off x="360000" y="360000"/>
-            <a:ext cx="9359280" cy="899280"/>
+            <a:ext cx="9358920" cy="898920"/>
           </a:xfrm>
           <a:prstGeom prst="rect">
             <a:avLst/>
@@ -5362,14 +7093,14 @@
       </p:sp>
       <p:sp>
         <p:nvSpPr>
-          <p:cNvPr id="96" name="CustomShape 2"/>
+          <p:cNvPr id="138" name="CustomShape 2"/>
           <p:cNvSpPr/>
           <p:nvPr/>
         </p:nvSpPr>
         <p:spPr>
           <a:xfrm>
             <a:off x="360000" y="1980000"/>
-            <a:ext cx="9179280" cy="4679280"/>
+            <a:ext cx="9178920" cy="4678920"/>
           </a:xfrm>
           <a:prstGeom prst="rect">
             <a:avLst/>
@@ -6070,4 +7801,227 @@
     </a:fmtScheme>
   </a:themeElements>
 </a:theme>
+</file>
+
+<file path=ppt/theme/theme3.xml><?xml version="1.0" encoding="utf-8"?>
+<a:theme xmlns:a="http://schemas.openxmlformats.org/drawingml/2006/main" name="Office Theme">
+  <a:themeElements>
+    <a:clrScheme name="Office">
+      <a:dk1>
+        <a:sysClr val="windowText" lastClr="000000"/>
+      </a:dk1>
+      <a:lt1>
+        <a:sysClr val="window" lastClr="FFFFFF"/>
+      </a:lt1>
+      <a:dk2>
+        <a:srgbClr val="1f497d"/>
+      </a:dk2>
+      <a:lt2>
+        <a:srgbClr val="eeece1"/>
+      </a:lt2>
+      <a:accent1>
+        <a:srgbClr val="4f81bd"/>
+      </a:accent1>
+      <a:accent2>
+        <a:srgbClr val="c0504d"/>
+      </a:accent2>
+      <a:accent3>
+        <a:srgbClr val="9bbb59"/>
+      </a:accent3>
+      <a:accent4>
+        <a:srgbClr val="8064a2"/>
+      </a:accent4>
+      <a:accent5>
+        <a:srgbClr val="4bacc6"/>
+      </a:accent5>
+      <a:accent6>
+        <a:srgbClr val="f79646"/>
+      </a:accent6>
+      <a:hlink>
+        <a:srgbClr val="0000ff"/>
+      </a:hlink>
+      <a:folHlink>
+        <a:srgbClr val="800080"/>
+      </a:folHlink>
+    </a:clrScheme>
+    <a:fontScheme name="Office">
+      <a:majorFont>
+        <a:latin typeface="Arial"/>
+        <a:ea typeface="DejaVu Sans"/>
+        <a:cs typeface="DejaVu Sans"/>
+      </a:majorFont>
+      <a:minorFont>
+        <a:latin typeface="Arial"/>
+        <a:ea typeface="DejaVu Sans"/>
+        <a:cs typeface="DejaVu Sans"/>
+      </a:minorFont>
+    </a:fontScheme>
+    <a:fmtScheme name="Office">
+      <a:fillStyleLst>
+        <a:solidFill>
+          <a:schemeClr val="phClr"/>
+        </a:solidFill>
+        <a:gradFill rotWithShape="1">
+          <a:gsLst>
+            <a:gs pos="0">
+              <a:schemeClr val="phClr">
+                <a:tint val="50000"/>
+                <a:satMod val="300000"/>
+              </a:schemeClr>
+            </a:gs>
+            <a:gs pos="35000">
+              <a:schemeClr val="phClr">
+                <a:tint val="37000"/>
+                <a:satMod val="300000"/>
+              </a:schemeClr>
+            </a:gs>
+            <a:gs pos="100000">
+              <a:schemeClr val="phClr">
+                <a:tint val="15000"/>
+                <a:satMod val="350000"/>
+              </a:schemeClr>
+            </a:gs>
+          </a:gsLst>
+          <a:lin ang="16200000" scaled="1"/>
+        </a:gradFill>
+        <a:gradFill rotWithShape="1">
+          <a:gsLst>
+            <a:gs pos="0">
+              <a:schemeClr val="phClr">
+                <a:shade val="51000"/>
+                <a:satMod val="130000"/>
+              </a:schemeClr>
+            </a:gs>
+            <a:gs pos="80000">
+              <a:schemeClr val="phClr">
+                <a:shade val="93000"/>
+                <a:satMod val="130000"/>
+              </a:schemeClr>
+            </a:gs>
+            <a:gs pos="100000">
+              <a:schemeClr val="phClr">
+                <a:shade val="94000"/>
+                <a:satMod val="135000"/>
+              </a:schemeClr>
+            </a:gs>
+          </a:gsLst>
+          <a:lin ang="16200000" scaled="0"/>
+        </a:gradFill>
+      </a:fillStyleLst>
+      <a:lnStyleLst>
+        <a:ln w="9525" cap="flat" cmpd="sng" algn="ctr">
+          <a:solidFill>
+            <a:schemeClr val="phClr">
+              <a:shade val="95000"/>
+              <a:satMod val="105000"/>
+            </a:schemeClr>
+          </a:solidFill>
+          <a:prstDash val="solid"/>
+        </a:ln>
+        <a:ln w="25400" cap="flat" cmpd="sng" algn="ctr">
+          <a:solidFill>
+            <a:schemeClr val="phClr"/>
+          </a:solidFill>
+          <a:prstDash val="solid"/>
+        </a:ln>
+        <a:ln w="38100" cap="flat" cmpd="sng" algn="ctr">
+          <a:solidFill>
+            <a:schemeClr val="phClr"/>
+          </a:solidFill>
+          <a:prstDash val="solid"/>
+        </a:ln>
+      </a:lnStyleLst>
+      <a:effectStyleLst>
+        <a:effectStyle>
+          <a:effectLst>
+            <a:outerShdw blurRad="40000" dist="20000" dir="5400000" rotWithShape="0">
+              <a:srgbClr val="000000">
+                <a:alpha val="38000"/>
+              </a:srgbClr>
+            </a:outerShdw>
+          </a:effectLst>
+        </a:effectStyle>
+        <a:effectStyle>
+          <a:effectLst>
+            <a:outerShdw blurRad="40000" dist="23000" dir="5400000" rotWithShape="0">
+              <a:srgbClr val="000000">
+                <a:alpha val="35000"/>
+              </a:srgbClr>
+            </a:outerShdw>
+          </a:effectLst>
+        </a:effectStyle>
+        <a:effectStyle>
+          <a:effectLst>
+            <a:outerShdw blurRad="40000" dist="23000" dir="5400000" rotWithShape="0">
+              <a:srgbClr val="000000">
+                <a:alpha val="35000"/>
+              </a:srgbClr>
+            </a:outerShdw>
+          </a:effectLst>
+          <a:scene3d>
+            <a:camera prst="orthographicFront">
+              <a:rot lat="0" lon="0" rev="0"/>
+            </a:camera>
+            <a:lightRig rig="threePt" dir="t">
+              <a:rot lat="0" lon="0" rev="1200000"/>
+            </a:lightRig>
+          </a:scene3d>
+          <a:sp3d>
+            <a:bevelT w="63500" h="25400"/>
+          </a:sp3d>
+        </a:effectStyle>
+      </a:effectStyleLst>
+      <a:bgFillStyleLst>
+        <a:solidFill>
+          <a:schemeClr val="phClr"/>
+        </a:solidFill>
+        <a:gradFill rotWithShape="1">
+          <a:gsLst>
+            <a:gs pos="0">
+              <a:schemeClr val="phClr">
+                <a:tint val="40000"/>
+                <a:satMod val="350000"/>
+              </a:schemeClr>
+            </a:gs>
+            <a:gs pos="40000">
+              <a:schemeClr val="phClr">
+                <a:tint val="45000"/>
+                <a:shade val="99000"/>
+                <a:satMod val="350000"/>
+              </a:schemeClr>
+            </a:gs>
+            <a:gs pos="100000">
+              <a:schemeClr val="phClr">
+                <a:shade val="20000"/>
+                <a:satMod val="255000"/>
+              </a:schemeClr>
+            </a:gs>
+          </a:gsLst>
+          <a:path path="circle">
+            <a:fillToRect l="50000" t="-80000" r="50000" b="180000"/>
+          </a:path>
+        </a:gradFill>
+        <a:gradFill rotWithShape="1">
+          <a:gsLst>
+            <a:gs pos="0">
+              <a:schemeClr val="phClr">
+                <a:tint val="80000"/>
+                <a:satMod val="300000"/>
+              </a:schemeClr>
+            </a:gs>
+            <a:gs pos="100000">
+              <a:schemeClr val="phClr">
+                <a:shade val="30000"/>
+                <a:satMod val="200000"/>
+              </a:schemeClr>
+            </a:gs>
+          </a:gsLst>
+          <a:path path="circle">
+            <a:fillToRect l="50000" t="50000" r="50000" b="50000"/>
+          </a:path>
+        </a:gradFill>
+      </a:bgFillStyleLst>
+    </a:fmtScheme>
+  </a:themeElements>
+</a:theme>
 </file>
</xml_diff>

<commit_message>
maj des docs + export pdf
</commit_message>
<xml_diff>
--- a/diapo_presentation_solution.pptx
+++ b/diapo_presentation_solution.pptx
@@ -17,7 +17,7 @@
     <p:sldId id="263" r:id="rId12"/>
   </p:sldIdLst>
   <p:sldSz cx="10080625" cy="7559675"/>
-  <p:notesSz cx="7772400" cy="10058400"/>
+  <p:notesSz cx="7559675" cy="10691812"/>
 </p:presentation>
 </file>
 
@@ -81,11 +81,11 @@
         </p:spPr>
         <p:txBody>
           <a:bodyPr lIns="0" rIns="0" tIns="0" bIns="0" anchor="ctr">
-            <a:spAutoFit/>
+            <a:noAutofit/>
           </a:bodyPr>
           <a:p>
             <a:pPr algn="ctr"/>
-            <a:endParaRPr b="0" lang="en-US" sz="4400" spc="-1" strike="noStrike">
+            <a:endParaRPr b="0" lang="fr-FR" sz="4400" spc="-1" strike="noStrike">
               <a:latin typeface="Arial"/>
             </a:endParaRPr>
           </a:p>
@@ -115,7 +115,7 @@
             <a:normAutofit/>
           </a:bodyPr>
           <a:p>
-            <a:endParaRPr b="0" lang="en-US" sz="3200" spc="-1" strike="noStrike">
+            <a:endParaRPr b="0" lang="fr-FR" sz="3200" spc="-1" strike="noStrike">
               <a:latin typeface="Arial"/>
             </a:endParaRPr>
           </a:p>
@@ -145,7 +145,7 @@
             <a:normAutofit/>
           </a:bodyPr>
           <a:p>
-            <a:endParaRPr b="0" lang="en-US" sz="3200" spc="-1" strike="noStrike">
+            <a:endParaRPr b="0" lang="fr-FR" sz="3200" spc="-1" strike="noStrike">
               <a:latin typeface="Arial"/>
             </a:endParaRPr>
           </a:p>
@@ -194,11 +194,11 @@
         </p:spPr>
         <p:txBody>
           <a:bodyPr lIns="0" rIns="0" tIns="0" bIns="0" anchor="ctr">
-            <a:spAutoFit/>
+            <a:noAutofit/>
           </a:bodyPr>
           <a:p>
             <a:pPr algn="ctr"/>
-            <a:endParaRPr b="0" lang="en-US" sz="4400" spc="-1" strike="noStrike">
+            <a:endParaRPr b="0" lang="fr-FR" sz="4400" spc="-1" strike="noStrike">
               <a:latin typeface="Arial"/>
             </a:endParaRPr>
           </a:p>
@@ -228,7 +228,7 @@
             <a:normAutofit/>
           </a:bodyPr>
           <a:p>
-            <a:endParaRPr b="0" lang="en-US" sz="3200" spc="-1" strike="noStrike">
+            <a:endParaRPr b="0" lang="fr-FR" sz="3200" spc="-1" strike="noStrike">
               <a:latin typeface="Arial"/>
             </a:endParaRPr>
           </a:p>
@@ -258,7 +258,7 @@
             <a:normAutofit/>
           </a:bodyPr>
           <a:p>
-            <a:endParaRPr b="0" lang="en-US" sz="3200" spc="-1" strike="noStrike">
+            <a:endParaRPr b="0" lang="fr-FR" sz="3200" spc="-1" strike="noStrike">
               <a:latin typeface="Arial"/>
             </a:endParaRPr>
           </a:p>
@@ -288,7 +288,7 @@
             <a:normAutofit/>
           </a:bodyPr>
           <a:p>
-            <a:endParaRPr b="0" lang="en-US" sz="3200" spc="-1" strike="noStrike">
+            <a:endParaRPr b="0" lang="fr-FR" sz="3200" spc="-1" strike="noStrike">
               <a:latin typeface="Arial"/>
             </a:endParaRPr>
           </a:p>
@@ -318,7 +318,7 @@
             <a:normAutofit/>
           </a:bodyPr>
           <a:p>
-            <a:endParaRPr b="0" lang="en-US" sz="3200" spc="-1" strike="noStrike">
+            <a:endParaRPr b="0" lang="fr-FR" sz="3200" spc="-1" strike="noStrike">
               <a:latin typeface="Arial"/>
             </a:endParaRPr>
           </a:p>
@@ -367,11 +367,11 @@
         </p:spPr>
         <p:txBody>
           <a:bodyPr lIns="0" rIns="0" tIns="0" bIns="0" anchor="ctr">
-            <a:spAutoFit/>
+            <a:noAutofit/>
           </a:bodyPr>
           <a:p>
             <a:pPr algn="ctr"/>
-            <a:endParaRPr b="0" lang="en-US" sz="4400" spc="-1" strike="noStrike">
+            <a:endParaRPr b="0" lang="fr-FR" sz="4400" spc="-1" strike="noStrike">
               <a:latin typeface="Arial"/>
             </a:endParaRPr>
           </a:p>
@@ -401,7 +401,7 @@
             <a:normAutofit/>
           </a:bodyPr>
           <a:p>
-            <a:endParaRPr b="0" lang="en-US" sz="3200" spc="-1" strike="noStrike">
+            <a:endParaRPr b="0" lang="fr-FR" sz="3200" spc="-1" strike="noStrike">
               <a:latin typeface="Arial"/>
             </a:endParaRPr>
           </a:p>
@@ -431,7 +431,7 @@
             <a:normAutofit/>
           </a:bodyPr>
           <a:p>
-            <a:endParaRPr b="0" lang="en-US" sz="3200" spc="-1" strike="noStrike">
+            <a:endParaRPr b="0" lang="fr-FR" sz="3200" spc="-1" strike="noStrike">
               <a:latin typeface="Arial"/>
             </a:endParaRPr>
           </a:p>
@@ -461,7 +461,7 @@
             <a:normAutofit/>
           </a:bodyPr>
           <a:p>
-            <a:endParaRPr b="0" lang="en-US" sz="3200" spc="-1" strike="noStrike">
+            <a:endParaRPr b="0" lang="fr-FR" sz="3200" spc="-1" strike="noStrike">
               <a:latin typeface="Arial"/>
             </a:endParaRPr>
           </a:p>
@@ -491,7 +491,7 @@
             <a:normAutofit/>
           </a:bodyPr>
           <a:p>
-            <a:endParaRPr b="0" lang="en-US" sz="3200" spc="-1" strike="noStrike">
+            <a:endParaRPr b="0" lang="fr-FR" sz="3200" spc="-1" strike="noStrike">
               <a:latin typeface="Arial"/>
             </a:endParaRPr>
           </a:p>
@@ -521,7 +521,7 @@
             <a:normAutofit/>
           </a:bodyPr>
           <a:p>
-            <a:endParaRPr b="0" lang="en-US" sz="3200" spc="-1" strike="noStrike">
+            <a:endParaRPr b="0" lang="fr-FR" sz="3200" spc="-1" strike="noStrike">
               <a:latin typeface="Arial"/>
             </a:endParaRPr>
           </a:p>
@@ -551,7 +551,7 @@
             <a:normAutofit/>
           </a:bodyPr>
           <a:p>
-            <a:endParaRPr b="0" lang="en-US" sz="3200" spc="-1" strike="noStrike">
+            <a:endParaRPr b="0" lang="fr-FR" sz="3200" spc="-1" strike="noStrike">
               <a:latin typeface="Arial"/>
             </a:endParaRPr>
           </a:p>
@@ -622,11 +622,11 @@
         </p:spPr>
         <p:txBody>
           <a:bodyPr lIns="0" rIns="0" tIns="0" bIns="0" anchor="ctr">
-            <a:spAutoFit/>
+            <a:noAutofit/>
           </a:bodyPr>
           <a:p>
             <a:pPr algn="ctr"/>
-            <a:endParaRPr b="0" lang="en-US" sz="4400" spc="-1" strike="noStrike">
+            <a:endParaRPr b="0" lang="fr-FR" sz="4400" spc="-1" strike="noStrike">
               <a:latin typeface="Arial"/>
             </a:endParaRPr>
           </a:p>
@@ -653,11 +653,11 @@
         </p:spPr>
         <p:txBody>
           <a:bodyPr lIns="0" rIns="0" tIns="0" bIns="0" anchor="ctr">
-            <a:spAutoFit/>
+            <a:noAutofit/>
           </a:bodyPr>
           <a:p>
             <a:pPr algn="ctr"/>
-            <a:endParaRPr b="0" lang="en-US" sz="3200" spc="-1" strike="noStrike">
+            <a:endParaRPr b="0" lang="fr-FR" sz="3200" spc="-1" strike="noStrike">
               <a:latin typeface="Arial"/>
             </a:endParaRPr>
           </a:p>
@@ -706,11 +706,11 @@
         </p:spPr>
         <p:txBody>
           <a:bodyPr lIns="0" rIns="0" tIns="0" bIns="0" anchor="ctr">
-            <a:spAutoFit/>
+            <a:noAutofit/>
           </a:bodyPr>
           <a:p>
             <a:pPr algn="ctr"/>
-            <a:endParaRPr b="0" lang="en-US" sz="4400" spc="-1" strike="noStrike">
+            <a:endParaRPr b="0" lang="fr-FR" sz="4400" spc="-1" strike="noStrike">
               <a:latin typeface="Arial"/>
             </a:endParaRPr>
           </a:p>
@@ -740,7 +740,7 @@
             <a:normAutofit/>
           </a:bodyPr>
           <a:p>
-            <a:endParaRPr b="0" lang="en-US" sz="3200" spc="-1" strike="noStrike">
+            <a:endParaRPr b="0" lang="fr-FR" sz="3200" spc="-1" strike="noStrike">
               <a:latin typeface="Arial"/>
             </a:endParaRPr>
           </a:p>
@@ -789,11 +789,11 @@
         </p:spPr>
         <p:txBody>
           <a:bodyPr lIns="0" rIns="0" tIns="0" bIns="0" anchor="ctr">
-            <a:spAutoFit/>
+            <a:noAutofit/>
           </a:bodyPr>
           <a:p>
             <a:pPr algn="ctr"/>
-            <a:endParaRPr b="0" lang="en-US" sz="4400" spc="-1" strike="noStrike">
+            <a:endParaRPr b="0" lang="fr-FR" sz="4400" spc="-1" strike="noStrike">
               <a:latin typeface="Arial"/>
             </a:endParaRPr>
           </a:p>
@@ -823,7 +823,7 @@
             <a:normAutofit/>
           </a:bodyPr>
           <a:p>
-            <a:endParaRPr b="0" lang="en-US" sz="3200" spc="-1" strike="noStrike">
+            <a:endParaRPr b="0" lang="fr-FR" sz="3200" spc="-1" strike="noStrike">
               <a:latin typeface="Arial"/>
             </a:endParaRPr>
           </a:p>
@@ -853,7 +853,7 @@
             <a:normAutofit/>
           </a:bodyPr>
           <a:p>
-            <a:endParaRPr b="0" lang="en-US" sz="3200" spc="-1" strike="noStrike">
+            <a:endParaRPr b="0" lang="fr-FR" sz="3200" spc="-1" strike="noStrike">
               <a:latin typeface="Arial"/>
             </a:endParaRPr>
           </a:p>
@@ -902,11 +902,11 @@
         </p:spPr>
         <p:txBody>
           <a:bodyPr lIns="0" rIns="0" tIns="0" bIns="0" anchor="ctr">
-            <a:spAutoFit/>
+            <a:noAutofit/>
           </a:bodyPr>
           <a:p>
             <a:pPr algn="ctr"/>
-            <a:endParaRPr b="0" lang="en-US" sz="4400" spc="-1" strike="noStrike">
+            <a:endParaRPr b="0" lang="fr-FR" sz="4400" spc="-1" strike="noStrike">
               <a:latin typeface="Arial"/>
             </a:endParaRPr>
           </a:p>
@@ -955,11 +955,11 @@
         </p:spPr>
         <p:txBody>
           <a:bodyPr lIns="0" rIns="0" tIns="0" bIns="0" anchor="ctr">
-            <a:spAutoFit/>
+            <a:noAutofit/>
           </a:bodyPr>
           <a:p>
             <a:pPr algn="ctr"/>
-            <a:endParaRPr b="0" lang="en-US" sz="3200" spc="-1" strike="noStrike">
+            <a:endParaRPr b="0" lang="fr-FR" sz="3200" spc="-1" strike="noStrike">
               <a:latin typeface="Arial"/>
             </a:endParaRPr>
           </a:p>
@@ -1008,11 +1008,11 @@
         </p:spPr>
         <p:txBody>
           <a:bodyPr lIns="0" rIns="0" tIns="0" bIns="0" anchor="ctr">
-            <a:spAutoFit/>
+            <a:noAutofit/>
           </a:bodyPr>
           <a:p>
             <a:pPr algn="ctr"/>
-            <a:endParaRPr b="0" lang="en-US" sz="4400" spc="-1" strike="noStrike">
+            <a:endParaRPr b="0" lang="fr-FR" sz="4400" spc="-1" strike="noStrike">
               <a:latin typeface="Arial"/>
             </a:endParaRPr>
           </a:p>
@@ -1042,7 +1042,7 @@
             <a:normAutofit/>
           </a:bodyPr>
           <a:p>
-            <a:endParaRPr b="0" lang="en-US" sz="3200" spc="-1" strike="noStrike">
+            <a:endParaRPr b="0" lang="fr-FR" sz="3200" spc="-1" strike="noStrike">
               <a:latin typeface="Arial"/>
             </a:endParaRPr>
           </a:p>
@@ -1072,7 +1072,7 @@
             <a:normAutofit/>
           </a:bodyPr>
           <a:p>
-            <a:endParaRPr b="0" lang="en-US" sz="3200" spc="-1" strike="noStrike">
+            <a:endParaRPr b="0" lang="fr-FR" sz="3200" spc="-1" strike="noStrike">
               <a:latin typeface="Arial"/>
             </a:endParaRPr>
           </a:p>
@@ -1102,7 +1102,7 @@
             <a:normAutofit/>
           </a:bodyPr>
           <a:p>
-            <a:endParaRPr b="0" lang="en-US" sz="3200" spc="-1" strike="noStrike">
+            <a:endParaRPr b="0" lang="fr-FR" sz="3200" spc="-1" strike="noStrike">
               <a:latin typeface="Arial"/>
             </a:endParaRPr>
           </a:p>
@@ -1151,11 +1151,11 @@
         </p:spPr>
         <p:txBody>
           <a:bodyPr lIns="0" rIns="0" tIns="0" bIns="0" anchor="ctr">
-            <a:spAutoFit/>
+            <a:noAutofit/>
           </a:bodyPr>
           <a:p>
             <a:pPr algn="ctr"/>
-            <a:endParaRPr b="0" lang="en-US" sz="4400" spc="-1" strike="noStrike">
+            <a:endParaRPr b="0" lang="fr-FR" sz="4400" spc="-1" strike="noStrike">
               <a:latin typeface="Arial"/>
             </a:endParaRPr>
           </a:p>
@@ -1182,11 +1182,11 @@
         </p:spPr>
         <p:txBody>
           <a:bodyPr lIns="0" rIns="0" tIns="0" bIns="0" anchor="ctr">
-            <a:spAutoFit/>
+            <a:noAutofit/>
           </a:bodyPr>
           <a:p>
             <a:pPr algn="ctr"/>
-            <a:endParaRPr b="0" lang="en-US" sz="3200" spc="-1" strike="noStrike">
+            <a:endParaRPr b="0" lang="fr-FR" sz="3200" spc="-1" strike="noStrike">
               <a:latin typeface="Arial"/>
             </a:endParaRPr>
           </a:p>
@@ -1235,11 +1235,11 @@
         </p:spPr>
         <p:txBody>
           <a:bodyPr lIns="0" rIns="0" tIns="0" bIns="0" anchor="ctr">
-            <a:spAutoFit/>
+            <a:noAutofit/>
           </a:bodyPr>
           <a:p>
             <a:pPr algn="ctr"/>
-            <a:endParaRPr b="0" lang="en-US" sz="4400" spc="-1" strike="noStrike">
+            <a:endParaRPr b="0" lang="fr-FR" sz="4400" spc="-1" strike="noStrike">
               <a:latin typeface="Arial"/>
             </a:endParaRPr>
           </a:p>
@@ -1269,7 +1269,7 @@
             <a:normAutofit/>
           </a:bodyPr>
           <a:p>
-            <a:endParaRPr b="0" lang="en-US" sz="3200" spc="-1" strike="noStrike">
+            <a:endParaRPr b="0" lang="fr-FR" sz="3200" spc="-1" strike="noStrike">
               <a:latin typeface="Arial"/>
             </a:endParaRPr>
           </a:p>
@@ -1299,7 +1299,7 @@
             <a:normAutofit/>
           </a:bodyPr>
           <a:p>
-            <a:endParaRPr b="0" lang="en-US" sz="3200" spc="-1" strike="noStrike">
+            <a:endParaRPr b="0" lang="fr-FR" sz="3200" spc="-1" strike="noStrike">
               <a:latin typeface="Arial"/>
             </a:endParaRPr>
           </a:p>
@@ -1329,7 +1329,7 @@
             <a:normAutofit/>
           </a:bodyPr>
           <a:p>
-            <a:endParaRPr b="0" lang="en-US" sz="3200" spc="-1" strike="noStrike">
+            <a:endParaRPr b="0" lang="fr-FR" sz="3200" spc="-1" strike="noStrike">
               <a:latin typeface="Arial"/>
             </a:endParaRPr>
           </a:p>
@@ -1378,11 +1378,11 @@
         </p:spPr>
         <p:txBody>
           <a:bodyPr lIns="0" rIns="0" tIns="0" bIns="0" anchor="ctr">
-            <a:spAutoFit/>
+            <a:noAutofit/>
           </a:bodyPr>
           <a:p>
             <a:pPr algn="ctr"/>
-            <a:endParaRPr b="0" lang="en-US" sz="4400" spc="-1" strike="noStrike">
+            <a:endParaRPr b="0" lang="fr-FR" sz="4400" spc="-1" strike="noStrike">
               <a:latin typeface="Arial"/>
             </a:endParaRPr>
           </a:p>
@@ -1412,7 +1412,7 @@
             <a:normAutofit/>
           </a:bodyPr>
           <a:p>
-            <a:endParaRPr b="0" lang="en-US" sz="3200" spc="-1" strike="noStrike">
+            <a:endParaRPr b="0" lang="fr-FR" sz="3200" spc="-1" strike="noStrike">
               <a:latin typeface="Arial"/>
             </a:endParaRPr>
           </a:p>
@@ -1442,7 +1442,7 @@
             <a:normAutofit/>
           </a:bodyPr>
           <a:p>
-            <a:endParaRPr b="0" lang="en-US" sz="3200" spc="-1" strike="noStrike">
+            <a:endParaRPr b="0" lang="fr-FR" sz="3200" spc="-1" strike="noStrike">
               <a:latin typeface="Arial"/>
             </a:endParaRPr>
           </a:p>
@@ -1472,7 +1472,7 @@
             <a:normAutofit/>
           </a:bodyPr>
           <a:p>
-            <a:endParaRPr b="0" lang="en-US" sz="3200" spc="-1" strike="noStrike">
+            <a:endParaRPr b="0" lang="fr-FR" sz="3200" spc="-1" strike="noStrike">
               <a:latin typeface="Arial"/>
             </a:endParaRPr>
           </a:p>
@@ -1521,11 +1521,11 @@
         </p:spPr>
         <p:txBody>
           <a:bodyPr lIns="0" rIns="0" tIns="0" bIns="0" anchor="ctr">
-            <a:spAutoFit/>
+            <a:noAutofit/>
           </a:bodyPr>
           <a:p>
             <a:pPr algn="ctr"/>
-            <a:endParaRPr b="0" lang="en-US" sz="4400" spc="-1" strike="noStrike">
+            <a:endParaRPr b="0" lang="fr-FR" sz="4400" spc="-1" strike="noStrike">
               <a:latin typeface="Arial"/>
             </a:endParaRPr>
           </a:p>
@@ -1555,7 +1555,7 @@
             <a:normAutofit/>
           </a:bodyPr>
           <a:p>
-            <a:endParaRPr b="0" lang="en-US" sz="3200" spc="-1" strike="noStrike">
+            <a:endParaRPr b="0" lang="fr-FR" sz="3200" spc="-1" strike="noStrike">
               <a:latin typeface="Arial"/>
             </a:endParaRPr>
           </a:p>
@@ -1585,7 +1585,7 @@
             <a:normAutofit/>
           </a:bodyPr>
           <a:p>
-            <a:endParaRPr b="0" lang="en-US" sz="3200" spc="-1" strike="noStrike">
+            <a:endParaRPr b="0" lang="fr-FR" sz="3200" spc="-1" strike="noStrike">
               <a:latin typeface="Arial"/>
             </a:endParaRPr>
           </a:p>
@@ -1634,11 +1634,11 @@
         </p:spPr>
         <p:txBody>
           <a:bodyPr lIns="0" rIns="0" tIns="0" bIns="0" anchor="ctr">
-            <a:spAutoFit/>
+            <a:noAutofit/>
           </a:bodyPr>
           <a:p>
             <a:pPr algn="ctr"/>
-            <a:endParaRPr b="0" lang="en-US" sz="4400" spc="-1" strike="noStrike">
+            <a:endParaRPr b="0" lang="fr-FR" sz="4400" spc="-1" strike="noStrike">
               <a:latin typeface="Arial"/>
             </a:endParaRPr>
           </a:p>
@@ -1668,7 +1668,7 @@
             <a:normAutofit/>
           </a:bodyPr>
           <a:p>
-            <a:endParaRPr b="0" lang="en-US" sz="3200" spc="-1" strike="noStrike">
+            <a:endParaRPr b="0" lang="fr-FR" sz="3200" spc="-1" strike="noStrike">
               <a:latin typeface="Arial"/>
             </a:endParaRPr>
           </a:p>
@@ -1698,7 +1698,7 @@
             <a:normAutofit/>
           </a:bodyPr>
           <a:p>
-            <a:endParaRPr b="0" lang="en-US" sz="3200" spc="-1" strike="noStrike">
+            <a:endParaRPr b="0" lang="fr-FR" sz="3200" spc="-1" strike="noStrike">
               <a:latin typeface="Arial"/>
             </a:endParaRPr>
           </a:p>
@@ -1728,7 +1728,7 @@
             <a:normAutofit/>
           </a:bodyPr>
           <a:p>
-            <a:endParaRPr b="0" lang="en-US" sz="3200" spc="-1" strike="noStrike">
+            <a:endParaRPr b="0" lang="fr-FR" sz="3200" spc="-1" strike="noStrike">
               <a:latin typeface="Arial"/>
             </a:endParaRPr>
           </a:p>
@@ -1758,7 +1758,7 @@
             <a:normAutofit/>
           </a:bodyPr>
           <a:p>
-            <a:endParaRPr b="0" lang="en-US" sz="3200" spc="-1" strike="noStrike">
+            <a:endParaRPr b="0" lang="fr-FR" sz="3200" spc="-1" strike="noStrike">
               <a:latin typeface="Arial"/>
             </a:endParaRPr>
           </a:p>
@@ -1807,11 +1807,11 @@
         </p:spPr>
         <p:txBody>
           <a:bodyPr lIns="0" rIns="0" tIns="0" bIns="0" anchor="ctr">
-            <a:spAutoFit/>
+            <a:noAutofit/>
           </a:bodyPr>
           <a:p>
             <a:pPr algn="ctr"/>
-            <a:endParaRPr b="0" lang="en-US" sz="4400" spc="-1" strike="noStrike">
+            <a:endParaRPr b="0" lang="fr-FR" sz="4400" spc="-1" strike="noStrike">
               <a:latin typeface="Arial"/>
             </a:endParaRPr>
           </a:p>
@@ -1841,7 +1841,7 @@
             <a:normAutofit/>
           </a:bodyPr>
           <a:p>
-            <a:endParaRPr b="0" lang="en-US" sz="3200" spc="-1" strike="noStrike">
+            <a:endParaRPr b="0" lang="fr-FR" sz="3200" spc="-1" strike="noStrike">
               <a:latin typeface="Arial"/>
             </a:endParaRPr>
           </a:p>
@@ -1871,7 +1871,7 @@
             <a:normAutofit/>
           </a:bodyPr>
           <a:p>
-            <a:endParaRPr b="0" lang="en-US" sz="3200" spc="-1" strike="noStrike">
+            <a:endParaRPr b="0" lang="fr-FR" sz="3200" spc="-1" strike="noStrike">
               <a:latin typeface="Arial"/>
             </a:endParaRPr>
           </a:p>
@@ -1901,7 +1901,7 @@
             <a:normAutofit/>
           </a:bodyPr>
           <a:p>
-            <a:endParaRPr b="0" lang="en-US" sz="3200" spc="-1" strike="noStrike">
+            <a:endParaRPr b="0" lang="fr-FR" sz="3200" spc="-1" strike="noStrike">
               <a:latin typeface="Arial"/>
             </a:endParaRPr>
           </a:p>
@@ -1931,7 +1931,7 @@
             <a:normAutofit/>
           </a:bodyPr>
           <a:p>
-            <a:endParaRPr b="0" lang="en-US" sz="3200" spc="-1" strike="noStrike">
+            <a:endParaRPr b="0" lang="fr-FR" sz="3200" spc="-1" strike="noStrike">
               <a:latin typeface="Arial"/>
             </a:endParaRPr>
           </a:p>
@@ -1961,7 +1961,7 @@
             <a:normAutofit/>
           </a:bodyPr>
           <a:p>
-            <a:endParaRPr b="0" lang="en-US" sz="3200" spc="-1" strike="noStrike">
+            <a:endParaRPr b="0" lang="fr-FR" sz="3200" spc="-1" strike="noStrike">
               <a:latin typeface="Arial"/>
             </a:endParaRPr>
           </a:p>
@@ -1991,7 +1991,7 @@
             <a:normAutofit/>
           </a:bodyPr>
           <a:p>
-            <a:endParaRPr b="0" lang="en-US" sz="3200" spc="-1" strike="noStrike">
+            <a:endParaRPr b="0" lang="fr-FR" sz="3200" spc="-1" strike="noStrike">
               <a:latin typeface="Arial"/>
             </a:endParaRPr>
           </a:p>
@@ -2062,11 +2062,11 @@
         </p:spPr>
         <p:txBody>
           <a:bodyPr lIns="0" rIns="0" tIns="0" bIns="0" anchor="ctr">
-            <a:spAutoFit/>
+            <a:noAutofit/>
           </a:bodyPr>
           <a:p>
             <a:pPr algn="ctr"/>
-            <a:endParaRPr b="0" lang="en-US" sz="4400" spc="-1" strike="noStrike">
+            <a:endParaRPr b="0" lang="fr-FR" sz="4400" spc="-1" strike="noStrike">
               <a:latin typeface="Arial"/>
             </a:endParaRPr>
           </a:p>
@@ -2093,11 +2093,11 @@
         </p:spPr>
         <p:txBody>
           <a:bodyPr lIns="0" rIns="0" tIns="0" bIns="0" anchor="ctr">
-            <a:spAutoFit/>
+            <a:noAutofit/>
           </a:bodyPr>
           <a:p>
             <a:pPr algn="ctr"/>
-            <a:endParaRPr b="0" lang="en-US" sz="3200" spc="-1" strike="noStrike">
+            <a:endParaRPr b="0" lang="fr-FR" sz="3200" spc="-1" strike="noStrike">
               <a:latin typeface="Arial"/>
             </a:endParaRPr>
           </a:p>
@@ -2146,11 +2146,11 @@
         </p:spPr>
         <p:txBody>
           <a:bodyPr lIns="0" rIns="0" tIns="0" bIns="0" anchor="ctr">
-            <a:spAutoFit/>
+            <a:noAutofit/>
           </a:bodyPr>
           <a:p>
             <a:pPr algn="ctr"/>
-            <a:endParaRPr b="0" lang="en-US" sz="4400" spc="-1" strike="noStrike">
+            <a:endParaRPr b="0" lang="fr-FR" sz="4400" spc="-1" strike="noStrike">
               <a:latin typeface="Arial"/>
             </a:endParaRPr>
           </a:p>
@@ -2180,7 +2180,7 @@
             <a:normAutofit/>
           </a:bodyPr>
           <a:p>
-            <a:endParaRPr b="0" lang="en-US" sz="3200" spc="-1" strike="noStrike">
+            <a:endParaRPr b="0" lang="fr-FR" sz="3200" spc="-1" strike="noStrike">
               <a:latin typeface="Arial"/>
             </a:endParaRPr>
           </a:p>
@@ -2229,11 +2229,11 @@
         </p:spPr>
         <p:txBody>
           <a:bodyPr lIns="0" rIns="0" tIns="0" bIns="0" anchor="ctr">
-            <a:spAutoFit/>
+            <a:noAutofit/>
           </a:bodyPr>
           <a:p>
             <a:pPr algn="ctr"/>
-            <a:endParaRPr b="0" lang="en-US" sz="4400" spc="-1" strike="noStrike">
+            <a:endParaRPr b="0" lang="fr-FR" sz="4400" spc="-1" strike="noStrike">
               <a:latin typeface="Arial"/>
             </a:endParaRPr>
           </a:p>
@@ -2263,7 +2263,7 @@
             <a:normAutofit/>
           </a:bodyPr>
           <a:p>
-            <a:endParaRPr b="0" lang="en-US" sz="3200" spc="-1" strike="noStrike">
+            <a:endParaRPr b="0" lang="fr-FR" sz="3200" spc="-1" strike="noStrike">
               <a:latin typeface="Arial"/>
             </a:endParaRPr>
           </a:p>
@@ -2293,7 +2293,7 @@
             <a:normAutofit/>
           </a:bodyPr>
           <a:p>
-            <a:endParaRPr b="0" lang="en-US" sz="3200" spc="-1" strike="noStrike">
+            <a:endParaRPr b="0" lang="fr-FR" sz="3200" spc="-1" strike="noStrike">
               <a:latin typeface="Arial"/>
             </a:endParaRPr>
           </a:p>
@@ -2342,11 +2342,11 @@
         </p:spPr>
         <p:txBody>
           <a:bodyPr lIns="0" rIns="0" tIns="0" bIns="0" anchor="ctr">
-            <a:spAutoFit/>
+            <a:noAutofit/>
           </a:bodyPr>
           <a:p>
             <a:pPr algn="ctr"/>
-            <a:endParaRPr b="0" lang="en-US" sz="4400" spc="-1" strike="noStrike">
+            <a:endParaRPr b="0" lang="fr-FR" sz="4400" spc="-1" strike="noStrike">
               <a:latin typeface="Arial"/>
             </a:endParaRPr>
           </a:p>
@@ -2395,11 +2395,11 @@
         </p:spPr>
         <p:txBody>
           <a:bodyPr lIns="0" rIns="0" tIns="0" bIns="0" anchor="ctr">
-            <a:spAutoFit/>
+            <a:noAutofit/>
           </a:bodyPr>
           <a:p>
             <a:pPr algn="ctr"/>
-            <a:endParaRPr b="0" lang="en-US" sz="4400" spc="-1" strike="noStrike">
+            <a:endParaRPr b="0" lang="fr-FR" sz="4400" spc="-1" strike="noStrike">
               <a:latin typeface="Arial"/>
             </a:endParaRPr>
           </a:p>
@@ -2429,7 +2429,7 @@
             <a:normAutofit/>
           </a:bodyPr>
           <a:p>
-            <a:endParaRPr b="0" lang="en-US" sz="3200" spc="-1" strike="noStrike">
+            <a:endParaRPr b="0" lang="fr-FR" sz="3200" spc="-1" strike="noStrike">
               <a:latin typeface="Arial"/>
             </a:endParaRPr>
           </a:p>
@@ -2478,11 +2478,11 @@
         </p:spPr>
         <p:txBody>
           <a:bodyPr lIns="0" rIns="0" tIns="0" bIns="0" anchor="ctr">
-            <a:spAutoFit/>
+            <a:noAutofit/>
           </a:bodyPr>
           <a:p>
             <a:pPr algn="ctr"/>
-            <a:endParaRPr b="0" lang="en-US" sz="3200" spc="-1" strike="noStrike">
+            <a:endParaRPr b="0" lang="fr-FR" sz="3200" spc="-1" strike="noStrike">
               <a:latin typeface="Arial"/>
             </a:endParaRPr>
           </a:p>
@@ -2531,11 +2531,11 @@
         </p:spPr>
         <p:txBody>
           <a:bodyPr lIns="0" rIns="0" tIns="0" bIns="0" anchor="ctr">
-            <a:spAutoFit/>
+            <a:noAutofit/>
           </a:bodyPr>
           <a:p>
             <a:pPr algn="ctr"/>
-            <a:endParaRPr b="0" lang="en-US" sz="4400" spc="-1" strike="noStrike">
+            <a:endParaRPr b="0" lang="fr-FR" sz="4400" spc="-1" strike="noStrike">
               <a:latin typeface="Arial"/>
             </a:endParaRPr>
           </a:p>
@@ -2565,7 +2565,7 @@
             <a:normAutofit/>
           </a:bodyPr>
           <a:p>
-            <a:endParaRPr b="0" lang="en-US" sz="3200" spc="-1" strike="noStrike">
+            <a:endParaRPr b="0" lang="fr-FR" sz="3200" spc="-1" strike="noStrike">
               <a:latin typeface="Arial"/>
             </a:endParaRPr>
           </a:p>
@@ -2595,7 +2595,7 @@
             <a:normAutofit/>
           </a:bodyPr>
           <a:p>
-            <a:endParaRPr b="0" lang="en-US" sz="3200" spc="-1" strike="noStrike">
+            <a:endParaRPr b="0" lang="fr-FR" sz="3200" spc="-1" strike="noStrike">
               <a:latin typeface="Arial"/>
             </a:endParaRPr>
           </a:p>
@@ -2625,7 +2625,7 @@
             <a:normAutofit/>
           </a:bodyPr>
           <a:p>
-            <a:endParaRPr b="0" lang="en-US" sz="3200" spc="-1" strike="noStrike">
+            <a:endParaRPr b="0" lang="fr-FR" sz="3200" spc="-1" strike="noStrike">
               <a:latin typeface="Arial"/>
             </a:endParaRPr>
           </a:p>
@@ -2674,11 +2674,11 @@
         </p:spPr>
         <p:txBody>
           <a:bodyPr lIns="0" rIns="0" tIns="0" bIns="0" anchor="ctr">
-            <a:spAutoFit/>
+            <a:noAutofit/>
           </a:bodyPr>
           <a:p>
             <a:pPr algn="ctr"/>
-            <a:endParaRPr b="0" lang="en-US" sz="4400" spc="-1" strike="noStrike">
+            <a:endParaRPr b="0" lang="fr-FR" sz="4400" spc="-1" strike="noStrike">
               <a:latin typeface="Arial"/>
             </a:endParaRPr>
           </a:p>
@@ -2708,7 +2708,7 @@
             <a:normAutofit/>
           </a:bodyPr>
           <a:p>
-            <a:endParaRPr b="0" lang="en-US" sz="3200" spc="-1" strike="noStrike">
+            <a:endParaRPr b="0" lang="fr-FR" sz="3200" spc="-1" strike="noStrike">
               <a:latin typeface="Arial"/>
             </a:endParaRPr>
           </a:p>
@@ -2738,7 +2738,7 @@
             <a:normAutofit/>
           </a:bodyPr>
           <a:p>
-            <a:endParaRPr b="0" lang="en-US" sz="3200" spc="-1" strike="noStrike">
+            <a:endParaRPr b="0" lang="fr-FR" sz="3200" spc="-1" strike="noStrike">
               <a:latin typeface="Arial"/>
             </a:endParaRPr>
           </a:p>
@@ -2768,7 +2768,7 @@
             <a:normAutofit/>
           </a:bodyPr>
           <a:p>
-            <a:endParaRPr b="0" lang="en-US" sz="3200" spc="-1" strike="noStrike">
+            <a:endParaRPr b="0" lang="fr-FR" sz="3200" spc="-1" strike="noStrike">
               <a:latin typeface="Arial"/>
             </a:endParaRPr>
           </a:p>
@@ -2817,11 +2817,11 @@
         </p:spPr>
         <p:txBody>
           <a:bodyPr lIns="0" rIns="0" tIns="0" bIns="0" anchor="ctr">
-            <a:spAutoFit/>
+            <a:noAutofit/>
           </a:bodyPr>
           <a:p>
             <a:pPr algn="ctr"/>
-            <a:endParaRPr b="0" lang="en-US" sz="4400" spc="-1" strike="noStrike">
+            <a:endParaRPr b="0" lang="fr-FR" sz="4400" spc="-1" strike="noStrike">
               <a:latin typeface="Arial"/>
             </a:endParaRPr>
           </a:p>
@@ -2851,7 +2851,7 @@
             <a:normAutofit/>
           </a:bodyPr>
           <a:p>
-            <a:endParaRPr b="0" lang="en-US" sz="3200" spc="-1" strike="noStrike">
+            <a:endParaRPr b="0" lang="fr-FR" sz="3200" spc="-1" strike="noStrike">
               <a:latin typeface="Arial"/>
             </a:endParaRPr>
           </a:p>
@@ -2881,7 +2881,7 @@
             <a:normAutofit/>
           </a:bodyPr>
           <a:p>
-            <a:endParaRPr b="0" lang="en-US" sz="3200" spc="-1" strike="noStrike">
+            <a:endParaRPr b="0" lang="fr-FR" sz="3200" spc="-1" strike="noStrike">
               <a:latin typeface="Arial"/>
             </a:endParaRPr>
           </a:p>
@@ -2911,7 +2911,7 @@
             <a:normAutofit/>
           </a:bodyPr>
           <a:p>
-            <a:endParaRPr b="0" lang="en-US" sz="3200" spc="-1" strike="noStrike">
+            <a:endParaRPr b="0" lang="fr-FR" sz="3200" spc="-1" strike="noStrike">
               <a:latin typeface="Arial"/>
             </a:endParaRPr>
           </a:p>
@@ -2960,11 +2960,11 @@
         </p:spPr>
         <p:txBody>
           <a:bodyPr lIns="0" rIns="0" tIns="0" bIns="0" anchor="ctr">
-            <a:spAutoFit/>
+            <a:noAutofit/>
           </a:bodyPr>
           <a:p>
             <a:pPr algn="ctr"/>
-            <a:endParaRPr b="0" lang="en-US" sz="4400" spc="-1" strike="noStrike">
+            <a:endParaRPr b="0" lang="fr-FR" sz="4400" spc="-1" strike="noStrike">
               <a:latin typeface="Arial"/>
             </a:endParaRPr>
           </a:p>
@@ -2994,7 +2994,7 @@
             <a:normAutofit/>
           </a:bodyPr>
           <a:p>
-            <a:endParaRPr b="0" lang="en-US" sz="3200" spc="-1" strike="noStrike">
+            <a:endParaRPr b="0" lang="fr-FR" sz="3200" spc="-1" strike="noStrike">
               <a:latin typeface="Arial"/>
             </a:endParaRPr>
           </a:p>
@@ -3024,7 +3024,7 @@
             <a:normAutofit/>
           </a:bodyPr>
           <a:p>
-            <a:endParaRPr b="0" lang="en-US" sz="3200" spc="-1" strike="noStrike">
+            <a:endParaRPr b="0" lang="fr-FR" sz="3200" spc="-1" strike="noStrike">
               <a:latin typeface="Arial"/>
             </a:endParaRPr>
           </a:p>
@@ -3073,11 +3073,11 @@
         </p:spPr>
         <p:txBody>
           <a:bodyPr lIns="0" rIns="0" tIns="0" bIns="0" anchor="ctr">
-            <a:spAutoFit/>
+            <a:noAutofit/>
           </a:bodyPr>
           <a:p>
             <a:pPr algn="ctr"/>
-            <a:endParaRPr b="0" lang="en-US" sz="4400" spc="-1" strike="noStrike">
+            <a:endParaRPr b="0" lang="fr-FR" sz="4400" spc="-1" strike="noStrike">
               <a:latin typeface="Arial"/>
             </a:endParaRPr>
           </a:p>
@@ -3107,7 +3107,7 @@
             <a:normAutofit/>
           </a:bodyPr>
           <a:p>
-            <a:endParaRPr b="0" lang="en-US" sz="3200" spc="-1" strike="noStrike">
+            <a:endParaRPr b="0" lang="fr-FR" sz="3200" spc="-1" strike="noStrike">
               <a:latin typeface="Arial"/>
             </a:endParaRPr>
           </a:p>
@@ -3137,7 +3137,7 @@
             <a:normAutofit/>
           </a:bodyPr>
           <a:p>
-            <a:endParaRPr b="0" lang="en-US" sz="3200" spc="-1" strike="noStrike">
+            <a:endParaRPr b="0" lang="fr-FR" sz="3200" spc="-1" strike="noStrike">
               <a:latin typeface="Arial"/>
             </a:endParaRPr>
           </a:p>
@@ -3167,7 +3167,7 @@
             <a:normAutofit/>
           </a:bodyPr>
           <a:p>
-            <a:endParaRPr b="0" lang="en-US" sz="3200" spc="-1" strike="noStrike">
+            <a:endParaRPr b="0" lang="fr-FR" sz="3200" spc="-1" strike="noStrike">
               <a:latin typeface="Arial"/>
             </a:endParaRPr>
           </a:p>
@@ -3197,7 +3197,7 @@
             <a:normAutofit/>
           </a:bodyPr>
           <a:p>
-            <a:endParaRPr b="0" lang="en-US" sz="3200" spc="-1" strike="noStrike">
+            <a:endParaRPr b="0" lang="fr-FR" sz="3200" spc="-1" strike="noStrike">
               <a:latin typeface="Arial"/>
             </a:endParaRPr>
           </a:p>
@@ -3246,11 +3246,11 @@
         </p:spPr>
         <p:txBody>
           <a:bodyPr lIns="0" rIns="0" tIns="0" bIns="0" anchor="ctr">
-            <a:spAutoFit/>
+            <a:noAutofit/>
           </a:bodyPr>
           <a:p>
             <a:pPr algn="ctr"/>
-            <a:endParaRPr b="0" lang="en-US" sz="4400" spc="-1" strike="noStrike">
+            <a:endParaRPr b="0" lang="fr-FR" sz="4400" spc="-1" strike="noStrike">
               <a:latin typeface="Arial"/>
             </a:endParaRPr>
           </a:p>
@@ -3280,7 +3280,7 @@
             <a:normAutofit/>
           </a:bodyPr>
           <a:p>
-            <a:endParaRPr b="0" lang="en-US" sz="3200" spc="-1" strike="noStrike">
+            <a:endParaRPr b="0" lang="fr-FR" sz="3200" spc="-1" strike="noStrike">
               <a:latin typeface="Arial"/>
             </a:endParaRPr>
           </a:p>
@@ -3310,7 +3310,7 @@
             <a:normAutofit/>
           </a:bodyPr>
           <a:p>
-            <a:endParaRPr b="0" lang="en-US" sz="3200" spc="-1" strike="noStrike">
+            <a:endParaRPr b="0" lang="fr-FR" sz="3200" spc="-1" strike="noStrike">
               <a:latin typeface="Arial"/>
             </a:endParaRPr>
           </a:p>
@@ -3340,7 +3340,7 @@
             <a:normAutofit/>
           </a:bodyPr>
           <a:p>
-            <a:endParaRPr b="0" lang="en-US" sz="3200" spc="-1" strike="noStrike">
+            <a:endParaRPr b="0" lang="fr-FR" sz="3200" spc="-1" strike="noStrike">
               <a:latin typeface="Arial"/>
             </a:endParaRPr>
           </a:p>
@@ -3370,7 +3370,7 @@
             <a:normAutofit/>
           </a:bodyPr>
           <a:p>
-            <a:endParaRPr b="0" lang="en-US" sz="3200" spc="-1" strike="noStrike">
+            <a:endParaRPr b="0" lang="fr-FR" sz="3200" spc="-1" strike="noStrike">
               <a:latin typeface="Arial"/>
             </a:endParaRPr>
           </a:p>
@@ -3400,7 +3400,7 @@
             <a:normAutofit/>
           </a:bodyPr>
           <a:p>
-            <a:endParaRPr b="0" lang="en-US" sz="3200" spc="-1" strike="noStrike">
+            <a:endParaRPr b="0" lang="fr-FR" sz="3200" spc="-1" strike="noStrike">
               <a:latin typeface="Arial"/>
             </a:endParaRPr>
           </a:p>
@@ -3430,7 +3430,7 @@
             <a:normAutofit/>
           </a:bodyPr>
           <a:p>
-            <a:endParaRPr b="0" lang="en-US" sz="3200" spc="-1" strike="noStrike">
+            <a:endParaRPr b="0" lang="fr-FR" sz="3200" spc="-1" strike="noStrike">
               <a:latin typeface="Arial"/>
             </a:endParaRPr>
           </a:p>
@@ -3479,11 +3479,11 @@
         </p:spPr>
         <p:txBody>
           <a:bodyPr lIns="0" rIns="0" tIns="0" bIns="0" anchor="ctr">
-            <a:spAutoFit/>
+            <a:noAutofit/>
           </a:bodyPr>
           <a:p>
             <a:pPr algn="ctr"/>
-            <a:endParaRPr b="0" lang="en-US" sz="4400" spc="-1" strike="noStrike">
+            <a:endParaRPr b="0" lang="fr-FR" sz="4400" spc="-1" strike="noStrike">
               <a:latin typeface="Arial"/>
             </a:endParaRPr>
           </a:p>
@@ -3513,7 +3513,7 @@
             <a:normAutofit/>
           </a:bodyPr>
           <a:p>
-            <a:endParaRPr b="0" lang="en-US" sz="3200" spc="-1" strike="noStrike">
+            <a:endParaRPr b="0" lang="fr-FR" sz="3200" spc="-1" strike="noStrike">
               <a:latin typeface="Arial"/>
             </a:endParaRPr>
           </a:p>
@@ -3543,7 +3543,7 @@
             <a:normAutofit/>
           </a:bodyPr>
           <a:p>
-            <a:endParaRPr b="0" lang="en-US" sz="3200" spc="-1" strike="noStrike">
+            <a:endParaRPr b="0" lang="fr-FR" sz="3200" spc="-1" strike="noStrike">
               <a:latin typeface="Arial"/>
             </a:endParaRPr>
           </a:p>
@@ -3592,11 +3592,11 @@
         </p:spPr>
         <p:txBody>
           <a:bodyPr lIns="0" rIns="0" tIns="0" bIns="0" anchor="ctr">
-            <a:spAutoFit/>
+            <a:noAutofit/>
           </a:bodyPr>
           <a:p>
             <a:pPr algn="ctr"/>
-            <a:endParaRPr b="0" lang="en-US" sz="4400" spc="-1" strike="noStrike">
+            <a:endParaRPr b="0" lang="fr-FR" sz="4400" spc="-1" strike="noStrike">
               <a:latin typeface="Arial"/>
             </a:endParaRPr>
           </a:p>
@@ -3645,11 +3645,11 @@
         </p:spPr>
         <p:txBody>
           <a:bodyPr lIns="0" rIns="0" tIns="0" bIns="0" anchor="ctr">
-            <a:spAutoFit/>
+            <a:noAutofit/>
           </a:bodyPr>
           <a:p>
             <a:pPr algn="ctr"/>
-            <a:endParaRPr b="0" lang="en-US" sz="3200" spc="-1" strike="noStrike">
+            <a:endParaRPr b="0" lang="fr-FR" sz="3200" spc="-1" strike="noStrike">
               <a:latin typeface="Arial"/>
             </a:endParaRPr>
           </a:p>
@@ -3698,11 +3698,11 @@
         </p:spPr>
         <p:txBody>
           <a:bodyPr lIns="0" rIns="0" tIns="0" bIns="0" anchor="ctr">
-            <a:spAutoFit/>
+            <a:noAutofit/>
           </a:bodyPr>
           <a:p>
             <a:pPr algn="ctr"/>
-            <a:endParaRPr b="0" lang="en-US" sz="4400" spc="-1" strike="noStrike">
+            <a:endParaRPr b="0" lang="fr-FR" sz="4400" spc="-1" strike="noStrike">
               <a:latin typeface="Arial"/>
             </a:endParaRPr>
           </a:p>
@@ -3732,7 +3732,7 @@
             <a:normAutofit/>
           </a:bodyPr>
           <a:p>
-            <a:endParaRPr b="0" lang="en-US" sz="3200" spc="-1" strike="noStrike">
+            <a:endParaRPr b="0" lang="fr-FR" sz="3200" spc="-1" strike="noStrike">
               <a:latin typeface="Arial"/>
             </a:endParaRPr>
           </a:p>
@@ -3762,7 +3762,7 @@
             <a:normAutofit/>
           </a:bodyPr>
           <a:p>
-            <a:endParaRPr b="0" lang="en-US" sz="3200" spc="-1" strike="noStrike">
+            <a:endParaRPr b="0" lang="fr-FR" sz="3200" spc="-1" strike="noStrike">
               <a:latin typeface="Arial"/>
             </a:endParaRPr>
           </a:p>
@@ -3792,7 +3792,7 @@
             <a:normAutofit/>
           </a:bodyPr>
           <a:p>
-            <a:endParaRPr b="0" lang="en-US" sz="3200" spc="-1" strike="noStrike">
+            <a:endParaRPr b="0" lang="fr-FR" sz="3200" spc="-1" strike="noStrike">
               <a:latin typeface="Arial"/>
             </a:endParaRPr>
           </a:p>
@@ -3841,11 +3841,11 @@
         </p:spPr>
         <p:txBody>
           <a:bodyPr lIns="0" rIns="0" tIns="0" bIns="0" anchor="ctr">
-            <a:spAutoFit/>
+            <a:noAutofit/>
           </a:bodyPr>
           <a:p>
             <a:pPr algn="ctr"/>
-            <a:endParaRPr b="0" lang="en-US" sz="4400" spc="-1" strike="noStrike">
+            <a:endParaRPr b="0" lang="fr-FR" sz="4400" spc="-1" strike="noStrike">
               <a:latin typeface="Arial"/>
             </a:endParaRPr>
           </a:p>
@@ -3875,7 +3875,7 @@
             <a:normAutofit/>
           </a:bodyPr>
           <a:p>
-            <a:endParaRPr b="0" lang="en-US" sz="3200" spc="-1" strike="noStrike">
+            <a:endParaRPr b="0" lang="fr-FR" sz="3200" spc="-1" strike="noStrike">
               <a:latin typeface="Arial"/>
             </a:endParaRPr>
           </a:p>
@@ -3905,7 +3905,7 @@
             <a:normAutofit/>
           </a:bodyPr>
           <a:p>
-            <a:endParaRPr b="0" lang="en-US" sz="3200" spc="-1" strike="noStrike">
+            <a:endParaRPr b="0" lang="fr-FR" sz="3200" spc="-1" strike="noStrike">
               <a:latin typeface="Arial"/>
             </a:endParaRPr>
           </a:p>
@@ -3935,7 +3935,7 @@
             <a:normAutofit/>
           </a:bodyPr>
           <a:p>
-            <a:endParaRPr b="0" lang="en-US" sz="3200" spc="-1" strike="noStrike">
+            <a:endParaRPr b="0" lang="fr-FR" sz="3200" spc="-1" strike="noStrike">
               <a:latin typeface="Arial"/>
             </a:endParaRPr>
           </a:p>
@@ -3984,11 +3984,11 @@
         </p:spPr>
         <p:txBody>
           <a:bodyPr lIns="0" rIns="0" tIns="0" bIns="0" anchor="ctr">
-            <a:spAutoFit/>
+            <a:noAutofit/>
           </a:bodyPr>
           <a:p>
             <a:pPr algn="ctr"/>
-            <a:endParaRPr b="0" lang="en-US" sz="4400" spc="-1" strike="noStrike">
+            <a:endParaRPr b="0" lang="fr-FR" sz="4400" spc="-1" strike="noStrike">
               <a:latin typeface="Arial"/>
             </a:endParaRPr>
           </a:p>
@@ -4018,7 +4018,7 @@
             <a:normAutofit/>
           </a:bodyPr>
           <a:p>
-            <a:endParaRPr b="0" lang="en-US" sz="3200" spc="-1" strike="noStrike">
+            <a:endParaRPr b="0" lang="fr-FR" sz="3200" spc="-1" strike="noStrike">
               <a:latin typeface="Arial"/>
             </a:endParaRPr>
           </a:p>
@@ -4048,7 +4048,7 @@
             <a:normAutofit/>
           </a:bodyPr>
           <a:p>
-            <a:endParaRPr b="0" lang="en-US" sz="3200" spc="-1" strike="noStrike">
+            <a:endParaRPr b="0" lang="fr-FR" sz="3200" spc="-1" strike="noStrike">
               <a:latin typeface="Arial"/>
             </a:endParaRPr>
           </a:p>
@@ -4078,7 +4078,7 @@
             <a:normAutofit/>
           </a:bodyPr>
           <a:p>
-            <a:endParaRPr b="0" lang="en-US" sz="3200" spc="-1" strike="noStrike">
+            <a:endParaRPr b="0" lang="fr-FR" sz="3200" spc="-1" strike="noStrike">
               <a:latin typeface="Arial"/>
             </a:endParaRPr>
           </a:p>
@@ -4122,7 +4122,7 @@
         <p:spPr>
           <a:xfrm>
             <a:off x="0" y="3150000"/>
-            <a:ext cx="9718920" cy="1258920"/>
+            <a:ext cx="9717840" cy="1257840"/>
           </a:xfrm>
           <a:prstGeom prst="rect">
             <a:avLst/>
@@ -4167,12 +4167,12 @@
           <a:p>
             <a:pPr algn="ctr"/>
             <a:r>
-              <a:rPr b="0" lang="en-US" sz="4400" spc="-1" strike="noStrike">
-                <a:latin typeface="Arial"/>
-              </a:rPr>
-              <a:t>Click to edit the title text format</a:t>
-            </a:r>
-            <a:endParaRPr b="0" lang="en-US" sz="4400" spc="-1" strike="noStrike">
+              <a:rPr b="0" lang="fr-FR" sz="4400" spc="-1" strike="noStrike">
+                <a:latin typeface="Arial"/>
+              </a:rPr>
+              <a:t>Cliquez pour éditer le format du texte-titre</a:t>
+            </a:r>
+            <a:endParaRPr b="0" lang="fr-FR" sz="4400" spc="-1" strike="noStrike">
               <a:latin typeface="Arial"/>
             </a:endParaRPr>
           </a:p>
@@ -4214,12 +4214,12 @@
               <a:buChar char=""/>
             </a:pPr>
             <a:r>
-              <a:rPr b="0" lang="en-US" sz="3200" spc="-1" strike="noStrike">
-                <a:latin typeface="Arial"/>
-              </a:rPr>
-              <a:t>Click to edit the outline text format</a:t>
-            </a:r>
-            <a:endParaRPr b="0" lang="en-US" sz="3200" spc="-1" strike="noStrike">
+              <a:rPr b="0" lang="fr-FR" sz="3200" spc="-1" strike="noStrike">
+                <a:latin typeface="Arial"/>
+              </a:rPr>
+              <a:t>Cliquez pour éditer le format du plan de texte</a:t>
+            </a:r>
+            <a:endParaRPr b="0" lang="fr-FR" sz="3200" spc="-1" strike="noStrike">
               <a:latin typeface="Arial"/>
             </a:endParaRPr>
           </a:p>
@@ -4236,12 +4236,12 @@
               <a:buChar char=""/>
             </a:pPr>
             <a:r>
-              <a:rPr b="0" lang="en-US" sz="2800" spc="-1" strike="noStrike">
-                <a:latin typeface="Arial"/>
-              </a:rPr>
-              <a:t>Second Outline Level</a:t>
-            </a:r>
-            <a:endParaRPr b="0" lang="en-US" sz="2800" spc="-1" strike="noStrike">
+              <a:rPr b="0" lang="fr-FR" sz="2800" spc="-1" strike="noStrike">
+                <a:latin typeface="Arial"/>
+              </a:rPr>
+              <a:t>Second niveau de plan</a:t>
+            </a:r>
+            <a:endParaRPr b="0" lang="fr-FR" sz="2800" spc="-1" strike="noStrike">
               <a:latin typeface="Arial"/>
             </a:endParaRPr>
           </a:p>
@@ -4258,12 +4258,12 @@
               <a:buChar char=""/>
             </a:pPr>
             <a:r>
-              <a:rPr b="0" lang="en-US" sz="2400" spc="-1" strike="noStrike">
-                <a:latin typeface="Arial"/>
-              </a:rPr>
-              <a:t>Third Outline Level</a:t>
-            </a:r>
-            <a:endParaRPr b="0" lang="en-US" sz="2400" spc="-1" strike="noStrike">
+              <a:rPr b="0" lang="fr-FR" sz="2400" spc="-1" strike="noStrike">
+                <a:latin typeface="Arial"/>
+              </a:rPr>
+              <a:t>Troisième niveau de plan</a:t>
+            </a:r>
+            <a:endParaRPr b="0" lang="fr-FR" sz="2400" spc="-1" strike="noStrike">
               <a:latin typeface="Arial"/>
             </a:endParaRPr>
           </a:p>
@@ -4280,12 +4280,12 @@
               <a:buChar char=""/>
             </a:pPr>
             <a:r>
-              <a:rPr b="0" lang="en-US" sz="2000" spc="-1" strike="noStrike">
-                <a:latin typeface="Arial"/>
-              </a:rPr>
-              <a:t>Fourth Outline Level</a:t>
-            </a:r>
-            <a:endParaRPr b="0" lang="en-US" sz="2000" spc="-1" strike="noStrike">
+              <a:rPr b="0" lang="fr-FR" sz="2000" spc="-1" strike="noStrike">
+                <a:latin typeface="Arial"/>
+              </a:rPr>
+              <a:t>Quatrième niveau de plan</a:t>
+            </a:r>
+            <a:endParaRPr b="0" lang="fr-FR" sz="2000" spc="-1" strike="noStrike">
               <a:latin typeface="Arial"/>
             </a:endParaRPr>
           </a:p>
@@ -4302,12 +4302,12 @@
               <a:buChar char=""/>
             </a:pPr>
             <a:r>
-              <a:rPr b="0" lang="en-US" sz="2000" spc="-1" strike="noStrike">
-                <a:latin typeface="Arial"/>
-              </a:rPr>
-              <a:t>Fifth Outline Level</a:t>
-            </a:r>
-            <a:endParaRPr b="0" lang="en-US" sz="2000" spc="-1" strike="noStrike">
+              <a:rPr b="0" lang="fr-FR" sz="2000" spc="-1" strike="noStrike">
+                <a:latin typeface="Arial"/>
+              </a:rPr>
+              <a:t>Cinquième niveau de plan</a:t>
+            </a:r>
+            <a:endParaRPr b="0" lang="fr-FR" sz="2000" spc="-1" strike="noStrike">
               <a:latin typeface="Arial"/>
             </a:endParaRPr>
           </a:p>
@@ -4324,12 +4324,12 @@
               <a:buChar char=""/>
             </a:pPr>
             <a:r>
-              <a:rPr b="0" lang="en-US" sz="2000" spc="-1" strike="noStrike">
-                <a:latin typeface="Arial"/>
-              </a:rPr>
-              <a:t>Sixth Outline Level</a:t>
-            </a:r>
-            <a:endParaRPr b="0" lang="en-US" sz="2000" spc="-1" strike="noStrike">
+              <a:rPr b="0" lang="fr-FR" sz="2000" spc="-1" strike="noStrike">
+                <a:latin typeface="Arial"/>
+              </a:rPr>
+              <a:t>Sixième niveau de plan</a:t>
+            </a:r>
+            <a:endParaRPr b="0" lang="fr-FR" sz="2000" spc="-1" strike="noStrike">
               <a:latin typeface="Arial"/>
             </a:endParaRPr>
           </a:p>
@@ -4346,12 +4346,12 @@
               <a:buChar char=""/>
             </a:pPr>
             <a:r>
-              <a:rPr b="0" lang="en-US" sz="2000" spc="-1" strike="noStrike">
-                <a:latin typeface="Arial"/>
-              </a:rPr>
-              <a:t>Seventh Outline Level</a:t>
-            </a:r>
-            <a:endParaRPr b="0" lang="en-US" sz="2000" spc="-1" strike="noStrike">
+              <a:rPr b="0" lang="fr-FR" sz="2000" spc="-1" strike="noStrike">
+                <a:latin typeface="Arial"/>
+              </a:rPr>
+              <a:t>Septième niveau de plan</a:t>
+            </a:r>
+            <a:endParaRPr b="0" lang="fr-FR" sz="2000" spc="-1" strike="noStrike">
               <a:latin typeface="Arial"/>
             </a:endParaRPr>
           </a:p>
@@ -4410,7 +4410,7 @@
         <p:spPr>
           <a:xfrm>
             <a:off x="0" y="180000"/>
-            <a:ext cx="9718920" cy="1258920"/>
+            <a:ext cx="9717840" cy="1257840"/>
           </a:xfrm>
           <a:prstGeom prst="rect">
             <a:avLst/>
@@ -4438,7 +4438,7 @@
         <p:spPr>
           <a:xfrm>
             <a:off x="7560000" y="6840000"/>
-            <a:ext cx="2518920" cy="538920"/>
+            <a:ext cx="2517840" cy="537840"/>
           </a:xfrm>
           <a:prstGeom prst="rect">
             <a:avLst/>
@@ -4466,7 +4466,7 @@
         <p:spPr>
           <a:xfrm>
             <a:off x="900000" y="6840000"/>
-            <a:ext cx="6478920" cy="538920"/>
+            <a:ext cx="6477840" cy="537840"/>
           </a:xfrm>
           <a:prstGeom prst="rect">
             <a:avLst/>
@@ -4494,7 +4494,7 @@
         <p:spPr>
           <a:xfrm>
             <a:off x="180000" y="6840000"/>
-            <a:ext cx="538920" cy="538920"/>
+            <a:ext cx="537840" cy="537840"/>
           </a:xfrm>
           <a:prstGeom prst="rect">
             <a:avLst/>
@@ -4537,12 +4537,12 @@
           <a:p>
             <a:pPr algn="ctr"/>
             <a:r>
-              <a:rPr b="0" lang="en-US" sz="4400" spc="-1" strike="noStrike">
-                <a:latin typeface="Arial"/>
-              </a:rPr>
-              <a:t>Click to edit the title text format</a:t>
-            </a:r>
-            <a:endParaRPr b="0" lang="en-US" sz="4400" spc="-1" strike="noStrike">
+              <a:rPr b="0" lang="fr-FR" sz="4400" spc="-1" strike="noStrike">
+                <a:latin typeface="Arial"/>
+              </a:rPr>
+              <a:t>Cliquez pour éditer le format du texte-titre</a:t>
+            </a:r>
+            <a:endParaRPr b="0" lang="fr-FR" sz="4400" spc="-1" strike="noStrike">
               <a:latin typeface="Arial"/>
             </a:endParaRPr>
           </a:p>
@@ -4584,12 +4584,12 @@
               <a:buChar char=""/>
             </a:pPr>
             <a:r>
-              <a:rPr b="0" lang="en-US" sz="3200" spc="-1" strike="noStrike">
-                <a:latin typeface="Arial"/>
-              </a:rPr>
-              <a:t>Click to edit the outline text format</a:t>
-            </a:r>
-            <a:endParaRPr b="0" lang="en-US" sz="3200" spc="-1" strike="noStrike">
+              <a:rPr b="0" lang="fr-FR" sz="3200" spc="-1" strike="noStrike">
+                <a:latin typeface="Arial"/>
+              </a:rPr>
+              <a:t>Cliquez pour éditer le format du plan de texte</a:t>
+            </a:r>
+            <a:endParaRPr b="0" lang="fr-FR" sz="3200" spc="-1" strike="noStrike">
               <a:latin typeface="Arial"/>
             </a:endParaRPr>
           </a:p>
@@ -4606,12 +4606,12 @@
               <a:buChar char=""/>
             </a:pPr>
             <a:r>
-              <a:rPr b="0" lang="en-US" sz="2800" spc="-1" strike="noStrike">
-                <a:latin typeface="Arial"/>
-              </a:rPr>
-              <a:t>Second Outline Level</a:t>
-            </a:r>
-            <a:endParaRPr b="0" lang="en-US" sz="2800" spc="-1" strike="noStrike">
+              <a:rPr b="0" lang="fr-FR" sz="2800" spc="-1" strike="noStrike">
+                <a:latin typeface="Arial"/>
+              </a:rPr>
+              <a:t>Second niveau de plan</a:t>
+            </a:r>
+            <a:endParaRPr b="0" lang="fr-FR" sz="2800" spc="-1" strike="noStrike">
               <a:latin typeface="Arial"/>
             </a:endParaRPr>
           </a:p>
@@ -4628,12 +4628,12 @@
               <a:buChar char=""/>
             </a:pPr>
             <a:r>
-              <a:rPr b="0" lang="en-US" sz="2400" spc="-1" strike="noStrike">
-                <a:latin typeface="Arial"/>
-              </a:rPr>
-              <a:t>Third Outline Level</a:t>
-            </a:r>
-            <a:endParaRPr b="0" lang="en-US" sz="2400" spc="-1" strike="noStrike">
+              <a:rPr b="0" lang="fr-FR" sz="2400" spc="-1" strike="noStrike">
+                <a:latin typeface="Arial"/>
+              </a:rPr>
+              <a:t>Troisième niveau de plan</a:t>
+            </a:r>
+            <a:endParaRPr b="0" lang="fr-FR" sz="2400" spc="-1" strike="noStrike">
               <a:latin typeface="Arial"/>
             </a:endParaRPr>
           </a:p>
@@ -4650,12 +4650,12 @@
               <a:buChar char=""/>
             </a:pPr>
             <a:r>
-              <a:rPr b="0" lang="en-US" sz="2000" spc="-1" strike="noStrike">
-                <a:latin typeface="Arial"/>
-              </a:rPr>
-              <a:t>Fourth Outline Level</a:t>
-            </a:r>
-            <a:endParaRPr b="0" lang="en-US" sz="2000" spc="-1" strike="noStrike">
+              <a:rPr b="0" lang="fr-FR" sz="2000" spc="-1" strike="noStrike">
+                <a:latin typeface="Arial"/>
+              </a:rPr>
+              <a:t>Quatrième niveau de plan</a:t>
+            </a:r>
+            <a:endParaRPr b="0" lang="fr-FR" sz="2000" spc="-1" strike="noStrike">
               <a:latin typeface="Arial"/>
             </a:endParaRPr>
           </a:p>
@@ -4672,12 +4672,12 @@
               <a:buChar char=""/>
             </a:pPr>
             <a:r>
-              <a:rPr b="0" lang="en-US" sz="2000" spc="-1" strike="noStrike">
-                <a:latin typeface="Arial"/>
-              </a:rPr>
-              <a:t>Fifth Outline Level</a:t>
-            </a:r>
-            <a:endParaRPr b="0" lang="en-US" sz="2000" spc="-1" strike="noStrike">
+              <a:rPr b="0" lang="fr-FR" sz="2000" spc="-1" strike="noStrike">
+                <a:latin typeface="Arial"/>
+              </a:rPr>
+              <a:t>Cinquième niveau de plan</a:t>
+            </a:r>
+            <a:endParaRPr b="0" lang="fr-FR" sz="2000" spc="-1" strike="noStrike">
               <a:latin typeface="Arial"/>
             </a:endParaRPr>
           </a:p>
@@ -4694,12 +4694,12 @@
               <a:buChar char=""/>
             </a:pPr>
             <a:r>
-              <a:rPr b="0" lang="en-US" sz="2000" spc="-1" strike="noStrike">
-                <a:latin typeface="Arial"/>
-              </a:rPr>
-              <a:t>Sixth Outline Level</a:t>
-            </a:r>
-            <a:endParaRPr b="0" lang="en-US" sz="2000" spc="-1" strike="noStrike">
+              <a:rPr b="0" lang="fr-FR" sz="2000" spc="-1" strike="noStrike">
+                <a:latin typeface="Arial"/>
+              </a:rPr>
+              <a:t>Sixième niveau de plan</a:t>
+            </a:r>
+            <a:endParaRPr b="0" lang="fr-FR" sz="2000" spc="-1" strike="noStrike">
               <a:latin typeface="Arial"/>
             </a:endParaRPr>
           </a:p>
@@ -4716,12 +4716,12 @@
               <a:buChar char=""/>
             </a:pPr>
             <a:r>
-              <a:rPr b="0" lang="en-US" sz="2000" spc="-1" strike="noStrike">
-                <a:latin typeface="Arial"/>
-              </a:rPr>
-              <a:t>Seventh Outline Level</a:t>
-            </a:r>
-            <a:endParaRPr b="0" lang="en-US" sz="2000" spc="-1" strike="noStrike">
+              <a:rPr b="0" lang="fr-FR" sz="2000" spc="-1" strike="noStrike">
+                <a:latin typeface="Arial"/>
+              </a:rPr>
+              <a:t>Septième niveau de plan</a:t>
+            </a:r>
+            <a:endParaRPr b="0" lang="fr-FR" sz="2000" spc="-1" strike="noStrike">
               <a:latin typeface="Arial"/>
             </a:endParaRPr>
           </a:p>
@@ -4780,7 +4780,7 @@
         <p:spPr>
           <a:xfrm>
             <a:off x="0" y="180000"/>
-            <a:ext cx="9718920" cy="1258920"/>
+            <a:ext cx="9717840" cy="1257840"/>
           </a:xfrm>
           <a:prstGeom prst="rect">
             <a:avLst/>
@@ -4808,7 +4808,7 @@
         <p:spPr>
           <a:xfrm>
             <a:off x="7560000" y="6840000"/>
-            <a:ext cx="2518920" cy="538920"/>
+            <a:ext cx="2517840" cy="537840"/>
           </a:xfrm>
           <a:prstGeom prst="rect">
             <a:avLst/>
@@ -4836,7 +4836,7 @@
         <p:spPr>
           <a:xfrm>
             <a:off x="900000" y="6840000"/>
-            <a:ext cx="6478920" cy="538920"/>
+            <a:ext cx="6477840" cy="537840"/>
           </a:xfrm>
           <a:prstGeom prst="rect">
             <a:avLst/>
@@ -4864,7 +4864,7 @@
         <p:spPr>
           <a:xfrm>
             <a:off x="180000" y="6840000"/>
-            <a:ext cx="538920" cy="538920"/>
+            <a:ext cx="537840" cy="537840"/>
           </a:xfrm>
           <a:prstGeom prst="rect">
             <a:avLst/>
@@ -4893,8 +4893,8 @@
         </p:nvSpPr>
         <p:spPr>
           <a:xfrm>
-            <a:off x="504000" y="300960"/>
-            <a:ext cx="9071640" cy="1262160"/>
+            <a:off x="504000" y="301320"/>
+            <a:ext cx="9072000" cy="1261800"/>
           </a:xfrm>
           <a:prstGeom prst="rect">
             <a:avLst/>
@@ -4902,16 +4902,17 @@
         </p:spPr>
         <p:txBody>
           <a:bodyPr lIns="0" rIns="0" tIns="0" bIns="0" anchor="ctr">
-            <a:spAutoFit/>
-          </a:bodyPr>
-          <a:p>
-            <a:r>
-              <a:rPr b="0" lang="en-US" sz="1800" spc="-1" strike="noStrike">
-                <a:latin typeface="Arial"/>
-              </a:rPr>
-              <a:t>Click to edit the title text format</a:t>
-            </a:r>
-            <a:endParaRPr b="0" lang="en-US" sz="1800" spc="-1" strike="noStrike">
+            <a:noAutofit/>
+          </a:bodyPr>
+          <a:p>
+            <a:pPr algn="ctr"/>
+            <a:r>
+              <a:rPr b="0" lang="fr-FR" sz="4400" spc="-1" strike="noStrike">
+                <a:latin typeface="Arial"/>
+              </a:rPr>
+              <a:t>Cliquez pour éditer le format du texte-titre</a:t>
+            </a:r>
+            <a:endParaRPr b="0" lang="fr-FR" sz="4400" spc="-1" strike="noStrike">
               <a:latin typeface="Arial"/>
             </a:endParaRPr>
           </a:p>
@@ -4953,12 +4954,12 @@
               <a:buChar char=""/>
             </a:pPr>
             <a:r>
-              <a:rPr b="0" lang="en-US" sz="3200" spc="-1" strike="noStrike">
-                <a:latin typeface="Arial"/>
-              </a:rPr>
-              <a:t>Click to edit the outline text format</a:t>
-            </a:r>
-            <a:endParaRPr b="0" lang="en-US" sz="3200" spc="-1" strike="noStrike">
+              <a:rPr b="0" lang="fr-FR" sz="3200" spc="-1" strike="noStrike">
+                <a:latin typeface="Arial"/>
+              </a:rPr>
+              <a:t>Cliquez pour éditer le format du plan de texte</a:t>
+            </a:r>
+            <a:endParaRPr b="0" lang="fr-FR" sz="3200" spc="-1" strike="noStrike">
               <a:latin typeface="Arial"/>
             </a:endParaRPr>
           </a:p>
@@ -4975,12 +4976,12 @@
               <a:buChar char=""/>
             </a:pPr>
             <a:r>
-              <a:rPr b="0" lang="en-US" sz="2800" spc="-1" strike="noStrike">
-                <a:latin typeface="Arial"/>
-              </a:rPr>
-              <a:t>Second Outline Level</a:t>
-            </a:r>
-            <a:endParaRPr b="0" lang="en-US" sz="2800" spc="-1" strike="noStrike">
+              <a:rPr b="0" lang="fr-FR" sz="2800" spc="-1" strike="noStrike">
+                <a:latin typeface="Arial"/>
+              </a:rPr>
+              <a:t>Second niveau de plan</a:t>
+            </a:r>
+            <a:endParaRPr b="0" lang="fr-FR" sz="2800" spc="-1" strike="noStrike">
               <a:latin typeface="Arial"/>
             </a:endParaRPr>
           </a:p>
@@ -4997,12 +4998,12 @@
               <a:buChar char=""/>
             </a:pPr>
             <a:r>
-              <a:rPr b="0" lang="en-US" sz="2400" spc="-1" strike="noStrike">
-                <a:latin typeface="Arial"/>
-              </a:rPr>
-              <a:t>Third Outline Level</a:t>
-            </a:r>
-            <a:endParaRPr b="0" lang="en-US" sz="2400" spc="-1" strike="noStrike">
+              <a:rPr b="0" lang="fr-FR" sz="2400" spc="-1" strike="noStrike">
+                <a:latin typeface="Arial"/>
+              </a:rPr>
+              <a:t>Troisième niveau de plan</a:t>
+            </a:r>
+            <a:endParaRPr b="0" lang="fr-FR" sz="2400" spc="-1" strike="noStrike">
               <a:latin typeface="Arial"/>
             </a:endParaRPr>
           </a:p>
@@ -5019,12 +5020,12 @@
               <a:buChar char=""/>
             </a:pPr>
             <a:r>
-              <a:rPr b="0" lang="en-US" sz="2000" spc="-1" strike="noStrike">
-                <a:latin typeface="Arial"/>
-              </a:rPr>
-              <a:t>Fourth Outline Level</a:t>
-            </a:r>
-            <a:endParaRPr b="0" lang="en-US" sz="2000" spc="-1" strike="noStrike">
+              <a:rPr b="0" lang="fr-FR" sz="2000" spc="-1" strike="noStrike">
+                <a:latin typeface="Arial"/>
+              </a:rPr>
+              <a:t>Quatrième niveau de plan</a:t>
+            </a:r>
+            <a:endParaRPr b="0" lang="fr-FR" sz="2000" spc="-1" strike="noStrike">
               <a:latin typeface="Arial"/>
             </a:endParaRPr>
           </a:p>
@@ -5041,12 +5042,12 @@
               <a:buChar char=""/>
             </a:pPr>
             <a:r>
-              <a:rPr b="0" lang="en-US" sz="2000" spc="-1" strike="noStrike">
-                <a:latin typeface="Arial"/>
-              </a:rPr>
-              <a:t>Fifth Outline Level</a:t>
-            </a:r>
-            <a:endParaRPr b="0" lang="en-US" sz="2000" spc="-1" strike="noStrike">
+              <a:rPr b="0" lang="fr-FR" sz="2000" spc="-1" strike="noStrike">
+                <a:latin typeface="Arial"/>
+              </a:rPr>
+              <a:t>Cinquième niveau de plan</a:t>
+            </a:r>
+            <a:endParaRPr b="0" lang="fr-FR" sz="2000" spc="-1" strike="noStrike">
               <a:latin typeface="Arial"/>
             </a:endParaRPr>
           </a:p>
@@ -5063,12 +5064,12 @@
               <a:buChar char=""/>
             </a:pPr>
             <a:r>
-              <a:rPr b="0" lang="en-US" sz="2000" spc="-1" strike="noStrike">
-                <a:latin typeface="Arial"/>
-              </a:rPr>
-              <a:t>Sixth Outline Level</a:t>
-            </a:r>
-            <a:endParaRPr b="0" lang="en-US" sz="2000" spc="-1" strike="noStrike">
+              <a:rPr b="0" lang="fr-FR" sz="2000" spc="-1" strike="noStrike">
+                <a:latin typeface="Arial"/>
+              </a:rPr>
+              <a:t>Sixième niveau de plan</a:t>
+            </a:r>
+            <a:endParaRPr b="0" lang="fr-FR" sz="2000" spc="-1" strike="noStrike">
               <a:latin typeface="Arial"/>
             </a:endParaRPr>
           </a:p>
@@ -5085,12 +5086,12 @@
               <a:buChar char=""/>
             </a:pPr>
             <a:r>
-              <a:rPr b="0" lang="en-US" sz="2000" spc="-1" strike="noStrike">
-                <a:latin typeface="Arial"/>
-              </a:rPr>
-              <a:t>Seventh Outline Level</a:t>
-            </a:r>
-            <a:endParaRPr b="0" lang="en-US" sz="2000" spc="-1" strike="noStrike">
+              <a:rPr b="0" lang="fr-FR" sz="2000" spc="-1" strike="noStrike">
+                <a:latin typeface="Arial"/>
+              </a:rPr>
+              <a:t>Septième niveau de plan</a:t>
+            </a:r>
+            <a:endParaRPr b="0" lang="fr-FR" sz="2000" spc="-1" strike="noStrike">
               <a:latin typeface="Arial"/>
             </a:endParaRPr>
           </a:p>
@@ -5142,7 +5143,7 @@
         <p:spPr>
           <a:xfrm>
             <a:off x="360000" y="3330000"/>
-            <a:ext cx="9358920" cy="898920"/>
+            <a:ext cx="9357840" cy="897840"/>
           </a:xfrm>
           <a:prstGeom prst="rect">
             <a:avLst/>
@@ -5169,7 +5170,7 @@
               </a:lnSpc>
             </a:pPr>
             <a:r>
-              <a:rPr b="1" lang="en-US" sz="3200" spc="-1" strike="noStrike">
+              <a:rPr b="1" lang="fr-FR" sz="3200" spc="-1" strike="noStrike">
                 <a:solidFill>
                   <a:srgbClr val="ffffff"/>
                 </a:solidFill>
@@ -5178,7 +5179,7 @@
               </a:rPr>
               <a:t>Présentation de la solution technique et fonctionnelle</a:t>
             </a:r>
-            <a:endParaRPr b="0" lang="en-US" sz="3200" spc="-1" strike="noStrike">
+            <a:endParaRPr b="0" lang="fr-FR" sz="3200" spc="-1" strike="noStrike">
               <a:latin typeface="Arial"/>
             </a:endParaRPr>
           </a:p>
@@ -5193,7 +5194,7 @@
         <p:spPr>
           <a:xfrm>
             <a:off x="5869440" y="6699240"/>
-            <a:ext cx="3849480" cy="499680"/>
+            <a:ext cx="3848400" cy="498600"/>
           </a:xfrm>
           <a:prstGeom prst="rect">
             <a:avLst/>
@@ -5220,7 +5221,7 @@
               </a:lnSpc>
             </a:pPr>
             <a:r>
-              <a:rPr b="0" lang="en-US" sz="2200" spc="-1" strike="noStrike">
+              <a:rPr b="0" lang="fr-FR" sz="2200" spc="-1" strike="noStrike">
                 <a:solidFill>
                   <a:srgbClr val="000000"/>
                 </a:solidFill>
@@ -5229,7 +5230,59 @@
               </a:rPr>
               <a:t>IT Consulting &amp; Development</a:t>
             </a:r>
-            <a:endParaRPr b="0" lang="en-US" sz="2200" spc="-1" strike="noStrike">
+            <a:endParaRPr b="0" lang="fr-FR" sz="2200" spc="-1" strike="noStrike">
+              <a:latin typeface="Arial"/>
+            </a:endParaRPr>
+          </a:p>
+        </p:txBody>
+      </p:sp>
+      <p:sp>
+        <p:nvSpPr>
+          <p:cNvPr id="125" name="TextShape 3"/>
+          <p:cNvSpPr txBox="1"/>
+          <p:nvPr/>
+        </p:nvSpPr>
+        <p:spPr>
+          <a:xfrm>
+            <a:off x="1584000" y="251640"/>
+            <a:ext cx="8280000" cy="828360"/>
+          </a:xfrm>
+          <a:prstGeom prst="rect">
+            <a:avLst/>
+          </a:prstGeom>
+          <a:noFill/>
+          <a:ln>
+            <a:noFill/>
+          </a:ln>
+        </p:spPr>
+        <p:txBody>
+          <a:bodyPr lIns="90000" rIns="90000" tIns="45000" bIns="45000">
+            <a:noAutofit/>
+          </a:bodyPr>
+          <a:p>
+            <a:r>
+              <a:rPr b="0" lang="fr-FR" sz="2600" spc="-1" strike="noStrike">
+                <a:solidFill>
+                  <a:srgbClr val="666666"/>
+                </a:solidFill>
+                <a:latin typeface="Arial"/>
+              </a:rPr>
+              <a:t>Projet 4 - </a:t>
+            </a:r>
+            <a:r>
+              <a:rPr b="0" lang="fr-FR" sz="2600" spc="-1" strike="noStrike">
+                <a:solidFill>
+                  <a:srgbClr val="666666"/>
+                </a:solidFill>
+                <a:latin typeface="Arial"/>
+                <a:ea typeface="Arial"/>
+              </a:rPr>
+              <a:t>Analysez les besoins de votre client pour son groupe de pizzeria</a:t>
+            </a:r>
+            <a:endParaRPr b="0" lang="fr-FR" sz="2600" spc="-1" strike="noStrike">
+              <a:solidFill>
+                <a:srgbClr val="666666"/>
+              </a:solidFill>
               <a:latin typeface="Arial"/>
             </a:endParaRPr>
           </a:p>
@@ -5245,33 +5298,6 @@
       <p:transition spd="slow"/>
     </mc:Fallback>
   </mc:AlternateContent>
-  <p:timing>
-    <p:tnLst>
-      <p:par>
-        <p:cTn id="1" dur="indefinite" restart="never" nodeType="tmRoot">
-          <p:childTnLst>
-            <p:seq>
-              <p:cTn id="2" dur="indefinite" nodeType="mainSeq"/>
-              <p:prevCondLst>
-                <p:cond delay="0" evt="onPrev">
-                  <p:tgtEl>
-                    <p:sldTgt/>
-                  </p:tgtEl>
-                </p:cond>
-              </p:prevCondLst>
-              <p:nextCondLst>
-                <p:cond delay="0" evt="onNext">
-                  <p:tgtEl>
-                    <p:sldTgt/>
-                  </p:tgtEl>
-                </p:cond>
-              </p:nextCondLst>
-            </p:seq>
-          </p:childTnLst>
-        </p:cTn>
-      </p:par>
-    </p:tnLst>
-  </p:timing>
 </p:sld>
 </file>
 
@@ -5294,14 +5320,14 @@
       </p:grpSpPr>
       <p:sp>
         <p:nvSpPr>
-          <p:cNvPr id="125" name="CustomShape 1"/>
+          <p:cNvPr id="126" name="CustomShape 1"/>
           <p:cNvSpPr/>
           <p:nvPr/>
         </p:nvSpPr>
         <p:spPr>
           <a:xfrm>
             <a:off x="360000" y="360000"/>
-            <a:ext cx="9358920" cy="898920"/>
+            <a:ext cx="9357840" cy="897840"/>
           </a:xfrm>
           <a:prstGeom prst="rect">
             <a:avLst/>
@@ -5328,7 +5354,7 @@
               </a:lnSpc>
             </a:pPr>
             <a:r>
-              <a:rPr b="1" lang="en-US" sz="3200" spc="-1" strike="noStrike">
+              <a:rPr b="1" lang="fr-FR" sz="3200" spc="-1" strike="noStrike">
                 <a:solidFill>
                   <a:srgbClr val="ffffff"/>
                 </a:solidFill>
@@ -5337,22 +5363,22 @@
               </a:rPr>
               <a:t>Contexte</a:t>
             </a:r>
-            <a:endParaRPr b="0" lang="en-US" sz="3200" spc="-1" strike="noStrike">
-              <a:latin typeface="Arial"/>
-            </a:endParaRPr>
-          </a:p>
-        </p:txBody>
-      </p:sp>
-      <p:sp>
-        <p:nvSpPr>
-          <p:cNvPr id="126" name="CustomShape 2"/>
+            <a:endParaRPr b="0" lang="fr-FR" sz="3200" spc="-1" strike="noStrike">
+              <a:latin typeface="Arial"/>
+            </a:endParaRPr>
+          </a:p>
+        </p:txBody>
+      </p:sp>
+      <p:sp>
+        <p:nvSpPr>
+          <p:cNvPr id="127" name="CustomShape 2"/>
           <p:cNvSpPr/>
           <p:nvPr/>
         </p:nvSpPr>
         <p:spPr>
           <a:xfrm>
             <a:off x="360000" y="1980000"/>
-            <a:ext cx="9178920" cy="4678920"/>
+            <a:ext cx="9177840" cy="4677840"/>
           </a:xfrm>
           <a:prstGeom prst="rect">
             <a:avLst/>
@@ -5370,7 +5396,7 @@
         </p:style>
         <p:txBody>
           <a:bodyPr lIns="0" rIns="0" tIns="0" bIns="0">
-            <a:normAutofit fontScale="86000"/>
+            <a:normAutofit fontScale="87000"/>
           </a:bodyPr>
           <a:p>
             <a:pPr>
@@ -5382,16 +5408,16 @@
               </a:spcAft>
             </a:pPr>
             <a:r>
-              <a:rPr b="1" lang="en-US" sz="2600" spc="-1" strike="noStrike">
+              <a:rPr b="1" lang="fr-FR" sz="2600" spc="-1" strike="noStrike">
                 <a:solidFill>
                   <a:srgbClr val="1c1c1c"/>
                 </a:solidFill>
-                <a:latin typeface="Source Sans Pro Semibold"/>
+                <a:latin typeface="Arial"/>
                 <a:ea typeface="DejaVu Sans"/>
               </a:rPr>
               <a:t>Le client</a:t>
             </a:r>
-            <a:endParaRPr b="0" lang="en-US" sz="2600" spc="-1" strike="noStrike">
+            <a:endParaRPr b="0" lang="fr-FR" sz="2600" spc="-1" strike="noStrike">
               <a:latin typeface="Arial"/>
             </a:endParaRPr>
           </a:p>
@@ -5405,16 +5431,16 @@
               </a:spcAft>
             </a:pPr>
             <a:r>
-              <a:rPr b="0" lang="en-US" sz="2200" spc="-1" strike="noStrike">
+              <a:rPr b="0" lang="fr-FR" sz="2200" spc="-1" strike="noStrike">
                 <a:solidFill>
                   <a:srgbClr val="1c1c1c"/>
                 </a:solidFill>
                 <a:latin typeface="Arial"/>
                 <a:ea typeface="DejaVu Sans"/>
               </a:rPr>
-              <a:t>Améliorer la gestion d’OC Pizza, entreprise de vente de pizzas en vue son extension, grâce à un système d’information qui couvre les différents besoins </a:t>
-            </a:r>
-            <a:endParaRPr b="0" lang="en-US" sz="2200" spc="-1" strike="noStrike">
+              <a:t>Améliorer la gestion d’OC Pizza, entreprise de vente de pizzas au vu de son extension, grâce à un système d’information qui couvre les différents besoins </a:t>
+            </a:r>
+            <a:endParaRPr b="0" lang="fr-FR" sz="2200" spc="-1" strike="noStrike">
               <a:latin typeface="Arial"/>
             </a:endParaRPr>
           </a:p>
@@ -5428,16 +5454,16 @@
               </a:spcAft>
             </a:pPr>
             <a:r>
-              <a:rPr b="1" lang="en-US" sz="2000" spc="-1" strike="noStrike">
+              <a:rPr b="1" lang="fr-FR" sz="2000" spc="-1" strike="noStrike">
                 <a:solidFill>
                   <a:srgbClr val="1c1c1c"/>
                 </a:solidFill>
-                <a:latin typeface="Source Sans Pro Semibold"/>
+                <a:latin typeface="Arial"/>
                 <a:ea typeface="DejaVu Sans"/>
               </a:rPr>
               <a:t> </a:t>
             </a:r>
-            <a:endParaRPr b="0" lang="en-US" sz="2000" spc="-1" strike="noStrike">
+            <a:endParaRPr b="0" lang="fr-FR" sz="2000" spc="-1" strike="noStrike">
               <a:latin typeface="Arial"/>
             </a:endParaRPr>
           </a:p>
@@ -5451,16 +5477,16 @@
               </a:spcAft>
             </a:pPr>
             <a:r>
-              <a:rPr b="1" lang="en-US" sz="2600" spc="-1" strike="noStrike">
+              <a:rPr b="1" lang="fr-FR" sz="2600" spc="-1" strike="noStrike">
                 <a:solidFill>
                   <a:srgbClr val="1c1c1c"/>
                 </a:solidFill>
-                <a:latin typeface="Source Sans Pro Semibold"/>
+                <a:latin typeface="Arial"/>
                 <a:ea typeface="DejaVu Sans"/>
               </a:rPr>
               <a:t>Les objectifs</a:t>
             </a:r>
-            <a:endParaRPr b="0" lang="en-US" sz="2600" spc="-1" strike="noStrike">
+            <a:endParaRPr b="0" lang="fr-FR" sz="2600" spc="-1" strike="noStrike">
               <a:latin typeface="Arial"/>
             </a:endParaRPr>
           </a:p>
@@ -5474,7 +5500,7 @@
               </a:spcAft>
             </a:pPr>
             <a:r>
-              <a:rPr b="0" lang="en-US" sz="2200" spc="-1" strike="noStrike">
+              <a:rPr b="0" lang="fr-FR" sz="2200" spc="-1" strike="noStrike">
                 <a:solidFill>
                   <a:srgbClr val="1c1c1c"/>
                 </a:solidFill>
@@ -5483,7 +5509,7 @@
               </a:rPr>
               <a:t>- Proposer une solution qui permet d’être plus efficace dans la gestion des commandes</a:t>
             </a:r>
-            <a:endParaRPr b="0" lang="en-US" sz="2200" spc="-1" strike="noStrike">
+            <a:endParaRPr b="0" lang="fr-FR" sz="2200" spc="-1" strike="noStrike">
               <a:latin typeface="Arial"/>
             </a:endParaRPr>
           </a:p>
@@ -5497,7 +5523,7 @@
               </a:spcAft>
             </a:pPr>
             <a:r>
-              <a:rPr b="0" lang="en-US" sz="2200" spc="-1" strike="noStrike">
+              <a:rPr b="0" lang="fr-FR" sz="2200" spc="-1" strike="noStrike">
                 <a:solidFill>
                   <a:srgbClr val="1c1c1c"/>
                 </a:solidFill>
@@ -5506,7 +5532,7 @@
               </a:rPr>
               <a:t>- Suivre en temps réel les commandes passées et les stocks</a:t>
             </a:r>
-            <a:endParaRPr b="0" lang="en-US" sz="2200" spc="-1" strike="noStrike">
+            <a:endParaRPr b="0" lang="fr-FR" sz="2200" spc="-1" strike="noStrike">
               <a:latin typeface="Arial"/>
             </a:endParaRPr>
           </a:p>
@@ -5520,7 +5546,7 @@
               </a:spcAft>
             </a:pPr>
             <a:r>
-              <a:rPr b="0" lang="en-US" sz="2200" spc="-1" strike="noStrike">
+              <a:rPr b="0" lang="fr-FR" sz="2200" spc="-1" strike="noStrike">
                 <a:solidFill>
                   <a:srgbClr val="1c1c1c"/>
                 </a:solidFill>
@@ -5529,7 +5555,7 @@
               </a:rPr>
               <a:t>- Proposer un aide-mémoire aux cuisiniers pour les recettes</a:t>
             </a:r>
-            <a:endParaRPr b="0" lang="en-US" sz="2200" spc="-1" strike="noStrike">
+            <a:endParaRPr b="0" lang="fr-FR" sz="2200" spc="-1" strike="noStrike">
               <a:latin typeface="Arial"/>
             </a:endParaRPr>
           </a:p>
@@ -5543,7 +5569,7 @@
               </a:spcAft>
             </a:pPr>
             <a:r>
-              <a:rPr b="0" lang="en-US" sz="2200" spc="-1" strike="noStrike">
+              <a:rPr b="0" lang="fr-FR" sz="2200" spc="-1" strike="noStrike">
                 <a:solidFill>
                   <a:srgbClr val="1c1c1c"/>
                 </a:solidFill>
@@ -5552,7 +5578,7 @@
               </a:rPr>
               <a:t>- Proposer un site internet où le client pourra passer commande</a:t>
             </a:r>
-            <a:endParaRPr b="0" lang="en-US" sz="2200" spc="-1" strike="noStrike">
+            <a:endParaRPr b="0" lang="fr-FR" sz="2200" spc="-1" strike="noStrike">
               <a:latin typeface="Arial"/>
             </a:endParaRPr>
           </a:p>
@@ -5566,7 +5592,7 @@
               </a:spcAft>
             </a:pPr>
             <a:r>
-              <a:rPr b="1" lang="en-US" sz="2600" spc="-1" strike="noStrike">
+              <a:rPr b="1" lang="fr-FR" sz="2600" spc="-1" strike="noStrike">
                 <a:solidFill>
                   <a:srgbClr val="1c1c1c"/>
                 </a:solidFill>
@@ -5575,7 +5601,7 @@
               </a:rPr>
               <a:t> </a:t>
             </a:r>
-            <a:endParaRPr b="0" lang="en-US" sz="2600" spc="-1" strike="noStrike">
+            <a:endParaRPr b="0" lang="fr-FR" sz="2600" spc="-1" strike="noStrike">
               <a:latin typeface="Arial"/>
             </a:endParaRPr>
           </a:p>
@@ -5591,33 +5617,6 @@
       <p:transition spd="slow"/>
     </mc:Fallback>
   </mc:AlternateContent>
-  <p:timing>
-    <p:tnLst>
-      <p:par>
-        <p:cTn id="3" dur="indefinite" restart="never" nodeType="tmRoot">
-          <p:childTnLst>
-            <p:seq>
-              <p:cTn id="4" dur="indefinite" nodeType="mainSeq"/>
-              <p:prevCondLst>
-                <p:cond delay="0" evt="onPrev">
-                  <p:tgtEl>
-                    <p:sldTgt/>
-                  </p:tgtEl>
-                </p:cond>
-              </p:prevCondLst>
-              <p:nextCondLst>
-                <p:cond delay="0" evt="onNext">
-                  <p:tgtEl>
-                    <p:sldTgt/>
-                  </p:tgtEl>
-                </p:cond>
-              </p:nextCondLst>
-            </p:seq>
-          </p:childTnLst>
-        </p:cTn>
-      </p:par>
-    </p:tnLst>
-  </p:timing>
 </p:sld>
 </file>
 
@@ -5640,14 +5639,14 @@
       </p:grpSpPr>
       <p:sp>
         <p:nvSpPr>
-          <p:cNvPr id="127" name="CustomShape 1"/>
+          <p:cNvPr id="128" name="CustomShape 1"/>
           <p:cNvSpPr/>
           <p:nvPr/>
         </p:nvSpPr>
         <p:spPr>
           <a:xfrm>
             <a:off x="360000" y="360000"/>
-            <a:ext cx="9358920" cy="898920"/>
+            <a:ext cx="9357840" cy="897840"/>
           </a:xfrm>
           <a:prstGeom prst="rect">
             <a:avLst/>
@@ -5674,7 +5673,7 @@
               </a:lnSpc>
             </a:pPr>
             <a:r>
-              <a:rPr b="1" lang="en-US" sz="3200" spc="-1" strike="noStrike">
+              <a:rPr b="1" lang="fr-FR" sz="3200" spc="-1" strike="noStrike">
                 <a:solidFill>
                   <a:srgbClr val="ffffff"/>
                 </a:solidFill>
@@ -5683,22 +5682,22 @@
               </a:rPr>
               <a:t>Rappel des fonctionnalités</a:t>
             </a:r>
-            <a:endParaRPr b="0" lang="en-US" sz="3200" spc="-1" strike="noStrike">
-              <a:latin typeface="Arial"/>
-            </a:endParaRPr>
-          </a:p>
-        </p:txBody>
-      </p:sp>
-      <p:sp>
-        <p:nvSpPr>
-          <p:cNvPr id="128" name="CustomShape 2"/>
+            <a:endParaRPr b="0" lang="fr-FR" sz="3200" spc="-1" strike="noStrike">
+              <a:latin typeface="Arial"/>
+            </a:endParaRPr>
+          </a:p>
+        </p:txBody>
+      </p:sp>
+      <p:sp>
+        <p:nvSpPr>
+          <p:cNvPr id="129" name="CustomShape 2"/>
           <p:cNvSpPr/>
           <p:nvPr/>
         </p:nvSpPr>
         <p:spPr>
           <a:xfrm>
             <a:off x="360000" y="1980000"/>
-            <a:ext cx="9178920" cy="4678920"/>
+            <a:ext cx="9177840" cy="4677840"/>
           </a:xfrm>
           <a:prstGeom prst="rect">
             <a:avLst/>
@@ -5718,6 +5717,29 @@
           <a:bodyPr lIns="0" rIns="0" tIns="0" bIns="0">
             <a:normAutofit/>
           </a:bodyPr>
+          <a:p>
+            <a:pPr>
+              <a:lnSpc>
+                <a:spcPct val="100000"/>
+              </a:lnSpc>
+              <a:spcAft>
+                <a:spcPts val="2160"/>
+              </a:spcAft>
+            </a:pPr>
+            <a:r>
+              <a:rPr b="1" lang="fr-FR" sz="2400" spc="-1" strike="noStrike">
+                <a:solidFill>
+                  <a:srgbClr val="1c1c1c"/>
+                </a:solidFill>
+                <a:latin typeface="Arial"/>
+                <a:ea typeface="DejaVu Sans"/>
+              </a:rPr>
+              <a:t>Solution en deux parties :</a:t>
+            </a:r>
+            <a:endParaRPr b="0" lang="fr-FR" sz="2400" spc="-1" strike="noStrike">
+              <a:latin typeface="Arial"/>
+            </a:endParaRPr>
+          </a:p>
           <a:p>
             <a:pPr>
               <a:lnSpc>
@@ -5728,16 +5750,16 @@
               </a:spcAft>
             </a:pPr>
             <a:r>
-              <a:rPr b="1" lang="en-US" sz="2400" spc="-1" strike="noStrike">
+              <a:rPr b="1" lang="fr-FR" sz="2200" spc="-1" strike="noStrike">
                 <a:solidFill>
                   <a:srgbClr val="1c1c1c"/>
                 </a:solidFill>
-                <a:latin typeface="Source Sans Pro Semibold"/>
+                <a:latin typeface="Arial"/>
                 <a:ea typeface="DejaVu Sans"/>
               </a:rPr>
-              <a:t>Solution en deux parties :</a:t>
-            </a:r>
-            <a:endParaRPr b="0" lang="en-US" sz="2400" spc="-1" strike="noStrike">
+              <a:t>- Fonctionnalités clients</a:t>
+            </a:r>
+            <a:endParaRPr b="0" lang="fr-FR" sz="2200" spc="-1" strike="noStrike">
               <a:latin typeface="Arial"/>
             </a:endParaRPr>
           </a:p>
@@ -5751,16 +5773,16 @@
               </a:spcAft>
             </a:pPr>
             <a:r>
-              <a:rPr b="1" lang="en-US" sz="2200" spc="-1" strike="noStrike">
+              <a:rPr b="0" lang="fr-FR" sz="2050" spc="-1" strike="noStrike">
                 <a:solidFill>
                   <a:srgbClr val="1c1c1c"/>
                 </a:solidFill>
-                <a:latin typeface="Source Sans Pro Semibold"/>
+                <a:latin typeface="Arial"/>
                 <a:ea typeface="DejaVu Sans"/>
               </a:rPr>
-              <a:t>- Fonctionnalités clients</a:t>
-            </a:r>
-            <a:endParaRPr b="0" lang="en-US" sz="2200" spc="-1" strike="noStrike">
+              <a:t>Le client peut consulter le catalogue sur le site, commander, payer, modifier ou annuler sa commande. Il peut émettre des suggestions et des avis.</a:t>
+            </a:r>
+            <a:endParaRPr b="0" lang="fr-FR" sz="2050" spc="-1" strike="noStrike">
               <a:latin typeface="Arial"/>
             </a:endParaRPr>
           </a:p>
@@ -5774,16 +5796,16 @@
               </a:spcAft>
             </a:pPr>
             <a:r>
-              <a:rPr b="0" lang="en-US" sz="2200" spc="-1" strike="noStrike">
+              <a:rPr b="1" lang="fr-FR" sz="2200" spc="-1" strike="noStrike">
                 <a:solidFill>
                   <a:srgbClr val="1c1c1c"/>
                 </a:solidFill>
                 <a:latin typeface="Arial"/>
                 <a:ea typeface="DejaVu Sans"/>
               </a:rPr>
-              <a:t>Le client peut consulter le catalogue sur les sites, commander, payer, modifier ou annuler sa commande. Il peut émettre des suggestions et des avis.</a:t>
-            </a:r>
-            <a:endParaRPr b="0" lang="en-US" sz="2200" spc="-1" strike="noStrike">
+              <a:t>- Fonctionnalités internes à l’entreprise</a:t>
+            </a:r>
+            <a:endParaRPr b="0" lang="fr-FR" sz="2200" spc="-1" strike="noStrike">
               <a:latin typeface="Arial"/>
             </a:endParaRPr>
           </a:p>
@@ -5797,39 +5819,26 @@
               </a:spcAft>
             </a:pPr>
             <a:r>
-              <a:rPr b="1" lang="en-US" sz="2200" spc="-1" strike="noStrike">
+              <a:rPr b="0" lang="fr-FR" sz="2050" spc="-1" strike="noStrike">
                 <a:solidFill>
                   <a:srgbClr val="1c1c1c"/>
                 </a:solidFill>
-                <a:latin typeface="Source Sans Pro Semibold"/>
+                <a:latin typeface="Arial"/>
                 <a:ea typeface="DejaVu Sans"/>
               </a:rPr>
-              <a:t>- Fonctionnalités internes à l’entreprise</a:t>
-            </a:r>
-            <a:endParaRPr b="0" lang="en-US" sz="2200" spc="-1" strike="noStrike">
-              <a:latin typeface="Arial"/>
-            </a:endParaRPr>
-          </a:p>
-          <a:p>
-            <a:pPr>
-              <a:lnSpc>
-                <a:spcPct val="100000"/>
-              </a:lnSpc>
-              <a:spcAft>
-                <a:spcPts val="1142"/>
-              </a:spcAft>
-            </a:pPr>
-            <a:r>
-              <a:rPr b="0" lang="en-US" sz="2200" spc="-1" strike="noStrike">
+              <a:t>Peuvent être communes à plusieurs acteurs ou propres à un acteur. Concernent l’administration du catalogue, l’enregistrement d’une commande ainsi que son suivi et son encaissement, la gestion des stocks, l’accès aux statistiques et aux recettes</a:t>
+            </a:r>
+            <a:r>
+              <a:rPr b="0" lang="fr-FR" sz="2050" spc="-1" strike="noStrike">
                 <a:solidFill>
                   <a:srgbClr val="1c1c1c"/>
                 </a:solidFill>
                 <a:latin typeface="Arial"/>
                 <a:ea typeface="DejaVu Sans"/>
               </a:rPr>
-              <a:t>Peuvent être commune à plusieurs acteurs ou propre à un acteur. Concernent l’administration du catalogue, l’enregistrement d’une commande ainsi que son suivi et son encaissement, la gestion des stocks, l’accès aux statistiques et aux recettes.</a:t>
-            </a:r>
-            <a:endParaRPr b="0" lang="en-US" sz="2200" spc="-1" strike="noStrike">
+              <a:t>.</a:t>
+            </a:r>
+            <a:endParaRPr b="0" lang="fr-FR" sz="2050" spc="-1" strike="noStrike">
               <a:latin typeface="Arial"/>
             </a:endParaRPr>
           </a:p>
@@ -5845,33 +5854,6 @@
       <p:transition spd="slow"/>
     </mc:Fallback>
   </mc:AlternateContent>
-  <p:timing>
-    <p:tnLst>
-      <p:par>
-        <p:cTn id="5" dur="indefinite" restart="never" nodeType="tmRoot">
-          <p:childTnLst>
-            <p:seq>
-              <p:cTn id="6" dur="indefinite" nodeType="mainSeq"/>
-              <p:prevCondLst>
-                <p:cond delay="0" evt="onPrev">
-                  <p:tgtEl>
-                    <p:sldTgt/>
-                  </p:tgtEl>
-                </p:cond>
-              </p:prevCondLst>
-              <p:nextCondLst>
-                <p:cond delay="0" evt="onNext">
-                  <p:tgtEl>
-                    <p:sldTgt/>
-                  </p:tgtEl>
-                </p:cond>
-              </p:nextCondLst>
-            </p:seq>
-          </p:childTnLst>
-        </p:cTn>
-      </p:par>
-    </p:tnLst>
-  </p:timing>
 </p:sld>
 </file>
 
@@ -5894,14 +5876,14 @@
       </p:grpSpPr>
       <p:sp>
         <p:nvSpPr>
-          <p:cNvPr id="129" name="CustomShape 1"/>
+          <p:cNvPr id="130" name="CustomShape 1"/>
           <p:cNvSpPr/>
           <p:nvPr/>
         </p:nvSpPr>
         <p:spPr>
           <a:xfrm>
             <a:off x="360000" y="360000"/>
-            <a:ext cx="9358920" cy="898920"/>
+            <a:ext cx="9357840" cy="897840"/>
           </a:xfrm>
           <a:prstGeom prst="rect">
             <a:avLst/>
@@ -5928,7 +5910,7 @@
               </a:lnSpc>
             </a:pPr>
             <a:r>
-              <a:rPr b="1" lang="en-US" sz="3200" spc="-1" strike="noStrike">
+              <a:rPr b="1" lang="fr-FR" sz="3200" spc="-1" strike="noStrike">
                 <a:solidFill>
                   <a:srgbClr val="ffffff"/>
                 </a:solidFill>
@@ -5937,22 +5919,22 @@
               </a:rPr>
               <a:t>Les acteurs</a:t>
             </a:r>
-            <a:endParaRPr b="0" lang="en-US" sz="3200" spc="-1" strike="noStrike">
-              <a:latin typeface="Arial"/>
-            </a:endParaRPr>
-          </a:p>
-        </p:txBody>
-      </p:sp>
-      <p:sp>
-        <p:nvSpPr>
-          <p:cNvPr id="130" name="CustomShape 2"/>
+            <a:endParaRPr b="0" lang="fr-FR" sz="3200" spc="-1" strike="noStrike">
+              <a:latin typeface="Arial"/>
+            </a:endParaRPr>
+          </a:p>
+        </p:txBody>
+      </p:sp>
+      <p:sp>
+        <p:nvSpPr>
+          <p:cNvPr id="131" name="CustomShape 2"/>
           <p:cNvSpPr/>
           <p:nvPr/>
         </p:nvSpPr>
         <p:spPr>
           <a:xfrm>
             <a:off x="360000" y="1980000"/>
-            <a:ext cx="9178920" cy="4678920"/>
+            <a:ext cx="9177840" cy="4677840"/>
           </a:xfrm>
           <a:prstGeom prst="rect">
             <a:avLst/>
@@ -5982,16 +5964,16 @@
               </a:spcAft>
             </a:pPr>
             <a:r>
-              <a:rPr b="1" lang="en-US" sz="2600" spc="-1" strike="noStrike">
+              <a:rPr b="1" lang="fr-FR" sz="2600" spc="-1" strike="noStrike">
                 <a:solidFill>
                   <a:srgbClr val="1c1c1c"/>
                 </a:solidFill>
-                <a:latin typeface="Source Sans Pro Semibold"/>
+                <a:latin typeface="Arial"/>
                 <a:ea typeface="DejaVu Sans"/>
               </a:rPr>
               <a:t>7 acteurs dont 5 représentés par le système :</a:t>
             </a:r>
-            <a:endParaRPr b="0" lang="en-US" sz="2600" spc="-1" strike="noStrike">
+            <a:endParaRPr b="0" lang="fr-FR" sz="2600" spc="-1" strike="noStrike">
               <a:latin typeface="Arial"/>
             </a:endParaRPr>
           </a:p>
@@ -6005,7 +5987,7 @@
               </a:spcAft>
             </a:pPr>
             <a:r>
-              <a:rPr b="0" lang="en-US" sz="2200" spc="-1" strike="noStrike">
+              <a:rPr b="0" lang="fr-FR" sz="2200" spc="-1" strike="noStrike">
                 <a:solidFill>
                   <a:srgbClr val="1c1c1c"/>
                 </a:solidFill>
@@ -6014,7 +5996,7 @@
               </a:rPr>
               <a:t>- Vendeur/Manager</a:t>
             </a:r>
-            <a:endParaRPr b="0" lang="en-US" sz="2200" spc="-1" strike="noStrike">
+            <a:endParaRPr b="0" lang="fr-FR" sz="2200" spc="-1" strike="noStrike">
               <a:latin typeface="Arial"/>
             </a:endParaRPr>
           </a:p>
@@ -6028,7 +6010,7 @@
               </a:spcAft>
             </a:pPr>
             <a:r>
-              <a:rPr b="0" lang="en-US" sz="2200" spc="-1" strike="noStrike">
+              <a:rPr b="0" lang="fr-FR" sz="2200" spc="-1" strike="noStrike">
                 <a:solidFill>
                   <a:srgbClr val="1c1c1c"/>
                 </a:solidFill>
@@ -6037,7 +6019,7 @@
               </a:rPr>
               <a:t>- Cuisinier</a:t>
             </a:r>
-            <a:endParaRPr b="0" lang="en-US" sz="2200" spc="-1" strike="noStrike">
+            <a:endParaRPr b="0" lang="fr-FR" sz="2200" spc="-1" strike="noStrike">
               <a:latin typeface="Arial"/>
             </a:endParaRPr>
           </a:p>
@@ -6051,7 +6033,7 @@
               </a:spcAft>
             </a:pPr>
             <a:r>
-              <a:rPr b="0" lang="en-US" sz="2200" spc="-1" strike="noStrike">
+              <a:rPr b="0" lang="fr-FR" sz="2200" spc="-1" strike="noStrike">
                 <a:solidFill>
                   <a:srgbClr val="1c1c1c"/>
                 </a:solidFill>
@@ -6060,7 +6042,7 @@
               </a:rPr>
               <a:t>- Livreur</a:t>
             </a:r>
-            <a:endParaRPr b="0" lang="en-US" sz="2200" spc="-1" strike="noStrike">
+            <a:endParaRPr b="0" lang="fr-FR" sz="2200" spc="-1" strike="noStrike">
               <a:latin typeface="Arial"/>
             </a:endParaRPr>
           </a:p>
@@ -6074,7 +6056,7 @@
               </a:spcAft>
             </a:pPr>
             <a:r>
-              <a:rPr b="0" lang="en-US" sz="2200" spc="-1" strike="noStrike">
+              <a:rPr b="0" lang="fr-FR" sz="2200" spc="-1" strike="noStrike">
                 <a:solidFill>
                   <a:srgbClr val="1c1c1c"/>
                 </a:solidFill>
@@ -6083,7 +6065,7 @@
               </a:rPr>
               <a:t>- Client</a:t>
             </a:r>
-            <a:endParaRPr b="0" lang="en-US" sz="2200" spc="-1" strike="noStrike">
+            <a:endParaRPr b="0" lang="fr-FR" sz="2200" spc="-1" strike="noStrike">
               <a:latin typeface="Arial"/>
             </a:endParaRPr>
           </a:p>
@@ -6097,7 +6079,7 @@
               </a:spcAft>
             </a:pPr>
             <a:r>
-              <a:rPr b="0" lang="en-US" sz="2200" spc="-1" strike="noStrike">
+              <a:rPr b="0" lang="fr-FR" sz="2200" spc="-1" strike="noStrike">
                 <a:solidFill>
                   <a:srgbClr val="1c1c1c"/>
                 </a:solidFill>
@@ -6106,7 +6088,7 @@
               </a:rPr>
               <a:t>- Système bancaire</a:t>
             </a:r>
-            <a:endParaRPr b="0" lang="en-US" sz="2200" spc="-1" strike="noStrike">
+            <a:endParaRPr b="0" lang="fr-FR" sz="2200" spc="-1" strike="noStrike">
               <a:latin typeface="Arial"/>
             </a:endParaRPr>
           </a:p>
@@ -6119,7 +6101,7 @@
                 <a:spcPts val="1142"/>
               </a:spcAft>
             </a:pPr>
-            <a:endParaRPr b="0" lang="en-US" sz="2200" spc="-1" strike="noStrike">
+            <a:endParaRPr b="0" lang="fr-FR" sz="2200" spc="-1" strike="noStrike">
               <a:latin typeface="Arial"/>
             </a:endParaRPr>
           </a:p>
@@ -6133,16 +6115,16 @@
               </a:spcAft>
             </a:pPr>
             <a:r>
-              <a:rPr b="0" lang="en-US" sz="1800" spc="-1" strike="noStrike">
+              <a:rPr b="0" lang="fr-FR" sz="1800" spc="-1" strike="noStrike">
                 <a:solidFill>
                   <a:srgbClr val="1c1c1c"/>
                 </a:solidFill>
-                <a:latin typeface="Source Serif Pro"/>
+                <a:latin typeface="Arial"/>
                 <a:ea typeface="DejaVu Sans"/>
               </a:rPr>
               <a:t>* On considère qu’il y a un chef d’entreprise et potentiellement un technicien non représentés dans la solution</a:t>
             </a:r>
-            <a:endParaRPr b="0" lang="en-US" sz="1800" spc="-1" strike="noStrike">
+            <a:endParaRPr b="0" lang="fr-FR" sz="1800" spc="-1" strike="noStrike">
               <a:latin typeface="Arial"/>
             </a:endParaRPr>
           </a:p>
@@ -6158,33 +6140,6 @@
       <p:transition spd="slow"/>
     </mc:Fallback>
   </mc:AlternateContent>
-  <p:timing>
-    <p:tnLst>
-      <p:par>
-        <p:cTn id="7" dur="indefinite" restart="never" nodeType="tmRoot">
-          <p:childTnLst>
-            <p:seq>
-              <p:cTn id="8" dur="indefinite" nodeType="mainSeq"/>
-              <p:prevCondLst>
-                <p:cond delay="0" evt="onPrev">
-                  <p:tgtEl>
-                    <p:sldTgt/>
-                  </p:tgtEl>
-                </p:cond>
-              </p:prevCondLst>
-              <p:nextCondLst>
-                <p:cond delay="0" evt="onNext">
-                  <p:tgtEl>
-                    <p:sldTgt/>
-                  </p:tgtEl>
-                </p:cond>
-              </p:nextCondLst>
-            </p:seq>
-          </p:childTnLst>
-        </p:cTn>
-      </p:par>
-    </p:tnLst>
-  </p:timing>
 </p:sld>
 </file>
 
@@ -6207,14 +6162,14 @@
       </p:grpSpPr>
       <p:sp>
         <p:nvSpPr>
-          <p:cNvPr id="131" name="CustomShape 1"/>
+          <p:cNvPr id="132" name="CustomShape 1"/>
           <p:cNvSpPr/>
           <p:nvPr/>
         </p:nvSpPr>
         <p:spPr>
           <a:xfrm>
             <a:off x="360000" y="360000"/>
-            <a:ext cx="9358920" cy="898920"/>
+            <a:ext cx="9357840" cy="897840"/>
           </a:xfrm>
           <a:prstGeom prst="rect">
             <a:avLst/>
@@ -6241,7 +6196,7 @@
               </a:lnSpc>
             </a:pPr>
             <a:r>
-              <a:rPr b="1" lang="en-US" sz="3200" spc="-1" strike="noStrike">
+              <a:rPr b="1" lang="fr-FR" sz="3200" spc="-1" strike="noStrike">
                 <a:solidFill>
                   <a:srgbClr val="ffffff"/>
                 </a:solidFill>
@@ -6250,22 +6205,22 @@
               </a:rPr>
               <a:t>Système de notification</a:t>
             </a:r>
-            <a:endParaRPr b="0" lang="en-US" sz="3200" spc="-1" strike="noStrike">
-              <a:latin typeface="Arial"/>
-            </a:endParaRPr>
-          </a:p>
-        </p:txBody>
-      </p:sp>
-      <p:sp>
-        <p:nvSpPr>
-          <p:cNvPr id="132" name="CustomShape 2"/>
+            <a:endParaRPr b="0" lang="fr-FR" sz="3200" spc="-1" strike="noStrike">
+              <a:latin typeface="Arial"/>
+            </a:endParaRPr>
+          </a:p>
+        </p:txBody>
+      </p:sp>
+      <p:sp>
+        <p:nvSpPr>
+          <p:cNvPr id="133" name="CustomShape 2"/>
           <p:cNvSpPr/>
           <p:nvPr/>
         </p:nvSpPr>
         <p:spPr>
           <a:xfrm>
             <a:off x="360000" y="1980000"/>
-            <a:ext cx="9178920" cy="4678920"/>
+            <a:ext cx="9177840" cy="4677840"/>
           </a:xfrm>
           <a:prstGeom prst="rect">
             <a:avLst/>
@@ -6295,7 +6250,7 @@
               </a:spcAft>
             </a:pPr>
             <a:r>
-              <a:rPr b="0" lang="en-US" sz="2200" spc="-1" strike="noStrike">
+              <a:rPr b="0" lang="fr-FR" sz="2200" spc="-1" strike="noStrike">
                 <a:solidFill>
                   <a:srgbClr val="1c1c1c"/>
                 </a:solidFill>
@@ -6304,7 +6259,7 @@
               </a:rPr>
               <a:t>La commande disposera de plusieurs statuts selon son état d’avancement, divisés en deux types :</a:t>
             </a:r>
-            <a:endParaRPr b="0" lang="en-US" sz="2200" spc="-1" strike="noStrike">
+            <a:endParaRPr b="0" lang="fr-FR" sz="2200" spc="-1" strike="noStrike">
               <a:latin typeface="Arial"/>
             </a:endParaRPr>
           </a:p>
@@ -6318,7 +6273,7 @@
               </a:spcAft>
             </a:pPr>
             <a:r>
-              <a:rPr b="1" lang="en-US" sz="2200" spc="-1" strike="noStrike">
+              <a:rPr b="1" lang="fr-FR" sz="2200" spc="-1" strike="noStrike">
                 <a:solidFill>
                   <a:srgbClr val="1c1c1c"/>
                 </a:solidFill>
@@ -6328,7 +6283,7 @@
               <a:t>Statut de paiement </a:t>
             </a:r>
             <a:r>
-              <a:rPr b="0" lang="en-US" sz="2200" spc="-1" strike="noStrike">
+              <a:rPr b="0" lang="fr-FR" sz="2200" spc="-1" strike="noStrike">
                 <a:solidFill>
                   <a:srgbClr val="1c1c1c"/>
                 </a:solidFill>
@@ -6337,7 +6292,7 @@
               </a:rPr>
               <a:t>: « Payée » ou « Non payée »</a:t>
             </a:r>
-            <a:endParaRPr b="0" lang="en-US" sz="2200" spc="-1" strike="noStrike">
+            <a:endParaRPr b="0" lang="fr-FR" sz="2200" spc="-1" strike="noStrike">
               <a:latin typeface="Arial"/>
             </a:endParaRPr>
           </a:p>
@@ -6351,7 +6306,7 @@
               </a:spcAft>
             </a:pPr>
             <a:r>
-              <a:rPr b="1" lang="en-US" sz="2200" spc="-1" strike="noStrike">
+              <a:rPr b="1" lang="fr-FR" sz="2200" spc="-1" strike="noStrike">
                 <a:solidFill>
                   <a:srgbClr val="1c1c1c"/>
                 </a:solidFill>
@@ -6361,7 +6316,7 @@
               <a:t>Statut d’avancement </a:t>
             </a:r>
             <a:r>
-              <a:rPr b="0" lang="en-US" sz="2200" spc="-1" strike="noStrike">
+              <a:rPr b="0" lang="fr-FR" sz="2200" spc="-1" strike="noStrike">
                 <a:solidFill>
                   <a:srgbClr val="1c1c1c"/>
                 </a:solidFill>
@@ -6370,7 +6325,7 @@
               </a:rPr>
               <a:t>: « En attente de préparation », « En cours de préparation », « Prête à être livrée »,  « En cours de livraison », « Livrée ».</a:t>
             </a:r>
-            <a:endParaRPr b="0" lang="en-US" sz="2200" spc="-1" strike="noStrike">
+            <a:endParaRPr b="0" lang="fr-FR" sz="2200" spc="-1" strike="noStrike">
               <a:latin typeface="Arial"/>
             </a:endParaRPr>
           </a:p>
@@ -6384,7 +6339,7 @@
               </a:spcAft>
             </a:pPr>
             <a:r>
-              <a:rPr b="1" lang="en-US" sz="2200" spc="-1" strike="noStrike">
+              <a:rPr b="1" lang="fr-FR" sz="2200" spc="-1" strike="noStrike">
                 <a:solidFill>
                   <a:srgbClr val="1c1c1c"/>
                 </a:solidFill>
@@ -6393,7 +6348,7 @@
               </a:rPr>
               <a:t> </a:t>
             </a:r>
-            <a:endParaRPr b="0" lang="en-US" sz="2200" spc="-1" strike="noStrike">
+            <a:endParaRPr b="0" lang="fr-FR" sz="2200" spc="-1" strike="noStrike">
               <a:latin typeface="Arial"/>
             </a:endParaRPr>
           </a:p>
@@ -6409,33 +6364,6 @@
       <p:transition spd="slow"/>
     </mc:Fallback>
   </mc:AlternateContent>
-  <p:timing>
-    <p:tnLst>
-      <p:par>
-        <p:cTn id="9" dur="indefinite" restart="never" nodeType="tmRoot">
-          <p:childTnLst>
-            <p:seq>
-              <p:cTn id="10" dur="indefinite" nodeType="mainSeq"/>
-              <p:prevCondLst>
-                <p:cond delay="0" evt="onPrev">
-                  <p:tgtEl>
-                    <p:sldTgt/>
-                  </p:tgtEl>
-                </p:cond>
-              </p:prevCondLst>
-              <p:nextCondLst>
-                <p:cond delay="0" evt="onNext">
-                  <p:tgtEl>
-                    <p:sldTgt/>
-                  </p:tgtEl>
-                </p:cond>
-              </p:nextCondLst>
-            </p:seq>
-          </p:childTnLst>
-        </p:cTn>
-      </p:par>
-    </p:tnLst>
-  </p:timing>
 </p:sld>
 </file>
 
@@ -6458,14 +6386,14 @@
       </p:grpSpPr>
       <p:sp>
         <p:nvSpPr>
-          <p:cNvPr id="133" name="CustomShape 1"/>
+          <p:cNvPr id="134" name="CustomShape 1"/>
           <p:cNvSpPr/>
           <p:nvPr/>
         </p:nvSpPr>
         <p:spPr>
           <a:xfrm>
             <a:off x="360000" y="360000"/>
-            <a:ext cx="9358920" cy="898920"/>
+            <a:ext cx="9357840" cy="897840"/>
           </a:xfrm>
           <a:prstGeom prst="rect">
             <a:avLst/>
@@ -6492,7 +6420,7 @@
               </a:lnSpc>
             </a:pPr>
             <a:r>
-              <a:rPr b="1" lang="en-US" sz="3200" spc="-1" strike="noStrike">
+              <a:rPr b="1" lang="fr-FR" sz="3200" spc="-1" strike="noStrike">
                 <a:solidFill>
                   <a:srgbClr val="ffffff"/>
                 </a:solidFill>
@@ -6501,22 +6429,22 @@
               </a:rPr>
               <a:t>Parcours de la commande</a:t>
             </a:r>
-            <a:endParaRPr b="0" lang="en-US" sz="3200" spc="-1" strike="noStrike">
-              <a:latin typeface="Arial"/>
-            </a:endParaRPr>
-          </a:p>
-        </p:txBody>
-      </p:sp>
-      <p:sp>
-        <p:nvSpPr>
-          <p:cNvPr id="134" name="CustomShape 2"/>
+            <a:endParaRPr b="0" lang="fr-FR" sz="3200" spc="-1" strike="noStrike">
+              <a:latin typeface="Arial"/>
+            </a:endParaRPr>
+          </a:p>
+        </p:txBody>
+      </p:sp>
+      <p:sp>
+        <p:nvSpPr>
+          <p:cNvPr id="135" name="CustomShape 2"/>
           <p:cNvSpPr/>
           <p:nvPr/>
         </p:nvSpPr>
         <p:spPr>
           <a:xfrm>
             <a:off x="360000" y="1980000"/>
-            <a:ext cx="9178920" cy="4678920"/>
+            <a:ext cx="9177840" cy="4677840"/>
           </a:xfrm>
           <a:prstGeom prst="rect">
             <a:avLst/>
@@ -6546,7 +6474,7 @@
               </a:spcAft>
             </a:pPr>
             <a:r>
-              <a:rPr b="0" lang="en-US" sz="2200" spc="-1" strike="noStrike">
+              <a:rPr b="0" lang="fr-FR" sz="2200" spc="-1" strike="noStrike">
                 <a:solidFill>
                   <a:srgbClr val="1c1c1c"/>
                 </a:solidFill>
@@ -6556,7 +6484,7 @@
               <a:t>1 – </a:t>
             </a:r>
             <a:r>
-              <a:rPr b="1" lang="en-US" sz="2200" spc="-1" strike="noStrike">
+              <a:rPr b="1" lang="fr-FR" sz="2200" spc="-1" strike="noStrike">
                 <a:solidFill>
                   <a:srgbClr val="1c1c1c"/>
                 </a:solidFill>
@@ -6566,16 +6494,16 @@
               <a:t>Enregistrement</a:t>
             </a:r>
             <a:r>
-              <a:rPr b="0" lang="en-US" sz="2200" spc="-1" strike="noStrike">
+              <a:rPr b="0" lang="fr-FR" sz="2200" spc="-1" strike="noStrike">
                 <a:solidFill>
                   <a:srgbClr val="1c1c1c"/>
                 </a:solidFill>
                 <a:latin typeface="Arial"/>
                 <a:ea typeface="DejaVu Sans"/>
               </a:rPr>
-              <a:t> : la commande est enregistrée dans le système par le client (via le site web) ou par le vendeur (téléphone ou sur place)</a:t>
-            </a:r>
-            <a:endParaRPr b="0" lang="en-US" sz="2200" spc="-1" strike="noStrike">
+              <a:t> : la commande est enregistrée dans le système sur action du client (via le site web) ou du vendeur (téléphone ou sur place)</a:t>
+            </a:r>
+            <a:endParaRPr b="0" lang="fr-FR" sz="2200" spc="-1" strike="noStrike">
               <a:latin typeface="Arial"/>
             </a:endParaRPr>
           </a:p>
@@ -6589,7 +6517,7 @@
               </a:spcAft>
             </a:pPr>
             <a:r>
-              <a:rPr b="0" lang="en-US" sz="2200" spc="-1" strike="noStrike">
+              <a:rPr b="0" lang="fr-FR" sz="2200" spc="-1" strike="noStrike">
                 <a:solidFill>
                   <a:srgbClr val="1c1c1c"/>
                 </a:solidFill>
@@ -6599,7 +6527,7 @@
               <a:t>2 – </a:t>
             </a:r>
             <a:r>
-              <a:rPr b="1" lang="en-US" sz="2200" spc="-1" strike="noStrike">
+              <a:rPr b="1" lang="fr-FR" sz="2200" spc="-1" strike="noStrike">
                 <a:solidFill>
                   <a:srgbClr val="1c1c1c"/>
                 </a:solidFill>
@@ -6609,16 +6537,16 @@
               <a:t>Détermination du lieu de production</a:t>
             </a:r>
             <a:r>
-              <a:rPr b="0" lang="en-US" sz="2200" spc="-1" strike="noStrike">
+              <a:rPr b="0" lang="fr-FR" sz="2200" spc="-1" strike="noStrike">
                 <a:solidFill>
                   <a:srgbClr val="1c1c1c"/>
                 </a:solidFill>
                 <a:latin typeface="Arial"/>
                 <a:ea typeface="DejaVu Sans"/>
               </a:rPr>
-              <a:t> : déterminé par la géolocalisation ou par l’affluence</a:t>
-            </a:r>
-            <a:endParaRPr b="0" lang="en-US" sz="2200" spc="-1" strike="noStrike">
+              <a:t> : déterminé par la géolocalisation ou par l’affluence, ou bien choisi par le client</a:t>
+            </a:r>
+            <a:endParaRPr b="0" lang="fr-FR" sz="2200" spc="-1" strike="noStrike">
               <a:latin typeface="Arial"/>
             </a:endParaRPr>
           </a:p>
@@ -6632,7 +6560,7 @@
               </a:spcAft>
             </a:pPr>
             <a:r>
-              <a:rPr b="0" lang="en-US" sz="2200" spc="-1" strike="noStrike">
+              <a:rPr b="0" lang="fr-FR" sz="2200" spc="-1" strike="noStrike">
                 <a:solidFill>
                   <a:srgbClr val="1c1c1c"/>
                 </a:solidFill>
@@ -6642,7 +6570,7 @@
               <a:t>3 – </a:t>
             </a:r>
             <a:r>
-              <a:rPr b="1" lang="en-US" sz="2200" spc="-1" strike="noStrike">
+              <a:rPr b="1" lang="fr-FR" sz="2200" spc="-1" strike="noStrike">
                 <a:solidFill>
                   <a:srgbClr val="1c1c1c"/>
                 </a:solidFill>
@@ -6652,7 +6580,7 @@
               <a:t>Réception de la commande au restaurant choisi </a:t>
             </a:r>
             <a:r>
-              <a:rPr b="0" lang="en-US" sz="2200" spc="-1" strike="noStrike">
+              <a:rPr b="0" lang="fr-FR" sz="2200" spc="-1" strike="noStrike">
                 <a:solidFill>
                   <a:srgbClr val="1c1c1c"/>
                 </a:solidFill>
@@ -6661,7 +6589,7 @@
               </a:rPr>
               <a:t>: la commande est attribuée à un restaurant et est ajoutée à sa liste</a:t>
             </a:r>
-            <a:endParaRPr b="0" lang="en-US" sz="2200" spc="-1" strike="noStrike">
+            <a:endParaRPr b="0" lang="fr-FR" sz="2200" spc="-1" strike="noStrike">
               <a:latin typeface="Arial"/>
             </a:endParaRPr>
           </a:p>
@@ -6675,7 +6603,7 @@
               </a:spcAft>
             </a:pPr>
             <a:r>
-              <a:rPr b="0" lang="en-US" sz="2200" spc="-1" strike="noStrike">
+              <a:rPr b="0" lang="fr-FR" sz="2200" spc="-1" strike="noStrike">
                 <a:solidFill>
                   <a:srgbClr val="1c1c1c"/>
                 </a:solidFill>
@@ -6685,7 +6613,7 @@
               <a:t>4 – </a:t>
             </a:r>
             <a:r>
-              <a:rPr b="1" lang="en-US" sz="2200" spc="-1" strike="noStrike">
+              <a:rPr b="1" lang="fr-FR" sz="2200" spc="-1" strike="noStrike">
                 <a:solidFill>
                   <a:srgbClr val="1c1c1c"/>
                 </a:solidFill>
@@ -6695,7 +6623,7 @@
               <a:t>Préparation</a:t>
             </a:r>
             <a:r>
-              <a:rPr b="0" lang="en-US" sz="2200" spc="-1" strike="noStrike">
+              <a:rPr b="0" lang="fr-FR" sz="2200" spc="-1" strike="noStrike">
                 <a:solidFill>
                   <a:srgbClr val="1c1c1c"/>
                 </a:solidFill>
@@ -6704,7 +6632,7 @@
               </a:rPr>
               <a:t> : le cuisinier prépare la prochaine commande sur la liste</a:t>
             </a:r>
-            <a:endParaRPr b="0" lang="en-US" sz="2200" spc="-1" strike="noStrike">
+            <a:endParaRPr b="0" lang="fr-FR" sz="2200" spc="-1" strike="noStrike">
               <a:latin typeface="Arial"/>
             </a:endParaRPr>
           </a:p>
@@ -6718,7 +6646,7 @@
               </a:spcAft>
             </a:pPr>
             <a:r>
-              <a:rPr b="0" lang="en-US" sz="2200" spc="-1" strike="noStrike">
+              <a:rPr b="0" lang="fr-FR" sz="2200" spc="-1" strike="noStrike">
                 <a:solidFill>
                   <a:srgbClr val="1c1c1c"/>
                 </a:solidFill>
@@ -6728,7 +6656,7 @@
               <a:t>5 – </a:t>
             </a:r>
             <a:r>
-              <a:rPr b="1" lang="en-US" sz="2200" spc="-1" strike="noStrike">
+              <a:rPr b="1" lang="fr-FR" sz="2200" spc="-1" strike="noStrike">
                 <a:solidFill>
                   <a:srgbClr val="1c1c1c"/>
                 </a:solidFill>
@@ -6738,7 +6666,7 @@
               <a:t>Livraison</a:t>
             </a:r>
             <a:r>
-              <a:rPr b="0" lang="en-US" sz="2200" spc="-1" strike="noStrike">
+              <a:rPr b="0" lang="fr-FR" sz="2200" spc="-1" strike="noStrike">
                 <a:solidFill>
                   <a:srgbClr val="1c1c1c"/>
                 </a:solidFill>
@@ -6747,7 +6675,7 @@
               </a:rPr>
               <a:t> : le livreur est notifié par sa tablette de la prochaine commande à livrer</a:t>
             </a:r>
-            <a:endParaRPr b="0" lang="en-US" sz="2200" spc="-1" strike="noStrike">
+            <a:endParaRPr b="0" lang="fr-FR" sz="2200" spc="-1" strike="noStrike">
               <a:latin typeface="Arial"/>
             </a:endParaRPr>
           </a:p>
@@ -6763,33 +6691,6 @@
       <p:transition spd="slow"/>
     </mc:Fallback>
   </mc:AlternateContent>
-  <p:timing>
-    <p:tnLst>
-      <p:par>
-        <p:cTn id="11" dur="indefinite" restart="never" nodeType="tmRoot">
-          <p:childTnLst>
-            <p:seq>
-              <p:cTn id="12" dur="indefinite" nodeType="mainSeq"/>
-              <p:prevCondLst>
-                <p:cond delay="0" evt="onPrev">
-                  <p:tgtEl>
-                    <p:sldTgt/>
-                  </p:tgtEl>
-                </p:cond>
-              </p:prevCondLst>
-              <p:nextCondLst>
-                <p:cond delay="0" evt="onNext">
-                  <p:tgtEl>
-                    <p:sldTgt/>
-                  </p:tgtEl>
-                </p:cond>
-              </p:nextCondLst>
-            </p:seq>
-          </p:childTnLst>
-        </p:cTn>
-      </p:par>
-    </p:tnLst>
-  </p:timing>
 </p:sld>
 </file>
 
@@ -6812,14 +6713,14 @@
       </p:grpSpPr>
       <p:sp>
         <p:nvSpPr>
-          <p:cNvPr id="135" name="CustomShape 1"/>
+          <p:cNvPr id="136" name="CustomShape 1"/>
           <p:cNvSpPr/>
           <p:nvPr/>
         </p:nvSpPr>
         <p:spPr>
           <a:xfrm>
-            <a:off x="504000" y="687960"/>
-            <a:ext cx="9071640" cy="488160"/>
+            <a:off x="360000" y="360000"/>
+            <a:ext cx="9357840" cy="897840"/>
           </a:xfrm>
           <a:prstGeom prst="rect">
             <a:avLst/>
@@ -6836,8 +6737,8 @@
           <a:fontRef idx="minor"/>
         </p:style>
         <p:txBody>
-          <a:bodyPr lIns="0" rIns="0" tIns="0" bIns="0" anchor="ctr">
-            <a:spAutoFit/>
+          <a:bodyPr lIns="0" rIns="0" tIns="0" bIns="0" anchor="b">
+            <a:noAutofit/>
           </a:bodyPr>
           <a:p>
             <a:pPr>
@@ -6846,31 +6747,31 @@
               </a:lnSpc>
             </a:pPr>
             <a:r>
-              <a:rPr b="1" lang="en-US" sz="3200" spc="-1" strike="noStrike">
+              <a:rPr b="1" lang="fr-FR" sz="3200" spc="-1" strike="noStrike">
                 <a:solidFill>
                   <a:srgbClr val="ffffff"/>
                 </a:solidFill>
                 <a:latin typeface="Source Sans Pro Black"/>
                 <a:ea typeface="DejaVu Sans"/>
               </a:rPr>
-              <a:t>Parcours de la livraison</a:t>
-            </a:r>
-            <a:endParaRPr b="0" lang="en-US" sz="3200" spc="-1" strike="noStrike">
-              <a:latin typeface="Arial"/>
-            </a:endParaRPr>
-          </a:p>
-        </p:txBody>
-      </p:sp>
-      <p:sp>
-        <p:nvSpPr>
-          <p:cNvPr id="136" name="CustomShape 2"/>
-          <p:cNvSpPr/>
+              <a:t>Parcours de la commande</a:t>
+            </a:r>
+            <a:endParaRPr b="0" lang="fr-FR" sz="3200" spc="-1" strike="noStrike">
+              <a:latin typeface="Arial"/>
+            </a:endParaRPr>
+          </a:p>
+        </p:txBody>
+      </p:sp>
+      <p:sp>
+        <p:nvSpPr>
+          <p:cNvPr id="137" name="TextShape 2"/>
+          <p:cNvSpPr txBox="1"/>
           <p:nvPr/>
         </p:nvSpPr>
         <p:spPr>
           <a:xfrm>
-            <a:off x="504000" y="2527560"/>
-            <a:ext cx="9071640" cy="2865960"/>
+            <a:off x="576000" y="1838520"/>
+            <a:ext cx="8712000" cy="4929480"/>
           </a:xfrm>
           <a:prstGeom prst="rect">
             <a:avLst/>
@@ -6880,105 +6781,317 @@
             <a:noFill/>
           </a:ln>
         </p:spPr>
-        <p:style>
-          <a:lnRef idx="0"/>
-          <a:fillRef idx="0"/>
-          <a:effectRef idx="0"/>
-          <a:fontRef idx="minor"/>
-        </p:style>
-        <p:txBody>
-          <a:bodyPr lIns="0" rIns="0" tIns="0" bIns="0" anchor="ctr">
-            <a:spAutoFit/>
-          </a:bodyPr>
-          <a:p>
-            <a:pPr>
+        <p:txBody>
+          <a:bodyPr lIns="90000" rIns="90000" tIns="45000" bIns="45000">
+            <a:noAutofit/>
+          </a:bodyPr>
+          <a:p>
+            <a:pPr marL="216000" indent="-216000">
               <a:lnSpc>
                 <a:spcPct val="100000"/>
               </a:lnSpc>
               <a:spcBef>
-                <a:spcPts val="1151"/>
+                <a:spcPts val="567"/>
               </a:spcBef>
               <a:spcAft>
-                <a:spcPts val="1151"/>
+                <a:spcPts val="567"/>
               </a:spcAft>
+              <a:buClr>
+                <a:srgbClr val="000000"/>
+              </a:buClr>
+              <a:buFont typeface="StarSymbol"/>
+              <a:buAutoNum type="arabicPeriod"/>
             </a:pPr>
             <a:r>
-              <a:rPr b="0" lang="en-US" sz="2000" spc="-1" strike="noStrike">
-                <a:solidFill>
-                  <a:srgbClr val="1c1c1c"/>
-                </a:solidFill>
-                <a:latin typeface="Arial"/>
-                <a:ea typeface="DejaVu Sans"/>
-              </a:rPr>
-              <a:t>1 – Le livreur change le statut d’avancement “En attente de livraison” à “En cours de livraison”</a:t>
-            </a:r>
-            <a:endParaRPr b="0" lang="en-US" sz="2000" spc="-1" strike="noStrike">
-              <a:latin typeface="Arial"/>
-            </a:endParaRPr>
-          </a:p>
-          <a:p>
-            <a:pPr>
+              <a:rPr b="0" lang="fr-FR" sz="2000" spc="-1" strike="noStrike">
+                <a:solidFill>
+                  <a:srgbClr val="000000"/>
+                </a:solidFill>
+                <a:latin typeface="Arial"/>
+              </a:rPr>
+              <a:t> </a:t>
+            </a:r>
+            <a:r>
+              <a:rPr b="0" lang="fr-FR" sz="2000" spc="-1" strike="noStrike">
+                <a:solidFill>
+                  <a:srgbClr val="000000"/>
+                </a:solidFill>
+                <a:latin typeface="Arial"/>
+              </a:rPr>
+              <a:t>Après réception par le restaurant choisi ou attribué, la commande est ajoutée à la liste des commandes à préparer</a:t>
+            </a:r>
+            <a:endParaRPr b="0" lang="fr-FR" sz="2000" spc="-1" strike="noStrike">
+              <a:solidFill>
+                <a:srgbClr val="000000"/>
+              </a:solidFill>
+              <a:latin typeface="Arial"/>
+              <a:ea typeface="Microsoft YaHei"/>
+            </a:endParaRPr>
+          </a:p>
+          <a:p>
+            <a:pPr marL="216000" indent="-216000">
               <a:lnSpc>
                 <a:spcPct val="100000"/>
               </a:lnSpc>
               <a:spcBef>
-                <a:spcPts val="1151"/>
+                <a:spcPts val="567"/>
               </a:spcBef>
               <a:spcAft>
-                <a:spcPts val="1151"/>
+                <a:spcPts val="567"/>
               </a:spcAft>
+              <a:buClr>
+                <a:srgbClr val="000000"/>
+              </a:buClr>
+              <a:buFont typeface="StarSymbol"/>
+              <a:buAutoNum type="arabicPeriod"/>
             </a:pPr>
             <a:r>
-              <a:rPr b="0" lang="en-US" sz="2000" spc="-1" strike="noStrike">
-                <a:solidFill>
-                  <a:srgbClr val="1c1c1c"/>
-                </a:solidFill>
-                <a:latin typeface="Arial"/>
-                <a:ea typeface="DejaVu Sans"/>
-              </a:rPr>
-              <a:t>2 – Si la commande n’a pas le statut de paiement “Payée”, le livreur encaisse la commande et met à jour le statut</a:t>
-            </a:r>
-            <a:endParaRPr b="0" lang="en-US" sz="2000" spc="-1" strike="noStrike">
-              <a:latin typeface="Arial"/>
-            </a:endParaRPr>
-          </a:p>
-          <a:p>
-            <a:pPr>
+              <a:rPr b="0" lang="fr-FR" sz="2000" spc="-1" strike="noStrike">
+                <a:solidFill>
+                  <a:srgbClr val="000000"/>
+                </a:solidFill>
+                <a:latin typeface="Arial"/>
+              </a:rPr>
+              <a:t> </a:t>
+            </a:r>
+            <a:r>
+              <a:rPr b="0" lang="fr-FR" sz="2000" spc="-1" strike="noStrike">
+                <a:solidFill>
+                  <a:srgbClr val="000000"/>
+                </a:solidFill>
+                <a:latin typeface="Arial"/>
+              </a:rPr>
+              <a:t>La commande est sélectionnée par le cuisinier, qui modifie son statut de « En attente de préparation » à  « En cours de préparation ». Désormais, le client ne peut plus modifier ou annuler sa commande.</a:t>
+            </a:r>
+            <a:endParaRPr b="0" lang="fr-FR" sz="2000" spc="-1" strike="noStrike">
+              <a:solidFill>
+                <a:srgbClr val="000000"/>
+              </a:solidFill>
+              <a:latin typeface="Arial"/>
+              <a:ea typeface="Microsoft YaHei"/>
+            </a:endParaRPr>
+          </a:p>
+          <a:p>
+            <a:pPr marL="216000" indent="-216000">
               <a:lnSpc>
                 <a:spcPct val="100000"/>
               </a:lnSpc>
               <a:spcBef>
-                <a:spcPts val="1151"/>
+                <a:spcPts val="567"/>
               </a:spcBef>
               <a:spcAft>
-                <a:spcPts val="1151"/>
+                <a:spcPts val="567"/>
               </a:spcAft>
+              <a:buClr>
+                <a:srgbClr val="000000"/>
+              </a:buClr>
+              <a:buFont typeface="StarSymbol"/>
+              <a:buAutoNum type="arabicPeriod"/>
             </a:pPr>
             <a:r>
-              <a:rPr b="0" lang="en-US" sz="2000" spc="-1" strike="noStrike">
-                <a:solidFill>
-                  <a:srgbClr val="1c1c1c"/>
-                </a:solidFill>
-                <a:latin typeface="Arial"/>
-                <a:ea typeface="DejaVu Sans"/>
-              </a:rPr>
-              <a:t>3 – Le livreur livre la commande et modifie le statut d’avancement de “En cours de livraison” à “Livrée”</a:t>
-            </a:r>
-            <a:endParaRPr b="0" lang="en-US" sz="2000" spc="-1" strike="noStrike">
-              <a:latin typeface="Arial"/>
-            </a:endParaRPr>
-          </a:p>
-          <a:p>
-            <a:pPr>
+              <a:rPr b="0" lang="fr-FR" sz="2000" spc="-1" strike="noStrike">
+                <a:solidFill>
+                  <a:srgbClr val="000000"/>
+                </a:solidFill>
+                <a:latin typeface="Arial"/>
+              </a:rPr>
+              <a:t> </a:t>
+            </a:r>
+            <a:r>
+              <a:rPr b="0" lang="fr-FR" sz="2000" spc="-1" strike="noStrike">
+                <a:solidFill>
+                  <a:srgbClr val="000000"/>
+                </a:solidFill>
+                <a:latin typeface="Arial"/>
+              </a:rPr>
+              <a:t>Quand la commande est prête, il modifie son statut de « En cours de préparation » à « Prête à être livrée »</a:t>
+            </a:r>
+            <a:endParaRPr b="0" lang="fr-FR" sz="2000" spc="-1" strike="noStrike">
+              <a:solidFill>
+                <a:srgbClr val="000000"/>
+              </a:solidFill>
+              <a:latin typeface="Arial"/>
+              <a:ea typeface="Microsoft YaHei"/>
+            </a:endParaRPr>
+          </a:p>
+          <a:p>
+            <a:pPr marL="216000" indent="-216000">
               <a:lnSpc>
                 <a:spcPct val="100000"/>
               </a:lnSpc>
+              <a:spcBef>
+                <a:spcPts val="584"/>
+              </a:spcBef>
               <a:spcAft>
-                <a:spcPts val="1142"/>
+                <a:spcPts val="584"/>
               </a:spcAft>
+              <a:buClr>
+                <a:srgbClr val="000000"/>
+              </a:buClr>
+              <a:buFont typeface="StarSymbol"/>
+              <a:buAutoNum type="arabicPeriod"/>
             </a:pPr>
-            <a:endParaRPr b="0" lang="en-US" sz="2000" spc="-1" strike="noStrike">
-              <a:latin typeface="Arial"/>
+            <a:r>
+              <a:rPr b="0" lang="fr-FR" sz="2000" spc="-1" strike="noStrike">
+                <a:solidFill>
+                  <a:srgbClr val="000000"/>
+                </a:solidFill>
+                <a:latin typeface="Arial"/>
+                <a:ea typeface="DejaVu Sans"/>
+              </a:rPr>
+              <a:t> </a:t>
+            </a:r>
+            <a:r>
+              <a:rPr b="0" lang="fr-FR" sz="2000" spc="-1" strike="noStrike">
+                <a:solidFill>
+                  <a:srgbClr val="000000"/>
+                </a:solidFill>
+                <a:latin typeface="Arial"/>
+                <a:ea typeface="DejaVu Sans"/>
+              </a:rPr>
+              <a:t>Le livreur change le statut d’avancement « Prête à être livrée » à « En cours de livraison »</a:t>
+            </a:r>
+            <a:endParaRPr b="0" lang="fr-FR" sz="2000" spc="-1" strike="noStrike">
+              <a:solidFill>
+                <a:srgbClr val="000000"/>
+              </a:solidFill>
+              <a:latin typeface="Arial"/>
+              <a:ea typeface="Microsoft YaHei"/>
+            </a:endParaRPr>
+          </a:p>
+          <a:p>
+            <a:pPr marL="216000" indent="-216000">
+              <a:lnSpc>
+                <a:spcPct val="100000"/>
+              </a:lnSpc>
+              <a:spcBef>
+                <a:spcPts val="584"/>
+              </a:spcBef>
+              <a:spcAft>
+                <a:spcPts val="584"/>
+              </a:spcAft>
+              <a:buClr>
+                <a:srgbClr val="000000"/>
+              </a:buClr>
+              <a:buFont typeface="StarSymbol"/>
+              <a:buAutoNum type="arabicPeriod"/>
+            </a:pPr>
+            <a:r>
+              <a:rPr b="0" lang="fr-FR" sz="2000" spc="-1" strike="noStrike">
+                <a:solidFill>
+                  <a:srgbClr val="000000"/>
+                </a:solidFill>
+                <a:latin typeface="Arial"/>
+                <a:ea typeface="DejaVu Sans"/>
+              </a:rPr>
+              <a:t> </a:t>
+            </a:r>
+            <a:r>
+              <a:rPr b="0" lang="fr-FR" sz="2000" spc="-1" strike="noStrike">
+                <a:solidFill>
+                  <a:srgbClr val="000000"/>
+                </a:solidFill>
+                <a:latin typeface="Arial"/>
+                <a:ea typeface="DejaVu Sans"/>
+              </a:rPr>
+              <a:t>Si la commande n’a pas le statut de paiement « Payée », le livreur encaisse la commande et met à jour le statut</a:t>
+            </a:r>
+            <a:endParaRPr b="0" lang="fr-FR" sz="2000" spc="-1" strike="noStrike">
+              <a:solidFill>
+                <a:srgbClr val="000000"/>
+              </a:solidFill>
+              <a:latin typeface="Arial"/>
+              <a:ea typeface="Microsoft YaHei"/>
+            </a:endParaRPr>
+          </a:p>
+          <a:p>
+            <a:pPr marL="216000" indent="-216000">
+              <a:lnSpc>
+                <a:spcPct val="100000"/>
+              </a:lnSpc>
+              <a:spcBef>
+                <a:spcPts val="567"/>
+              </a:spcBef>
+              <a:spcAft>
+                <a:spcPts val="567"/>
+              </a:spcAft>
+              <a:buClr>
+                <a:srgbClr val="000000"/>
+              </a:buClr>
+              <a:buFont typeface="StarSymbol"/>
+              <a:buAutoNum type="arabicPeriod"/>
+            </a:pPr>
+            <a:r>
+              <a:rPr b="0" lang="fr-FR" sz="2000" spc="-1" strike="noStrike">
+                <a:solidFill>
+                  <a:srgbClr val="000000"/>
+                </a:solidFill>
+                <a:latin typeface="Arial"/>
+                <a:ea typeface="DejaVu Sans"/>
+              </a:rPr>
+              <a:t> </a:t>
+            </a:r>
+            <a:r>
+              <a:rPr b="0" lang="fr-FR" sz="2000" spc="-1" strike="noStrike">
+                <a:solidFill>
+                  <a:srgbClr val="000000"/>
+                </a:solidFill>
+                <a:latin typeface="Arial"/>
+                <a:ea typeface="DejaVu Sans"/>
+              </a:rPr>
+              <a:t>Le livreur livre la commande et modifie le statut d’avancement de « En cours de livraison » à « Livrée »</a:t>
+            </a:r>
+            <a:r>
+              <a:rPr b="0" lang="fr-FR" sz="2000" spc="-1" strike="noStrike">
+                <a:solidFill>
+                  <a:srgbClr val="000000"/>
+                </a:solidFill>
+                <a:latin typeface="Arial"/>
+                <a:ea typeface="Microsoft YaHei"/>
+              </a:rPr>
+              <a:t> </a:t>
+            </a:r>
+            <a:endParaRPr b="0" lang="fr-FR" sz="2000" spc="-1" strike="noStrike">
+              <a:solidFill>
+                <a:srgbClr val="000000"/>
+              </a:solidFill>
+              <a:latin typeface="Arial"/>
+              <a:ea typeface="Microsoft YaHei"/>
+            </a:endParaRPr>
+          </a:p>
+          <a:p>
+            <a:pPr marL="216000" indent="-216000">
+              <a:lnSpc>
+                <a:spcPct val="100000"/>
+              </a:lnSpc>
+              <a:spcBef>
+                <a:spcPts val="567"/>
+              </a:spcBef>
+              <a:spcAft>
+                <a:spcPts val="567"/>
+              </a:spcAft>
+              <a:buClr>
+                <a:srgbClr val="000000"/>
+              </a:buClr>
+              <a:buFont typeface="StarSymbol"/>
+              <a:buAutoNum type="arabicPeriod"/>
+            </a:pPr>
+            <a:r>
+              <a:rPr b="0" lang="fr-FR" sz="2000" spc="-1" strike="noStrike">
+                <a:solidFill>
+                  <a:srgbClr val="000000"/>
+                </a:solidFill>
+                <a:latin typeface="Arial"/>
+                <a:ea typeface="Microsoft YaHei"/>
+              </a:rPr>
+              <a:t>Le client peut désormais noter le service sur le site web.</a:t>
+            </a:r>
+            <a:endParaRPr b="0" lang="fr-FR" sz="2000" spc="-1" strike="noStrike">
+              <a:solidFill>
+                <a:srgbClr val="000000"/>
+              </a:solidFill>
+              <a:latin typeface="Arial"/>
+              <a:ea typeface="Microsoft YaHei"/>
             </a:endParaRPr>
           </a:p>
         </p:txBody>
@@ -6993,33 +7106,6 @@
       <p:transition spd="slow"/>
     </mc:Fallback>
   </mc:AlternateContent>
-  <p:timing>
-    <p:tnLst>
-      <p:par>
-        <p:cTn id="13" dur="indefinite" restart="never" nodeType="tmRoot">
-          <p:childTnLst>
-            <p:seq>
-              <p:cTn id="14" dur="indefinite" nodeType="mainSeq"/>
-              <p:prevCondLst>
-                <p:cond delay="0" evt="onPrev">
-                  <p:tgtEl>
-                    <p:sldTgt/>
-                  </p:tgtEl>
-                </p:cond>
-              </p:prevCondLst>
-              <p:nextCondLst>
-                <p:cond delay="0" evt="onNext">
-                  <p:tgtEl>
-                    <p:sldTgt/>
-                  </p:tgtEl>
-                </p:cond>
-              </p:nextCondLst>
-            </p:seq>
-          </p:childTnLst>
-        </p:cTn>
-      </p:par>
-    </p:tnLst>
-  </p:timing>
 </p:sld>
 </file>
 
@@ -7042,14 +7128,14 @@
       </p:grpSpPr>
       <p:sp>
         <p:nvSpPr>
-          <p:cNvPr id="137" name="CustomShape 1"/>
+          <p:cNvPr id="138" name="CustomShape 1"/>
           <p:cNvSpPr/>
           <p:nvPr/>
         </p:nvSpPr>
         <p:spPr>
           <a:xfrm>
             <a:off x="360000" y="360000"/>
-            <a:ext cx="9358920" cy="898920"/>
+            <a:ext cx="9357840" cy="897840"/>
           </a:xfrm>
           <a:prstGeom prst="rect">
             <a:avLst/>
@@ -7076,7 +7162,7 @@
               </a:lnSpc>
             </a:pPr>
             <a:r>
-              <a:rPr b="1" lang="en-US" sz="3200" spc="-1" strike="noStrike">
+              <a:rPr b="1" lang="fr-FR" sz="3200" spc="-1" strike="noStrike">
                 <a:solidFill>
                   <a:srgbClr val="ffffff"/>
                 </a:solidFill>
@@ -7085,22 +7171,22 @@
               </a:rPr>
               <a:t>Proposition de la réalisation technique de la solution</a:t>
             </a:r>
-            <a:endParaRPr b="0" lang="en-US" sz="3200" spc="-1" strike="noStrike">
-              <a:latin typeface="Arial"/>
-            </a:endParaRPr>
-          </a:p>
-        </p:txBody>
-      </p:sp>
-      <p:sp>
-        <p:nvSpPr>
-          <p:cNvPr id="138" name="CustomShape 2"/>
+            <a:endParaRPr b="0" lang="fr-FR" sz="3200" spc="-1" strike="noStrike">
+              <a:latin typeface="Arial"/>
+            </a:endParaRPr>
+          </a:p>
+        </p:txBody>
+      </p:sp>
+      <p:sp>
+        <p:nvSpPr>
+          <p:cNvPr id="139" name="CustomShape 2"/>
           <p:cNvSpPr/>
           <p:nvPr/>
         </p:nvSpPr>
         <p:spPr>
           <a:xfrm>
             <a:off x="360000" y="1980000"/>
-            <a:ext cx="9178920" cy="4678920"/>
+            <a:ext cx="9177840" cy="4677840"/>
           </a:xfrm>
           <a:prstGeom prst="rect">
             <a:avLst/>
@@ -7126,20 +7212,160 @@
                 <a:spcPct val="100000"/>
               </a:lnSpc>
               <a:spcAft>
-                <a:spcPts val="2449"/>
+                <a:spcPts val="1417"/>
               </a:spcAft>
             </a:pPr>
             <a:r>
-              <a:rPr b="0" lang="en-US" sz="2200" spc="-1" strike="noStrike">
+              <a:rPr b="0" lang="fr-FR" sz="2000" spc="-1" strike="noStrike">
                 <a:solidFill>
                   <a:srgbClr val="1c1c1c"/>
                 </a:solidFill>
                 <a:latin typeface="Arial"/>
                 <a:ea typeface="DejaVu Sans"/>
               </a:rPr>
+              <a:t>Les choix qui ont motivé nos propositions ont été faits sur plusieurs critères :</a:t>
+            </a:r>
+            <a:endParaRPr b="0" lang="fr-FR" sz="2000" spc="-1" strike="noStrike">
+              <a:latin typeface="Arial"/>
+            </a:endParaRPr>
+          </a:p>
+          <a:p>
+            <a:pPr marL="216000" indent="-216000">
+              <a:lnSpc>
+                <a:spcPct val="100000"/>
+              </a:lnSpc>
+              <a:spcAft>
+                <a:spcPts val="1417"/>
+              </a:spcAft>
+              <a:buClr>
+                <a:srgbClr val="1c1c1c"/>
+              </a:buClr>
+              <a:buFont typeface="Symbol" charset="2"/>
+              <a:buChar char=""/>
+            </a:pPr>
+            <a:r>
+              <a:rPr b="0" lang="fr-FR" sz="2000" spc="-1" strike="noStrike">
+                <a:solidFill>
+                  <a:srgbClr val="1c1c1c"/>
+                </a:solidFill>
+                <a:latin typeface="Arial"/>
+                <a:ea typeface="DejaVu Sans"/>
+              </a:rPr>
+              <a:t> </a:t>
+            </a:r>
+            <a:r>
+              <a:rPr b="0" lang="fr-FR" sz="2000" spc="-1" strike="noStrike">
+                <a:solidFill>
+                  <a:srgbClr val="1c1c1c"/>
+                </a:solidFill>
+                <a:latin typeface="Arial"/>
+                <a:ea typeface="DejaVu Sans"/>
+              </a:rPr>
+              <a:t>Simplicité d’utilisation</a:t>
+            </a:r>
+            <a:endParaRPr b="0" lang="fr-FR" sz="2000" spc="-1" strike="noStrike">
+              <a:latin typeface="Arial"/>
+            </a:endParaRPr>
+          </a:p>
+          <a:p>
+            <a:pPr marL="216000" indent="-216000">
+              <a:lnSpc>
+                <a:spcPct val="100000"/>
+              </a:lnSpc>
+              <a:spcAft>
+                <a:spcPts val="1417"/>
+              </a:spcAft>
+              <a:buClr>
+                <a:srgbClr val="1c1c1c"/>
+              </a:buClr>
+              <a:buFont typeface="Symbol" charset="2"/>
+              <a:buChar char=""/>
+            </a:pPr>
+            <a:r>
+              <a:rPr b="0" lang="fr-FR" sz="2000" spc="-1" strike="noStrike">
+                <a:solidFill>
+                  <a:srgbClr val="1c1c1c"/>
+                </a:solidFill>
+                <a:latin typeface="Arial"/>
+                <a:ea typeface="DejaVu Sans"/>
+              </a:rPr>
+              <a:t> </a:t>
+            </a:r>
+            <a:r>
+              <a:rPr b="0" lang="fr-FR" sz="2000" spc="-1" strike="noStrike">
+                <a:solidFill>
+                  <a:srgbClr val="1c1c1c"/>
+                </a:solidFill>
+                <a:latin typeface="Arial"/>
+                <a:ea typeface="DejaVu Sans"/>
+              </a:rPr>
+              <a:t>Rapidité de mise en œuvre</a:t>
+            </a:r>
+            <a:endParaRPr b="0" lang="fr-FR" sz="2000" spc="-1" strike="noStrike">
+              <a:latin typeface="Arial"/>
+            </a:endParaRPr>
+          </a:p>
+          <a:p>
+            <a:pPr marL="216000" indent="-216000">
+              <a:lnSpc>
+                <a:spcPct val="100000"/>
+              </a:lnSpc>
+              <a:spcAft>
+                <a:spcPts val="1417"/>
+              </a:spcAft>
+              <a:buClr>
+                <a:srgbClr val="1c1c1c"/>
+              </a:buClr>
+              <a:buFont typeface="Symbol" charset="2"/>
+              <a:buChar char=""/>
+            </a:pPr>
+            <a:r>
+              <a:rPr b="0" lang="fr-FR" sz="2000" spc="-1" strike="noStrike">
+                <a:solidFill>
+                  <a:srgbClr val="1c1c1c"/>
+                </a:solidFill>
+                <a:latin typeface="Arial"/>
+                <a:ea typeface="DejaVu Sans"/>
+              </a:rPr>
+              <a:t> </a:t>
+            </a:r>
+            <a:r>
+              <a:rPr b="0" lang="fr-FR" sz="2000" spc="-1" strike="noStrike">
+                <a:solidFill>
+                  <a:srgbClr val="1c1c1c"/>
+                </a:solidFill>
+                <a:latin typeface="Arial"/>
+                <a:ea typeface="DejaVu Sans"/>
+              </a:rPr>
+              <a:t>Limitation des coûts</a:t>
+            </a:r>
+            <a:endParaRPr b="0" lang="fr-FR" sz="2000" spc="-1" strike="noStrike">
+              <a:latin typeface="Arial"/>
+            </a:endParaRPr>
+          </a:p>
+          <a:p>
+            <a:pPr>
+              <a:lnSpc>
+                <a:spcPct val="100000"/>
+              </a:lnSpc>
+              <a:spcBef>
+                <a:spcPts val="1984"/>
+              </a:spcBef>
+              <a:spcAft>
+                <a:spcPts val="2438"/>
+              </a:spcAft>
+            </a:pPr>
+            <a:r>
+              <a:rPr b="0" lang="fr-FR" sz="2000" spc="-1" strike="noStrike">
+                <a:solidFill>
+                  <a:srgbClr val="1c1c1c"/>
+                </a:solidFill>
+                <a:latin typeface="Arial"/>
+                <a:ea typeface="DejaVu Sans"/>
+              </a:rPr>
               <a:t>Découpable en plusieurs parties :</a:t>
             </a:r>
-            <a:endParaRPr b="0" lang="en-US" sz="2200" spc="-1" strike="noStrike">
+            <a:endParaRPr b="0" lang="fr-FR" sz="2000" spc="-1" strike="noStrike">
               <a:latin typeface="Arial"/>
             </a:endParaRPr>
           </a:p>
@@ -7153,7 +7379,7 @@
               </a:spcAft>
             </a:pPr>
             <a:r>
-              <a:rPr b="0" lang="en-US" sz="2200" spc="-1" strike="noStrike">
+              <a:rPr b="0" lang="fr-FR" sz="2000" spc="-1" strike="noStrike">
                 <a:solidFill>
                   <a:srgbClr val="1c1c1c"/>
                 </a:solidFill>
@@ -7163,7 +7389,7 @@
               <a:t>- </a:t>
             </a:r>
             <a:r>
-              <a:rPr b="1" lang="en-US" sz="2200" spc="-1" strike="noStrike">
+              <a:rPr b="1" lang="fr-FR" sz="2000" spc="-1" strike="noStrike">
                 <a:solidFill>
                   <a:srgbClr val="1c1c1c"/>
                 </a:solidFill>
@@ -7173,7 +7399,7 @@
               <a:t>Backend</a:t>
             </a:r>
             <a:r>
-              <a:rPr b="0" lang="en-US" sz="2200" spc="-1" strike="noStrike">
+              <a:rPr b="0" lang="fr-FR" sz="2000" spc="-1" strike="noStrike">
                 <a:solidFill>
                   <a:srgbClr val="1c1c1c"/>
                 </a:solidFill>
@@ -7182,7 +7408,7 @@
               </a:rPr>
               <a:t> : Python, Django</a:t>
             </a:r>
-            <a:endParaRPr b="0" lang="en-US" sz="2200" spc="-1" strike="noStrike">
+            <a:endParaRPr b="0" lang="fr-FR" sz="2000" spc="-1" strike="noStrike">
               <a:latin typeface="Arial"/>
             </a:endParaRPr>
           </a:p>
@@ -7196,7 +7422,7 @@
               </a:spcAft>
             </a:pPr>
             <a:r>
-              <a:rPr b="0" lang="en-US" sz="2200" spc="-1" strike="noStrike">
+              <a:rPr b="0" lang="fr-FR" sz="2000" spc="-1" strike="noStrike">
                 <a:solidFill>
                   <a:srgbClr val="1c1c1c"/>
                 </a:solidFill>
@@ -7206,7 +7432,7 @@
               <a:t>- </a:t>
             </a:r>
             <a:r>
-              <a:rPr b="1" lang="en-US" sz="2200" spc="-1" strike="noStrike">
+              <a:rPr b="1" lang="fr-FR" sz="2000" spc="-1" strike="noStrike">
                 <a:solidFill>
                   <a:srgbClr val="1c1c1c"/>
                 </a:solidFill>
@@ -7216,7 +7442,7 @@
               <a:t>Base de donnée</a:t>
             </a:r>
             <a:r>
-              <a:rPr b="0" lang="en-US" sz="2200" spc="-1" strike="noStrike">
+              <a:rPr b="0" lang="fr-FR" sz="2000" spc="-1" strike="noStrike">
                 <a:solidFill>
                   <a:srgbClr val="1c1c1c"/>
                 </a:solidFill>
@@ -7225,7 +7451,7 @@
               </a:rPr>
               <a:t> : Postgres SQL</a:t>
             </a:r>
-            <a:endParaRPr b="0" lang="en-US" sz="2200" spc="-1" strike="noStrike">
+            <a:endParaRPr b="0" lang="fr-FR" sz="2000" spc="-1" strike="noStrike">
               <a:latin typeface="Arial"/>
             </a:endParaRPr>
           </a:p>
@@ -7239,7 +7465,7 @@
               </a:spcAft>
             </a:pPr>
             <a:r>
-              <a:rPr b="0" lang="en-US" sz="2200" spc="-1" strike="noStrike">
+              <a:rPr b="0" lang="fr-FR" sz="2000" spc="-1" strike="noStrike">
                 <a:solidFill>
                   <a:srgbClr val="1c1c1c"/>
                 </a:solidFill>
@@ -7249,7 +7475,7 @@
               <a:t>- </a:t>
             </a:r>
             <a:r>
-              <a:rPr b="1" lang="en-US" sz="2200" spc="-1" strike="noStrike">
+              <a:rPr b="1" lang="fr-FR" sz="2000" spc="-1" strike="noStrike">
                 <a:solidFill>
                   <a:srgbClr val="1c1c1c"/>
                 </a:solidFill>
@@ -7259,7 +7485,7 @@
               <a:t>Frontend</a:t>
             </a:r>
             <a:r>
-              <a:rPr b="0" lang="en-US" sz="2200" spc="-1" strike="noStrike">
+              <a:rPr b="0" lang="fr-FR" sz="2000" spc="-1" strike="noStrike">
                 <a:solidFill>
                   <a:srgbClr val="1c1c1c"/>
                 </a:solidFill>
@@ -7268,7 +7494,7 @@
               </a:rPr>
               <a:t> : Angular </a:t>
             </a:r>
-            <a:endParaRPr b="0" lang="en-US" sz="2200" spc="-1" strike="noStrike">
+            <a:endParaRPr b="0" lang="fr-FR" sz="2000" spc="-1" strike="noStrike">
               <a:latin typeface="Arial"/>
             </a:endParaRPr>
           </a:p>
@@ -7282,7 +7508,7 @@
               </a:spcAft>
             </a:pPr>
             <a:r>
-              <a:rPr b="0" lang="en-US" sz="2200" spc="-1" strike="noStrike">
+              <a:rPr b="0" lang="fr-FR" sz="2000" spc="-1" strike="noStrike">
                 <a:solidFill>
                   <a:srgbClr val="1c1c1c"/>
                 </a:solidFill>
@@ -7292,26 +7518,36 @@
               <a:t>- </a:t>
             </a:r>
             <a:r>
-              <a:rPr b="1" lang="en-US" sz="2200" spc="-1" strike="noStrike">
+              <a:rPr b="1" lang="fr-FR" sz="2000" spc="-1" strike="noStrike">
                 <a:solidFill>
                   <a:srgbClr val="1c1c1c"/>
                 </a:solidFill>
                 <a:latin typeface="Arial"/>
                 <a:ea typeface="DejaVu Sans"/>
               </a:rPr>
-              <a:t>Application mobile</a:t>
-            </a:r>
-            <a:r>
-              <a:rPr b="0" lang="en-US" sz="2200" spc="-1" strike="noStrike">
+              <a:t>Application mobile sur tablette</a:t>
+            </a:r>
+            <a:r>
+              <a:rPr b="0" lang="fr-FR" sz="2000" spc="-1" strike="noStrike">
                 <a:solidFill>
                   <a:srgbClr val="1c1c1c"/>
                 </a:solidFill>
                 <a:latin typeface="Arial"/>
                 <a:ea typeface="DejaVu Sans"/>
               </a:rPr>
-              <a:t> : Android </a:t>
-            </a:r>
-            <a:endParaRPr b="0" lang="en-US" sz="2200" spc="-1" strike="noStrike">
+              <a:t> : Android</a:t>
+            </a:r>
+            <a:r>
+              <a:rPr b="0" lang="fr-FR" sz="2000" spc="-1" strike="noStrike">
+                <a:solidFill>
+                  <a:srgbClr val="1c1c1c"/>
+                </a:solidFill>
+                <a:latin typeface="Arial"/>
+                <a:ea typeface="DejaVu Sans"/>
+              </a:rPr>
+              <a:t> </a:t>
+            </a:r>
+            <a:endParaRPr b="0" lang="fr-FR" sz="2000" spc="-1" strike="noStrike">
               <a:latin typeface="Arial"/>
             </a:endParaRPr>
           </a:p>
@@ -7327,33 +7563,6 @@
       <p:transition spd="slow"/>
     </mc:Fallback>
   </mc:AlternateContent>
-  <p:timing>
-    <p:tnLst>
-      <p:par>
-        <p:cTn id="15" dur="indefinite" restart="never" nodeType="tmRoot">
-          <p:childTnLst>
-            <p:seq>
-              <p:cTn id="16" dur="indefinite" nodeType="mainSeq"/>
-              <p:prevCondLst>
-                <p:cond delay="0" evt="onPrev">
-                  <p:tgtEl>
-                    <p:sldTgt/>
-                  </p:tgtEl>
-                </p:cond>
-              </p:prevCondLst>
-              <p:nextCondLst>
-                <p:cond delay="0" evt="onNext">
-                  <p:tgtEl>
-                    <p:sldTgt/>
-                  </p:tgtEl>
-                </p:cond>
-              </p:nextCondLst>
-            </p:seq>
-          </p:childTnLst>
-        </p:cTn>
-      </p:par>
-    </p:tnLst>
-  </p:timing>
 </p:sld>
 </file>
 
@@ -7471,18 +7680,21 @@
             </a:schemeClr>
           </a:solidFill>
           <a:prstDash val="solid"/>
+          <a:miter/>
         </a:ln>
         <a:ln w="25400" cap="flat" cmpd="sng" algn="ctr">
           <a:solidFill>
             <a:schemeClr val="phClr"/>
           </a:solidFill>
           <a:prstDash val="solid"/>
+          <a:miter/>
         </a:ln>
         <a:ln w="38100" cap="flat" cmpd="sng" algn="ctr">
           <a:solidFill>
             <a:schemeClr val="phClr"/>
           </a:solidFill>
           <a:prstDash val="solid"/>
+          <a:miter/>
         </a:ln>
       </a:lnStyleLst>
       <a:effectStyleLst>
@@ -7694,18 +7906,21 @@
             </a:schemeClr>
           </a:solidFill>
           <a:prstDash val="solid"/>
+          <a:miter/>
         </a:ln>
         <a:ln w="25400" cap="flat" cmpd="sng" algn="ctr">
           <a:solidFill>
             <a:schemeClr val="phClr"/>
           </a:solidFill>
           <a:prstDash val="solid"/>
+          <a:miter/>
         </a:ln>
         <a:ln w="38100" cap="flat" cmpd="sng" algn="ctr">
           <a:solidFill>
             <a:schemeClr val="phClr"/>
           </a:solidFill>
           <a:prstDash val="solid"/>
+          <a:miter/>
         </a:ln>
       </a:lnStyleLst>
       <a:effectStyleLst>
@@ -7917,18 +8132,21 @@
             </a:schemeClr>
           </a:solidFill>
           <a:prstDash val="solid"/>
+          <a:miter/>
         </a:ln>
         <a:ln w="25400" cap="flat" cmpd="sng" algn="ctr">
           <a:solidFill>
             <a:schemeClr val="phClr"/>
           </a:solidFill>
           <a:prstDash val="solid"/>
+          <a:miter/>
         </a:ln>
         <a:ln w="38100" cap="flat" cmpd="sng" algn="ctr">
           <a:solidFill>
             <a:schemeClr val="phClr"/>
           </a:solidFill>
           <a:prstDash val="solid"/>
+          <a:miter/>
         </a:ln>
       </a:lnStyleLst>
       <a:effectStyleLst>

</xml_diff>

<commit_message>
fixed mispelled words and diagrams
</commit_message>
<xml_diff>
--- a/diapo_presentation_solution.pptx
+++ b/diapo_presentation_solution.pptx
@@ -4,17 +4,16 @@
   <p:sldMasterIdLst>
     <p:sldMasterId id="2147483648" r:id="rId2"/>
     <p:sldMasterId id="2147483661" r:id="rId3"/>
-    <p:sldMasterId id="2147483674" r:id="rId4"/>
   </p:sldMasterIdLst>
   <p:sldIdLst>
-    <p:sldId id="256" r:id="rId5"/>
-    <p:sldId id="257" r:id="rId6"/>
-    <p:sldId id="258" r:id="rId7"/>
-    <p:sldId id="259" r:id="rId8"/>
-    <p:sldId id="260" r:id="rId9"/>
-    <p:sldId id="261" r:id="rId10"/>
-    <p:sldId id="262" r:id="rId11"/>
-    <p:sldId id="263" r:id="rId12"/>
+    <p:sldId id="256" r:id="rId4"/>
+    <p:sldId id="257" r:id="rId5"/>
+    <p:sldId id="258" r:id="rId6"/>
+    <p:sldId id="259" r:id="rId7"/>
+    <p:sldId id="260" r:id="rId8"/>
+    <p:sldId id="261" r:id="rId9"/>
+    <p:sldId id="262" r:id="rId10"/>
+    <p:sldId id="263" r:id="rId11"/>
   </p:sldIdLst>
   <p:sldSz cx="10080625" cy="7559675"/>
   <p:notesSz cx="7559675" cy="10691812"/>
@@ -2002,361 +2001,6 @@
 </p:sldLayout>
 </file>
 
-<file path=ppt/slideLayouts/slideLayout25.xml><?xml version="1.0" encoding="utf-8"?>
-<p:sldLayout xmlns:a="http://schemas.openxmlformats.org/drawingml/2006/main" xmlns:p="http://schemas.openxmlformats.org/presentationml/2006/main" xmlns:r="http://schemas.openxmlformats.org/officeDocument/2006/relationships" xmlns:p14="http://schemas.microsoft.com/office/powerpoint/2010/main" xmlns:p15="http://schemas.microsoft.com/office/powerpoint/2012/main" xmlns:mc="http://schemas.openxmlformats.org/markup-compatibility/2006" type="blank" preserve="1">
-  <p:cSld name="Blank Slide">
-    <p:spTree>
-      <p:nvGrpSpPr>
-        <p:cNvPr id="1" name=""/>
-        <p:cNvGrpSpPr/>
-        <p:nvPr/>
-      </p:nvGrpSpPr>
-      <p:grpSpPr>
-        <a:xfrm>
-          <a:off x="0" y="0"/>
-          <a:ext cx="0" cy="0"/>
-          <a:chOff x="0" y="0"/>
-          <a:chExt cx="0" cy="0"/>
-        </a:xfrm>
-      </p:grpSpPr>
-    </p:spTree>
-  </p:cSld>
-</p:sldLayout>
-</file>
-
-<file path=ppt/slideLayouts/slideLayout26.xml><?xml version="1.0" encoding="utf-8"?>
-<p:sldLayout xmlns:a="http://schemas.openxmlformats.org/drawingml/2006/main" xmlns:p="http://schemas.openxmlformats.org/presentationml/2006/main" xmlns:r="http://schemas.openxmlformats.org/officeDocument/2006/relationships" xmlns:p14="http://schemas.microsoft.com/office/powerpoint/2010/main" xmlns:p15="http://schemas.microsoft.com/office/powerpoint/2012/main" xmlns:mc="http://schemas.openxmlformats.org/markup-compatibility/2006" type="tx" preserve="1">
-  <p:cSld name="Title Slide">
-    <p:spTree>
-      <p:nvGrpSpPr>
-        <p:cNvPr id="1" name=""/>
-        <p:cNvGrpSpPr/>
-        <p:nvPr/>
-      </p:nvGrpSpPr>
-      <p:grpSpPr>
-        <a:xfrm>
-          <a:off x="0" y="0"/>
-          <a:ext cx="0" cy="0"/>
-          <a:chOff x="0" y="0"/>
-          <a:chExt cx="0" cy="0"/>
-        </a:xfrm>
-      </p:grpSpPr>
-      <p:sp>
-        <p:nvSpPr>
-          <p:cNvPr id="87" name="PlaceHolder 1"/>
-          <p:cNvSpPr>
-            <a:spLocks noGrp="1"/>
-          </p:cNvSpPr>
-          <p:nvPr>
-            <p:ph type="title"/>
-          </p:nvPr>
-        </p:nvSpPr>
-        <p:spPr>
-          <a:xfrm>
-            <a:off x="504000" y="301320"/>
-            <a:ext cx="9072000" cy="1261800"/>
-          </a:xfrm>
-          <a:prstGeom prst="rect">
-            <a:avLst/>
-          </a:prstGeom>
-        </p:spPr>
-        <p:txBody>
-          <a:bodyPr lIns="0" rIns="0" tIns="0" bIns="0" anchor="ctr">
-            <a:noAutofit/>
-          </a:bodyPr>
-          <a:p>
-            <a:pPr algn="ctr"/>
-            <a:endParaRPr b="0" lang="fr-FR" sz="4400" spc="-1" strike="noStrike">
-              <a:latin typeface="Arial"/>
-            </a:endParaRPr>
-          </a:p>
-        </p:txBody>
-      </p:sp>
-      <p:sp>
-        <p:nvSpPr>
-          <p:cNvPr id="88" name="PlaceHolder 2"/>
-          <p:cNvSpPr>
-            <a:spLocks noGrp="1"/>
-          </p:cNvSpPr>
-          <p:nvPr>
-            <p:ph type="subTitle"/>
-          </p:nvPr>
-        </p:nvSpPr>
-        <p:spPr>
-          <a:xfrm>
-            <a:off x="504000" y="1768680"/>
-            <a:ext cx="9072000" cy="4384080"/>
-          </a:xfrm>
-          <a:prstGeom prst="rect">
-            <a:avLst/>
-          </a:prstGeom>
-        </p:spPr>
-        <p:txBody>
-          <a:bodyPr lIns="0" rIns="0" tIns="0" bIns="0" anchor="ctr">
-            <a:noAutofit/>
-          </a:bodyPr>
-          <a:p>
-            <a:pPr algn="ctr"/>
-            <a:endParaRPr b="0" lang="fr-FR" sz="3200" spc="-1" strike="noStrike">
-              <a:latin typeface="Arial"/>
-            </a:endParaRPr>
-          </a:p>
-        </p:txBody>
-      </p:sp>
-    </p:spTree>
-  </p:cSld>
-</p:sldLayout>
-</file>
-
-<file path=ppt/slideLayouts/slideLayout27.xml><?xml version="1.0" encoding="utf-8"?>
-<p:sldLayout xmlns:a="http://schemas.openxmlformats.org/drawingml/2006/main" xmlns:p="http://schemas.openxmlformats.org/presentationml/2006/main" xmlns:r="http://schemas.openxmlformats.org/officeDocument/2006/relationships" xmlns:p14="http://schemas.microsoft.com/office/powerpoint/2010/main" xmlns:p15="http://schemas.microsoft.com/office/powerpoint/2012/main" xmlns:mc="http://schemas.openxmlformats.org/markup-compatibility/2006" type="obj" preserve="1">
-  <p:cSld name="Title, Content">
-    <p:spTree>
-      <p:nvGrpSpPr>
-        <p:cNvPr id="1" name=""/>
-        <p:cNvGrpSpPr/>
-        <p:nvPr/>
-      </p:nvGrpSpPr>
-      <p:grpSpPr>
-        <a:xfrm>
-          <a:off x="0" y="0"/>
-          <a:ext cx="0" cy="0"/>
-          <a:chOff x="0" y="0"/>
-          <a:chExt cx="0" cy="0"/>
-        </a:xfrm>
-      </p:grpSpPr>
-      <p:sp>
-        <p:nvSpPr>
-          <p:cNvPr id="89" name="PlaceHolder 1"/>
-          <p:cNvSpPr>
-            <a:spLocks noGrp="1"/>
-          </p:cNvSpPr>
-          <p:nvPr>
-            <p:ph type="title"/>
-          </p:nvPr>
-        </p:nvSpPr>
-        <p:spPr>
-          <a:xfrm>
-            <a:off x="504000" y="301320"/>
-            <a:ext cx="9072000" cy="1261800"/>
-          </a:xfrm>
-          <a:prstGeom prst="rect">
-            <a:avLst/>
-          </a:prstGeom>
-        </p:spPr>
-        <p:txBody>
-          <a:bodyPr lIns="0" rIns="0" tIns="0" bIns="0" anchor="ctr">
-            <a:noAutofit/>
-          </a:bodyPr>
-          <a:p>
-            <a:pPr algn="ctr"/>
-            <a:endParaRPr b="0" lang="fr-FR" sz="4400" spc="-1" strike="noStrike">
-              <a:latin typeface="Arial"/>
-            </a:endParaRPr>
-          </a:p>
-        </p:txBody>
-      </p:sp>
-      <p:sp>
-        <p:nvSpPr>
-          <p:cNvPr id="90" name="PlaceHolder 2"/>
-          <p:cNvSpPr>
-            <a:spLocks noGrp="1"/>
-          </p:cNvSpPr>
-          <p:nvPr>
-            <p:ph type="body"/>
-          </p:nvPr>
-        </p:nvSpPr>
-        <p:spPr>
-          <a:xfrm>
-            <a:off x="504000" y="1768680"/>
-            <a:ext cx="9072000" cy="4384080"/>
-          </a:xfrm>
-          <a:prstGeom prst="rect">
-            <a:avLst/>
-          </a:prstGeom>
-        </p:spPr>
-        <p:txBody>
-          <a:bodyPr lIns="0" rIns="0" tIns="0" bIns="0">
-            <a:normAutofit/>
-          </a:bodyPr>
-          <a:p>
-            <a:endParaRPr b="0" lang="fr-FR" sz="3200" spc="-1" strike="noStrike">
-              <a:latin typeface="Arial"/>
-            </a:endParaRPr>
-          </a:p>
-        </p:txBody>
-      </p:sp>
-    </p:spTree>
-  </p:cSld>
-</p:sldLayout>
-</file>
-
-<file path=ppt/slideLayouts/slideLayout28.xml><?xml version="1.0" encoding="utf-8"?>
-<p:sldLayout xmlns:a="http://schemas.openxmlformats.org/drawingml/2006/main" xmlns:p="http://schemas.openxmlformats.org/presentationml/2006/main" xmlns:r="http://schemas.openxmlformats.org/officeDocument/2006/relationships" xmlns:p14="http://schemas.microsoft.com/office/powerpoint/2010/main" xmlns:p15="http://schemas.microsoft.com/office/powerpoint/2012/main" xmlns:mc="http://schemas.openxmlformats.org/markup-compatibility/2006" type="twoObj" preserve="1">
-  <p:cSld name="Title, 2 Content">
-    <p:spTree>
-      <p:nvGrpSpPr>
-        <p:cNvPr id="1" name=""/>
-        <p:cNvGrpSpPr/>
-        <p:nvPr/>
-      </p:nvGrpSpPr>
-      <p:grpSpPr>
-        <a:xfrm>
-          <a:off x="0" y="0"/>
-          <a:ext cx="0" cy="0"/>
-          <a:chOff x="0" y="0"/>
-          <a:chExt cx="0" cy="0"/>
-        </a:xfrm>
-      </p:grpSpPr>
-      <p:sp>
-        <p:nvSpPr>
-          <p:cNvPr id="91" name="PlaceHolder 1"/>
-          <p:cNvSpPr>
-            <a:spLocks noGrp="1"/>
-          </p:cNvSpPr>
-          <p:nvPr>
-            <p:ph type="title"/>
-          </p:nvPr>
-        </p:nvSpPr>
-        <p:spPr>
-          <a:xfrm>
-            <a:off x="504000" y="301320"/>
-            <a:ext cx="9072000" cy="1261800"/>
-          </a:xfrm>
-          <a:prstGeom prst="rect">
-            <a:avLst/>
-          </a:prstGeom>
-        </p:spPr>
-        <p:txBody>
-          <a:bodyPr lIns="0" rIns="0" tIns="0" bIns="0" anchor="ctr">
-            <a:noAutofit/>
-          </a:bodyPr>
-          <a:p>
-            <a:pPr algn="ctr"/>
-            <a:endParaRPr b="0" lang="fr-FR" sz="4400" spc="-1" strike="noStrike">
-              <a:latin typeface="Arial"/>
-            </a:endParaRPr>
-          </a:p>
-        </p:txBody>
-      </p:sp>
-      <p:sp>
-        <p:nvSpPr>
-          <p:cNvPr id="92" name="PlaceHolder 2"/>
-          <p:cNvSpPr>
-            <a:spLocks noGrp="1"/>
-          </p:cNvSpPr>
-          <p:nvPr>
-            <p:ph type="body"/>
-          </p:nvPr>
-        </p:nvSpPr>
-        <p:spPr>
-          <a:xfrm>
-            <a:off x="504000" y="1768680"/>
-            <a:ext cx="4426920" cy="4384080"/>
-          </a:xfrm>
-          <a:prstGeom prst="rect">
-            <a:avLst/>
-          </a:prstGeom>
-        </p:spPr>
-        <p:txBody>
-          <a:bodyPr lIns="0" rIns="0" tIns="0" bIns="0">
-            <a:normAutofit/>
-          </a:bodyPr>
-          <a:p>
-            <a:endParaRPr b="0" lang="fr-FR" sz="3200" spc="-1" strike="noStrike">
-              <a:latin typeface="Arial"/>
-            </a:endParaRPr>
-          </a:p>
-        </p:txBody>
-      </p:sp>
-      <p:sp>
-        <p:nvSpPr>
-          <p:cNvPr id="93" name="PlaceHolder 3"/>
-          <p:cNvSpPr>
-            <a:spLocks noGrp="1"/>
-          </p:cNvSpPr>
-          <p:nvPr>
-            <p:ph type="body"/>
-          </p:nvPr>
-        </p:nvSpPr>
-        <p:spPr>
-          <a:xfrm>
-            <a:off x="5152680" y="1768680"/>
-            <a:ext cx="4426920" cy="4384080"/>
-          </a:xfrm>
-          <a:prstGeom prst="rect">
-            <a:avLst/>
-          </a:prstGeom>
-        </p:spPr>
-        <p:txBody>
-          <a:bodyPr lIns="0" rIns="0" tIns="0" bIns="0">
-            <a:normAutofit/>
-          </a:bodyPr>
-          <a:p>
-            <a:endParaRPr b="0" lang="fr-FR" sz="3200" spc="-1" strike="noStrike">
-              <a:latin typeface="Arial"/>
-            </a:endParaRPr>
-          </a:p>
-        </p:txBody>
-      </p:sp>
-    </p:spTree>
-  </p:cSld>
-</p:sldLayout>
-</file>
-
-<file path=ppt/slideLayouts/slideLayout29.xml><?xml version="1.0" encoding="utf-8"?>
-<p:sldLayout xmlns:a="http://schemas.openxmlformats.org/drawingml/2006/main" xmlns:p="http://schemas.openxmlformats.org/presentationml/2006/main" xmlns:r="http://schemas.openxmlformats.org/officeDocument/2006/relationships" xmlns:p14="http://schemas.microsoft.com/office/powerpoint/2010/main" xmlns:p15="http://schemas.microsoft.com/office/powerpoint/2012/main" xmlns:mc="http://schemas.openxmlformats.org/markup-compatibility/2006" type="titleOnly" preserve="1">
-  <p:cSld name="Title Only">
-    <p:spTree>
-      <p:nvGrpSpPr>
-        <p:cNvPr id="1" name=""/>
-        <p:cNvGrpSpPr/>
-        <p:nvPr/>
-      </p:nvGrpSpPr>
-      <p:grpSpPr>
-        <a:xfrm>
-          <a:off x="0" y="0"/>
-          <a:ext cx="0" cy="0"/>
-          <a:chOff x="0" y="0"/>
-          <a:chExt cx="0" cy="0"/>
-        </a:xfrm>
-      </p:grpSpPr>
-      <p:sp>
-        <p:nvSpPr>
-          <p:cNvPr id="94" name="PlaceHolder 1"/>
-          <p:cNvSpPr>
-            <a:spLocks noGrp="1"/>
-          </p:cNvSpPr>
-          <p:nvPr>
-            <p:ph type="title"/>
-          </p:nvPr>
-        </p:nvSpPr>
-        <p:spPr>
-          <a:xfrm>
-            <a:off x="504000" y="301320"/>
-            <a:ext cx="9072000" cy="1261800"/>
-          </a:xfrm>
-          <a:prstGeom prst="rect">
-            <a:avLst/>
-          </a:prstGeom>
-        </p:spPr>
-        <p:txBody>
-          <a:bodyPr lIns="0" rIns="0" tIns="0" bIns="0" anchor="ctr">
-            <a:noAutofit/>
-          </a:bodyPr>
-          <a:p>
-            <a:pPr algn="ctr"/>
-            <a:endParaRPr b="0" lang="fr-FR" sz="4400" spc="-1" strike="noStrike">
-              <a:latin typeface="Arial"/>
-            </a:endParaRPr>
-          </a:p>
-        </p:txBody>
-      </p:sp>
-    </p:spTree>
-  </p:cSld>
-</p:sldLayout>
-</file>
-
 <file path=ppt/slideLayouts/slideLayout3.xml><?xml version="1.0" encoding="utf-8"?>
 <p:sldLayout xmlns:a="http://schemas.openxmlformats.org/drawingml/2006/main" xmlns:p="http://schemas.openxmlformats.org/presentationml/2006/main" xmlns:r="http://schemas.openxmlformats.org/officeDocument/2006/relationships" xmlns:p14="http://schemas.microsoft.com/office/powerpoint/2010/main" xmlns:p15="http://schemas.microsoft.com/office/powerpoint/2012/main" xmlns:mc="http://schemas.openxmlformats.org/markup-compatibility/2006" type="obj" preserve="1">
   <p:cSld name="Title, Content">
@@ -2419,1007 +2063,6 @@
           <a:xfrm>
             <a:off x="504000" y="1768680"/>
             <a:ext cx="9072000" cy="4384080"/>
-          </a:xfrm>
-          <a:prstGeom prst="rect">
-            <a:avLst/>
-          </a:prstGeom>
-        </p:spPr>
-        <p:txBody>
-          <a:bodyPr lIns="0" rIns="0" tIns="0" bIns="0">
-            <a:normAutofit/>
-          </a:bodyPr>
-          <a:p>
-            <a:endParaRPr b="0" lang="fr-FR" sz="3200" spc="-1" strike="noStrike">
-              <a:latin typeface="Arial"/>
-            </a:endParaRPr>
-          </a:p>
-        </p:txBody>
-      </p:sp>
-    </p:spTree>
-  </p:cSld>
-</p:sldLayout>
-</file>
-
-<file path=ppt/slideLayouts/slideLayout30.xml><?xml version="1.0" encoding="utf-8"?>
-<p:sldLayout xmlns:a="http://schemas.openxmlformats.org/drawingml/2006/main" xmlns:p="http://schemas.openxmlformats.org/presentationml/2006/main" xmlns:r="http://schemas.openxmlformats.org/officeDocument/2006/relationships" xmlns:p14="http://schemas.microsoft.com/office/powerpoint/2010/main" xmlns:p15="http://schemas.microsoft.com/office/powerpoint/2012/main" xmlns:mc="http://schemas.openxmlformats.org/markup-compatibility/2006" type="objOnly" preserve="1">
-  <p:cSld name="Centered Text">
-    <p:spTree>
-      <p:nvGrpSpPr>
-        <p:cNvPr id="1" name=""/>
-        <p:cNvGrpSpPr/>
-        <p:nvPr/>
-      </p:nvGrpSpPr>
-      <p:grpSpPr>
-        <a:xfrm>
-          <a:off x="0" y="0"/>
-          <a:ext cx="0" cy="0"/>
-          <a:chOff x="0" y="0"/>
-          <a:chExt cx="0" cy="0"/>
-        </a:xfrm>
-      </p:grpSpPr>
-      <p:sp>
-        <p:nvSpPr>
-          <p:cNvPr id="95" name="PlaceHolder 1"/>
-          <p:cNvSpPr>
-            <a:spLocks noGrp="1"/>
-          </p:cNvSpPr>
-          <p:nvPr>
-            <p:ph type="subTitle"/>
-          </p:nvPr>
-        </p:nvSpPr>
-        <p:spPr>
-          <a:xfrm>
-            <a:off x="504000" y="301320"/>
-            <a:ext cx="9072000" cy="5850360"/>
-          </a:xfrm>
-          <a:prstGeom prst="rect">
-            <a:avLst/>
-          </a:prstGeom>
-        </p:spPr>
-        <p:txBody>
-          <a:bodyPr lIns="0" rIns="0" tIns="0" bIns="0" anchor="ctr">
-            <a:noAutofit/>
-          </a:bodyPr>
-          <a:p>
-            <a:pPr algn="ctr"/>
-            <a:endParaRPr b="0" lang="fr-FR" sz="3200" spc="-1" strike="noStrike">
-              <a:latin typeface="Arial"/>
-            </a:endParaRPr>
-          </a:p>
-        </p:txBody>
-      </p:sp>
-    </p:spTree>
-  </p:cSld>
-</p:sldLayout>
-</file>
-
-<file path=ppt/slideLayouts/slideLayout31.xml><?xml version="1.0" encoding="utf-8"?>
-<p:sldLayout xmlns:a="http://schemas.openxmlformats.org/drawingml/2006/main" xmlns:p="http://schemas.openxmlformats.org/presentationml/2006/main" xmlns:r="http://schemas.openxmlformats.org/officeDocument/2006/relationships" xmlns:p14="http://schemas.microsoft.com/office/powerpoint/2010/main" xmlns:p15="http://schemas.microsoft.com/office/powerpoint/2012/main" xmlns:mc="http://schemas.openxmlformats.org/markup-compatibility/2006" type="twoObjAndObj" preserve="1">
-  <p:cSld name="Title, 2 Content and Content">
-    <p:spTree>
-      <p:nvGrpSpPr>
-        <p:cNvPr id="1" name=""/>
-        <p:cNvGrpSpPr/>
-        <p:nvPr/>
-      </p:nvGrpSpPr>
-      <p:grpSpPr>
-        <a:xfrm>
-          <a:off x="0" y="0"/>
-          <a:ext cx="0" cy="0"/>
-          <a:chOff x="0" y="0"/>
-          <a:chExt cx="0" cy="0"/>
-        </a:xfrm>
-      </p:grpSpPr>
-      <p:sp>
-        <p:nvSpPr>
-          <p:cNvPr id="96" name="PlaceHolder 1"/>
-          <p:cNvSpPr>
-            <a:spLocks noGrp="1"/>
-          </p:cNvSpPr>
-          <p:nvPr>
-            <p:ph type="title"/>
-          </p:nvPr>
-        </p:nvSpPr>
-        <p:spPr>
-          <a:xfrm>
-            <a:off x="504000" y="301320"/>
-            <a:ext cx="9072000" cy="1261800"/>
-          </a:xfrm>
-          <a:prstGeom prst="rect">
-            <a:avLst/>
-          </a:prstGeom>
-        </p:spPr>
-        <p:txBody>
-          <a:bodyPr lIns="0" rIns="0" tIns="0" bIns="0" anchor="ctr">
-            <a:noAutofit/>
-          </a:bodyPr>
-          <a:p>
-            <a:pPr algn="ctr"/>
-            <a:endParaRPr b="0" lang="fr-FR" sz="4400" spc="-1" strike="noStrike">
-              <a:latin typeface="Arial"/>
-            </a:endParaRPr>
-          </a:p>
-        </p:txBody>
-      </p:sp>
-      <p:sp>
-        <p:nvSpPr>
-          <p:cNvPr id="97" name="PlaceHolder 2"/>
-          <p:cNvSpPr>
-            <a:spLocks noGrp="1"/>
-          </p:cNvSpPr>
-          <p:nvPr>
-            <p:ph type="body"/>
-          </p:nvPr>
-        </p:nvSpPr>
-        <p:spPr>
-          <a:xfrm>
-            <a:off x="504000" y="1768680"/>
-            <a:ext cx="4426920" cy="2090880"/>
-          </a:xfrm>
-          <a:prstGeom prst="rect">
-            <a:avLst/>
-          </a:prstGeom>
-        </p:spPr>
-        <p:txBody>
-          <a:bodyPr lIns="0" rIns="0" tIns="0" bIns="0">
-            <a:normAutofit/>
-          </a:bodyPr>
-          <a:p>
-            <a:endParaRPr b="0" lang="fr-FR" sz="3200" spc="-1" strike="noStrike">
-              <a:latin typeface="Arial"/>
-            </a:endParaRPr>
-          </a:p>
-        </p:txBody>
-      </p:sp>
-      <p:sp>
-        <p:nvSpPr>
-          <p:cNvPr id="98" name="PlaceHolder 3"/>
-          <p:cNvSpPr>
-            <a:spLocks noGrp="1"/>
-          </p:cNvSpPr>
-          <p:nvPr>
-            <p:ph type="body"/>
-          </p:nvPr>
-        </p:nvSpPr>
-        <p:spPr>
-          <a:xfrm>
-            <a:off x="5152680" y="1768680"/>
-            <a:ext cx="4426920" cy="4384080"/>
-          </a:xfrm>
-          <a:prstGeom prst="rect">
-            <a:avLst/>
-          </a:prstGeom>
-        </p:spPr>
-        <p:txBody>
-          <a:bodyPr lIns="0" rIns="0" tIns="0" bIns="0">
-            <a:normAutofit/>
-          </a:bodyPr>
-          <a:p>
-            <a:endParaRPr b="0" lang="fr-FR" sz="3200" spc="-1" strike="noStrike">
-              <a:latin typeface="Arial"/>
-            </a:endParaRPr>
-          </a:p>
-        </p:txBody>
-      </p:sp>
-      <p:sp>
-        <p:nvSpPr>
-          <p:cNvPr id="99" name="PlaceHolder 4"/>
-          <p:cNvSpPr>
-            <a:spLocks noGrp="1"/>
-          </p:cNvSpPr>
-          <p:nvPr>
-            <p:ph type="body"/>
-          </p:nvPr>
-        </p:nvSpPr>
-        <p:spPr>
-          <a:xfrm>
-            <a:off x="504000" y="4058640"/>
-            <a:ext cx="4426920" cy="2090880"/>
-          </a:xfrm>
-          <a:prstGeom prst="rect">
-            <a:avLst/>
-          </a:prstGeom>
-        </p:spPr>
-        <p:txBody>
-          <a:bodyPr lIns="0" rIns="0" tIns="0" bIns="0">
-            <a:normAutofit/>
-          </a:bodyPr>
-          <a:p>
-            <a:endParaRPr b="0" lang="fr-FR" sz="3200" spc="-1" strike="noStrike">
-              <a:latin typeface="Arial"/>
-            </a:endParaRPr>
-          </a:p>
-        </p:txBody>
-      </p:sp>
-    </p:spTree>
-  </p:cSld>
-</p:sldLayout>
-</file>
-
-<file path=ppt/slideLayouts/slideLayout32.xml><?xml version="1.0" encoding="utf-8"?>
-<p:sldLayout xmlns:a="http://schemas.openxmlformats.org/drawingml/2006/main" xmlns:p="http://schemas.openxmlformats.org/presentationml/2006/main" xmlns:r="http://schemas.openxmlformats.org/officeDocument/2006/relationships" xmlns:p14="http://schemas.microsoft.com/office/powerpoint/2010/main" xmlns:p15="http://schemas.microsoft.com/office/powerpoint/2012/main" xmlns:mc="http://schemas.openxmlformats.org/markup-compatibility/2006" type="objAndTwoObj" preserve="1">
-  <p:cSld name="Title Content and 2 Content">
-    <p:spTree>
-      <p:nvGrpSpPr>
-        <p:cNvPr id="1" name=""/>
-        <p:cNvGrpSpPr/>
-        <p:nvPr/>
-      </p:nvGrpSpPr>
-      <p:grpSpPr>
-        <a:xfrm>
-          <a:off x="0" y="0"/>
-          <a:ext cx="0" cy="0"/>
-          <a:chOff x="0" y="0"/>
-          <a:chExt cx="0" cy="0"/>
-        </a:xfrm>
-      </p:grpSpPr>
-      <p:sp>
-        <p:nvSpPr>
-          <p:cNvPr id="100" name="PlaceHolder 1"/>
-          <p:cNvSpPr>
-            <a:spLocks noGrp="1"/>
-          </p:cNvSpPr>
-          <p:nvPr>
-            <p:ph type="title"/>
-          </p:nvPr>
-        </p:nvSpPr>
-        <p:spPr>
-          <a:xfrm>
-            <a:off x="504000" y="301320"/>
-            <a:ext cx="9072000" cy="1261800"/>
-          </a:xfrm>
-          <a:prstGeom prst="rect">
-            <a:avLst/>
-          </a:prstGeom>
-        </p:spPr>
-        <p:txBody>
-          <a:bodyPr lIns="0" rIns="0" tIns="0" bIns="0" anchor="ctr">
-            <a:noAutofit/>
-          </a:bodyPr>
-          <a:p>
-            <a:pPr algn="ctr"/>
-            <a:endParaRPr b="0" lang="fr-FR" sz="4400" spc="-1" strike="noStrike">
-              <a:latin typeface="Arial"/>
-            </a:endParaRPr>
-          </a:p>
-        </p:txBody>
-      </p:sp>
-      <p:sp>
-        <p:nvSpPr>
-          <p:cNvPr id="101" name="PlaceHolder 2"/>
-          <p:cNvSpPr>
-            <a:spLocks noGrp="1"/>
-          </p:cNvSpPr>
-          <p:nvPr>
-            <p:ph type="body"/>
-          </p:nvPr>
-        </p:nvSpPr>
-        <p:spPr>
-          <a:xfrm>
-            <a:off x="504000" y="1768680"/>
-            <a:ext cx="4426920" cy="4384080"/>
-          </a:xfrm>
-          <a:prstGeom prst="rect">
-            <a:avLst/>
-          </a:prstGeom>
-        </p:spPr>
-        <p:txBody>
-          <a:bodyPr lIns="0" rIns="0" tIns="0" bIns="0">
-            <a:normAutofit/>
-          </a:bodyPr>
-          <a:p>
-            <a:endParaRPr b="0" lang="fr-FR" sz="3200" spc="-1" strike="noStrike">
-              <a:latin typeface="Arial"/>
-            </a:endParaRPr>
-          </a:p>
-        </p:txBody>
-      </p:sp>
-      <p:sp>
-        <p:nvSpPr>
-          <p:cNvPr id="102" name="PlaceHolder 3"/>
-          <p:cNvSpPr>
-            <a:spLocks noGrp="1"/>
-          </p:cNvSpPr>
-          <p:nvPr>
-            <p:ph type="body"/>
-          </p:nvPr>
-        </p:nvSpPr>
-        <p:spPr>
-          <a:xfrm>
-            <a:off x="5152680" y="1768680"/>
-            <a:ext cx="4426920" cy="2090880"/>
-          </a:xfrm>
-          <a:prstGeom prst="rect">
-            <a:avLst/>
-          </a:prstGeom>
-        </p:spPr>
-        <p:txBody>
-          <a:bodyPr lIns="0" rIns="0" tIns="0" bIns="0">
-            <a:normAutofit/>
-          </a:bodyPr>
-          <a:p>
-            <a:endParaRPr b="0" lang="fr-FR" sz="3200" spc="-1" strike="noStrike">
-              <a:latin typeface="Arial"/>
-            </a:endParaRPr>
-          </a:p>
-        </p:txBody>
-      </p:sp>
-      <p:sp>
-        <p:nvSpPr>
-          <p:cNvPr id="103" name="PlaceHolder 4"/>
-          <p:cNvSpPr>
-            <a:spLocks noGrp="1"/>
-          </p:cNvSpPr>
-          <p:nvPr>
-            <p:ph type="body"/>
-          </p:nvPr>
-        </p:nvSpPr>
-        <p:spPr>
-          <a:xfrm>
-            <a:off x="5152680" y="4058640"/>
-            <a:ext cx="4426920" cy="2090880"/>
-          </a:xfrm>
-          <a:prstGeom prst="rect">
-            <a:avLst/>
-          </a:prstGeom>
-        </p:spPr>
-        <p:txBody>
-          <a:bodyPr lIns="0" rIns="0" tIns="0" bIns="0">
-            <a:normAutofit/>
-          </a:bodyPr>
-          <a:p>
-            <a:endParaRPr b="0" lang="fr-FR" sz="3200" spc="-1" strike="noStrike">
-              <a:latin typeface="Arial"/>
-            </a:endParaRPr>
-          </a:p>
-        </p:txBody>
-      </p:sp>
-    </p:spTree>
-  </p:cSld>
-</p:sldLayout>
-</file>
-
-<file path=ppt/slideLayouts/slideLayout33.xml><?xml version="1.0" encoding="utf-8"?>
-<p:sldLayout xmlns:a="http://schemas.openxmlformats.org/drawingml/2006/main" xmlns:p="http://schemas.openxmlformats.org/presentationml/2006/main" xmlns:r="http://schemas.openxmlformats.org/officeDocument/2006/relationships" xmlns:p14="http://schemas.microsoft.com/office/powerpoint/2010/main" xmlns:p15="http://schemas.microsoft.com/office/powerpoint/2012/main" xmlns:mc="http://schemas.openxmlformats.org/markup-compatibility/2006" type="twoObjOverTx" preserve="1">
-  <p:cSld name="Title, 2 Content over Content">
-    <p:spTree>
-      <p:nvGrpSpPr>
-        <p:cNvPr id="1" name=""/>
-        <p:cNvGrpSpPr/>
-        <p:nvPr/>
-      </p:nvGrpSpPr>
-      <p:grpSpPr>
-        <a:xfrm>
-          <a:off x="0" y="0"/>
-          <a:ext cx="0" cy="0"/>
-          <a:chOff x="0" y="0"/>
-          <a:chExt cx="0" cy="0"/>
-        </a:xfrm>
-      </p:grpSpPr>
-      <p:sp>
-        <p:nvSpPr>
-          <p:cNvPr id="104" name="PlaceHolder 1"/>
-          <p:cNvSpPr>
-            <a:spLocks noGrp="1"/>
-          </p:cNvSpPr>
-          <p:nvPr>
-            <p:ph type="title"/>
-          </p:nvPr>
-        </p:nvSpPr>
-        <p:spPr>
-          <a:xfrm>
-            <a:off x="504000" y="301320"/>
-            <a:ext cx="9072000" cy="1261800"/>
-          </a:xfrm>
-          <a:prstGeom prst="rect">
-            <a:avLst/>
-          </a:prstGeom>
-        </p:spPr>
-        <p:txBody>
-          <a:bodyPr lIns="0" rIns="0" tIns="0" bIns="0" anchor="ctr">
-            <a:noAutofit/>
-          </a:bodyPr>
-          <a:p>
-            <a:pPr algn="ctr"/>
-            <a:endParaRPr b="0" lang="fr-FR" sz="4400" spc="-1" strike="noStrike">
-              <a:latin typeface="Arial"/>
-            </a:endParaRPr>
-          </a:p>
-        </p:txBody>
-      </p:sp>
-      <p:sp>
-        <p:nvSpPr>
-          <p:cNvPr id="105" name="PlaceHolder 2"/>
-          <p:cNvSpPr>
-            <a:spLocks noGrp="1"/>
-          </p:cNvSpPr>
-          <p:nvPr>
-            <p:ph type="body"/>
-          </p:nvPr>
-        </p:nvSpPr>
-        <p:spPr>
-          <a:xfrm>
-            <a:off x="504000" y="1768680"/>
-            <a:ext cx="4426920" cy="2090880"/>
-          </a:xfrm>
-          <a:prstGeom prst="rect">
-            <a:avLst/>
-          </a:prstGeom>
-        </p:spPr>
-        <p:txBody>
-          <a:bodyPr lIns="0" rIns="0" tIns="0" bIns="0">
-            <a:normAutofit/>
-          </a:bodyPr>
-          <a:p>
-            <a:endParaRPr b="0" lang="fr-FR" sz="3200" spc="-1" strike="noStrike">
-              <a:latin typeface="Arial"/>
-            </a:endParaRPr>
-          </a:p>
-        </p:txBody>
-      </p:sp>
-      <p:sp>
-        <p:nvSpPr>
-          <p:cNvPr id="106" name="PlaceHolder 3"/>
-          <p:cNvSpPr>
-            <a:spLocks noGrp="1"/>
-          </p:cNvSpPr>
-          <p:nvPr>
-            <p:ph type="body"/>
-          </p:nvPr>
-        </p:nvSpPr>
-        <p:spPr>
-          <a:xfrm>
-            <a:off x="5152680" y="1768680"/>
-            <a:ext cx="4426920" cy="2090880"/>
-          </a:xfrm>
-          <a:prstGeom prst="rect">
-            <a:avLst/>
-          </a:prstGeom>
-        </p:spPr>
-        <p:txBody>
-          <a:bodyPr lIns="0" rIns="0" tIns="0" bIns="0">
-            <a:normAutofit/>
-          </a:bodyPr>
-          <a:p>
-            <a:endParaRPr b="0" lang="fr-FR" sz="3200" spc="-1" strike="noStrike">
-              <a:latin typeface="Arial"/>
-            </a:endParaRPr>
-          </a:p>
-        </p:txBody>
-      </p:sp>
-      <p:sp>
-        <p:nvSpPr>
-          <p:cNvPr id="107" name="PlaceHolder 4"/>
-          <p:cNvSpPr>
-            <a:spLocks noGrp="1"/>
-          </p:cNvSpPr>
-          <p:nvPr>
-            <p:ph type="body"/>
-          </p:nvPr>
-        </p:nvSpPr>
-        <p:spPr>
-          <a:xfrm>
-            <a:off x="504000" y="4058640"/>
-            <a:ext cx="9072000" cy="2090880"/>
-          </a:xfrm>
-          <a:prstGeom prst="rect">
-            <a:avLst/>
-          </a:prstGeom>
-        </p:spPr>
-        <p:txBody>
-          <a:bodyPr lIns="0" rIns="0" tIns="0" bIns="0">
-            <a:normAutofit/>
-          </a:bodyPr>
-          <a:p>
-            <a:endParaRPr b="0" lang="fr-FR" sz="3200" spc="-1" strike="noStrike">
-              <a:latin typeface="Arial"/>
-            </a:endParaRPr>
-          </a:p>
-        </p:txBody>
-      </p:sp>
-    </p:spTree>
-  </p:cSld>
-</p:sldLayout>
-</file>
-
-<file path=ppt/slideLayouts/slideLayout34.xml><?xml version="1.0" encoding="utf-8"?>
-<p:sldLayout xmlns:a="http://schemas.openxmlformats.org/drawingml/2006/main" xmlns:p="http://schemas.openxmlformats.org/presentationml/2006/main" xmlns:r="http://schemas.openxmlformats.org/officeDocument/2006/relationships" xmlns:p14="http://schemas.microsoft.com/office/powerpoint/2010/main" xmlns:p15="http://schemas.microsoft.com/office/powerpoint/2012/main" xmlns:mc="http://schemas.openxmlformats.org/markup-compatibility/2006" type="objOverTx" preserve="1">
-  <p:cSld name="Title, Content over Content">
-    <p:spTree>
-      <p:nvGrpSpPr>
-        <p:cNvPr id="1" name=""/>
-        <p:cNvGrpSpPr/>
-        <p:nvPr/>
-      </p:nvGrpSpPr>
-      <p:grpSpPr>
-        <a:xfrm>
-          <a:off x="0" y="0"/>
-          <a:ext cx="0" cy="0"/>
-          <a:chOff x="0" y="0"/>
-          <a:chExt cx="0" cy="0"/>
-        </a:xfrm>
-      </p:grpSpPr>
-      <p:sp>
-        <p:nvSpPr>
-          <p:cNvPr id="108" name="PlaceHolder 1"/>
-          <p:cNvSpPr>
-            <a:spLocks noGrp="1"/>
-          </p:cNvSpPr>
-          <p:nvPr>
-            <p:ph type="title"/>
-          </p:nvPr>
-        </p:nvSpPr>
-        <p:spPr>
-          <a:xfrm>
-            <a:off x="504000" y="301320"/>
-            <a:ext cx="9072000" cy="1261800"/>
-          </a:xfrm>
-          <a:prstGeom prst="rect">
-            <a:avLst/>
-          </a:prstGeom>
-        </p:spPr>
-        <p:txBody>
-          <a:bodyPr lIns="0" rIns="0" tIns="0" bIns="0" anchor="ctr">
-            <a:noAutofit/>
-          </a:bodyPr>
-          <a:p>
-            <a:pPr algn="ctr"/>
-            <a:endParaRPr b="0" lang="fr-FR" sz="4400" spc="-1" strike="noStrike">
-              <a:latin typeface="Arial"/>
-            </a:endParaRPr>
-          </a:p>
-        </p:txBody>
-      </p:sp>
-      <p:sp>
-        <p:nvSpPr>
-          <p:cNvPr id="109" name="PlaceHolder 2"/>
-          <p:cNvSpPr>
-            <a:spLocks noGrp="1"/>
-          </p:cNvSpPr>
-          <p:nvPr>
-            <p:ph type="body"/>
-          </p:nvPr>
-        </p:nvSpPr>
-        <p:spPr>
-          <a:xfrm>
-            <a:off x="504000" y="1768680"/>
-            <a:ext cx="9072000" cy="2090880"/>
-          </a:xfrm>
-          <a:prstGeom prst="rect">
-            <a:avLst/>
-          </a:prstGeom>
-        </p:spPr>
-        <p:txBody>
-          <a:bodyPr lIns="0" rIns="0" tIns="0" bIns="0">
-            <a:normAutofit/>
-          </a:bodyPr>
-          <a:p>
-            <a:endParaRPr b="0" lang="fr-FR" sz="3200" spc="-1" strike="noStrike">
-              <a:latin typeface="Arial"/>
-            </a:endParaRPr>
-          </a:p>
-        </p:txBody>
-      </p:sp>
-      <p:sp>
-        <p:nvSpPr>
-          <p:cNvPr id="110" name="PlaceHolder 3"/>
-          <p:cNvSpPr>
-            <a:spLocks noGrp="1"/>
-          </p:cNvSpPr>
-          <p:nvPr>
-            <p:ph type="body"/>
-          </p:nvPr>
-        </p:nvSpPr>
-        <p:spPr>
-          <a:xfrm>
-            <a:off x="504000" y="4058640"/>
-            <a:ext cx="9072000" cy="2090880"/>
-          </a:xfrm>
-          <a:prstGeom prst="rect">
-            <a:avLst/>
-          </a:prstGeom>
-        </p:spPr>
-        <p:txBody>
-          <a:bodyPr lIns="0" rIns="0" tIns="0" bIns="0">
-            <a:normAutofit/>
-          </a:bodyPr>
-          <a:p>
-            <a:endParaRPr b="0" lang="fr-FR" sz="3200" spc="-1" strike="noStrike">
-              <a:latin typeface="Arial"/>
-            </a:endParaRPr>
-          </a:p>
-        </p:txBody>
-      </p:sp>
-    </p:spTree>
-  </p:cSld>
-</p:sldLayout>
-</file>
-
-<file path=ppt/slideLayouts/slideLayout35.xml><?xml version="1.0" encoding="utf-8"?>
-<p:sldLayout xmlns:a="http://schemas.openxmlformats.org/drawingml/2006/main" xmlns:p="http://schemas.openxmlformats.org/presentationml/2006/main" xmlns:r="http://schemas.openxmlformats.org/officeDocument/2006/relationships" xmlns:p14="http://schemas.microsoft.com/office/powerpoint/2010/main" xmlns:p15="http://schemas.microsoft.com/office/powerpoint/2012/main" xmlns:mc="http://schemas.openxmlformats.org/markup-compatibility/2006" type="fourObj" preserve="1">
-  <p:cSld name="Title, 4 Content">
-    <p:spTree>
-      <p:nvGrpSpPr>
-        <p:cNvPr id="1" name=""/>
-        <p:cNvGrpSpPr/>
-        <p:nvPr/>
-      </p:nvGrpSpPr>
-      <p:grpSpPr>
-        <a:xfrm>
-          <a:off x="0" y="0"/>
-          <a:ext cx="0" cy="0"/>
-          <a:chOff x="0" y="0"/>
-          <a:chExt cx="0" cy="0"/>
-        </a:xfrm>
-      </p:grpSpPr>
-      <p:sp>
-        <p:nvSpPr>
-          <p:cNvPr id="111" name="PlaceHolder 1"/>
-          <p:cNvSpPr>
-            <a:spLocks noGrp="1"/>
-          </p:cNvSpPr>
-          <p:nvPr>
-            <p:ph type="title"/>
-          </p:nvPr>
-        </p:nvSpPr>
-        <p:spPr>
-          <a:xfrm>
-            <a:off x="504000" y="301320"/>
-            <a:ext cx="9072000" cy="1261800"/>
-          </a:xfrm>
-          <a:prstGeom prst="rect">
-            <a:avLst/>
-          </a:prstGeom>
-        </p:spPr>
-        <p:txBody>
-          <a:bodyPr lIns="0" rIns="0" tIns="0" bIns="0" anchor="ctr">
-            <a:noAutofit/>
-          </a:bodyPr>
-          <a:p>
-            <a:pPr algn="ctr"/>
-            <a:endParaRPr b="0" lang="fr-FR" sz="4400" spc="-1" strike="noStrike">
-              <a:latin typeface="Arial"/>
-            </a:endParaRPr>
-          </a:p>
-        </p:txBody>
-      </p:sp>
-      <p:sp>
-        <p:nvSpPr>
-          <p:cNvPr id="112" name="PlaceHolder 2"/>
-          <p:cNvSpPr>
-            <a:spLocks noGrp="1"/>
-          </p:cNvSpPr>
-          <p:nvPr>
-            <p:ph type="body"/>
-          </p:nvPr>
-        </p:nvSpPr>
-        <p:spPr>
-          <a:xfrm>
-            <a:off x="504000" y="1768680"/>
-            <a:ext cx="4426920" cy="2090880"/>
-          </a:xfrm>
-          <a:prstGeom prst="rect">
-            <a:avLst/>
-          </a:prstGeom>
-        </p:spPr>
-        <p:txBody>
-          <a:bodyPr lIns="0" rIns="0" tIns="0" bIns="0">
-            <a:normAutofit/>
-          </a:bodyPr>
-          <a:p>
-            <a:endParaRPr b="0" lang="fr-FR" sz="3200" spc="-1" strike="noStrike">
-              <a:latin typeface="Arial"/>
-            </a:endParaRPr>
-          </a:p>
-        </p:txBody>
-      </p:sp>
-      <p:sp>
-        <p:nvSpPr>
-          <p:cNvPr id="113" name="PlaceHolder 3"/>
-          <p:cNvSpPr>
-            <a:spLocks noGrp="1"/>
-          </p:cNvSpPr>
-          <p:nvPr>
-            <p:ph type="body"/>
-          </p:nvPr>
-        </p:nvSpPr>
-        <p:spPr>
-          <a:xfrm>
-            <a:off x="5152680" y="1768680"/>
-            <a:ext cx="4426920" cy="2090880"/>
-          </a:xfrm>
-          <a:prstGeom prst="rect">
-            <a:avLst/>
-          </a:prstGeom>
-        </p:spPr>
-        <p:txBody>
-          <a:bodyPr lIns="0" rIns="0" tIns="0" bIns="0">
-            <a:normAutofit/>
-          </a:bodyPr>
-          <a:p>
-            <a:endParaRPr b="0" lang="fr-FR" sz="3200" spc="-1" strike="noStrike">
-              <a:latin typeface="Arial"/>
-            </a:endParaRPr>
-          </a:p>
-        </p:txBody>
-      </p:sp>
-      <p:sp>
-        <p:nvSpPr>
-          <p:cNvPr id="114" name="PlaceHolder 4"/>
-          <p:cNvSpPr>
-            <a:spLocks noGrp="1"/>
-          </p:cNvSpPr>
-          <p:nvPr>
-            <p:ph type="body"/>
-          </p:nvPr>
-        </p:nvSpPr>
-        <p:spPr>
-          <a:xfrm>
-            <a:off x="504000" y="4058640"/>
-            <a:ext cx="4426920" cy="2090880"/>
-          </a:xfrm>
-          <a:prstGeom prst="rect">
-            <a:avLst/>
-          </a:prstGeom>
-        </p:spPr>
-        <p:txBody>
-          <a:bodyPr lIns="0" rIns="0" tIns="0" bIns="0">
-            <a:normAutofit/>
-          </a:bodyPr>
-          <a:p>
-            <a:endParaRPr b="0" lang="fr-FR" sz="3200" spc="-1" strike="noStrike">
-              <a:latin typeface="Arial"/>
-            </a:endParaRPr>
-          </a:p>
-        </p:txBody>
-      </p:sp>
-      <p:sp>
-        <p:nvSpPr>
-          <p:cNvPr id="115" name="PlaceHolder 5"/>
-          <p:cNvSpPr>
-            <a:spLocks noGrp="1"/>
-          </p:cNvSpPr>
-          <p:nvPr>
-            <p:ph type="body"/>
-          </p:nvPr>
-        </p:nvSpPr>
-        <p:spPr>
-          <a:xfrm>
-            <a:off x="5152680" y="4058640"/>
-            <a:ext cx="4426920" cy="2090880"/>
-          </a:xfrm>
-          <a:prstGeom prst="rect">
-            <a:avLst/>
-          </a:prstGeom>
-        </p:spPr>
-        <p:txBody>
-          <a:bodyPr lIns="0" rIns="0" tIns="0" bIns="0">
-            <a:normAutofit/>
-          </a:bodyPr>
-          <a:p>
-            <a:endParaRPr b="0" lang="fr-FR" sz="3200" spc="-1" strike="noStrike">
-              <a:latin typeface="Arial"/>
-            </a:endParaRPr>
-          </a:p>
-        </p:txBody>
-      </p:sp>
-    </p:spTree>
-  </p:cSld>
-</p:sldLayout>
-</file>
-
-<file path=ppt/slideLayouts/slideLayout36.xml><?xml version="1.0" encoding="utf-8"?>
-<p:sldLayout xmlns:a="http://schemas.openxmlformats.org/drawingml/2006/main" xmlns:p="http://schemas.openxmlformats.org/presentationml/2006/main" xmlns:r="http://schemas.openxmlformats.org/officeDocument/2006/relationships" xmlns:p14="http://schemas.microsoft.com/office/powerpoint/2010/main" xmlns:p15="http://schemas.microsoft.com/office/powerpoint/2012/main" xmlns:mc="http://schemas.openxmlformats.org/markup-compatibility/2006" type="blank" preserve="1">
-  <p:cSld name="Title, 6 Content">
-    <p:spTree>
-      <p:nvGrpSpPr>
-        <p:cNvPr id="1" name=""/>
-        <p:cNvGrpSpPr/>
-        <p:nvPr/>
-      </p:nvGrpSpPr>
-      <p:grpSpPr>
-        <a:xfrm>
-          <a:off x="0" y="0"/>
-          <a:ext cx="0" cy="0"/>
-          <a:chOff x="0" y="0"/>
-          <a:chExt cx="0" cy="0"/>
-        </a:xfrm>
-      </p:grpSpPr>
-      <p:sp>
-        <p:nvSpPr>
-          <p:cNvPr id="116" name="PlaceHolder 1"/>
-          <p:cNvSpPr>
-            <a:spLocks noGrp="1"/>
-          </p:cNvSpPr>
-          <p:nvPr>
-            <p:ph type="title"/>
-          </p:nvPr>
-        </p:nvSpPr>
-        <p:spPr>
-          <a:xfrm>
-            <a:off x="504000" y="301320"/>
-            <a:ext cx="9072000" cy="1261800"/>
-          </a:xfrm>
-          <a:prstGeom prst="rect">
-            <a:avLst/>
-          </a:prstGeom>
-        </p:spPr>
-        <p:txBody>
-          <a:bodyPr lIns="0" rIns="0" tIns="0" bIns="0" anchor="ctr">
-            <a:noAutofit/>
-          </a:bodyPr>
-          <a:p>
-            <a:pPr algn="ctr"/>
-            <a:endParaRPr b="0" lang="fr-FR" sz="4400" spc="-1" strike="noStrike">
-              <a:latin typeface="Arial"/>
-            </a:endParaRPr>
-          </a:p>
-        </p:txBody>
-      </p:sp>
-      <p:sp>
-        <p:nvSpPr>
-          <p:cNvPr id="117" name="PlaceHolder 2"/>
-          <p:cNvSpPr>
-            <a:spLocks noGrp="1"/>
-          </p:cNvSpPr>
-          <p:nvPr>
-            <p:ph type="body"/>
-          </p:nvPr>
-        </p:nvSpPr>
-        <p:spPr>
-          <a:xfrm>
-            <a:off x="504000" y="1768680"/>
-            <a:ext cx="2921040" cy="2090880"/>
-          </a:xfrm>
-          <a:prstGeom prst="rect">
-            <a:avLst/>
-          </a:prstGeom>
-        </p:spPr>
-        <p:txBody>
-          <a:bodyPr lIns="0" rIns="0" tIns="0" bIns="0">
-            <a:normAutofit/>
-          </a:bodyPr>
-          <a:p>
-            <a:endParaRPr b="0" lang="fr-FR" sz="3200" spc="-1" strike="noStrike">
-              <a:latin typeface="Arial"/>
-            </a:endParaRPr>
-          </a:p>
-        </p:txBody>
-      </p:sp>
-      <p:sp>
-        <p:nvSpPr>
-          <p:cNvPr id="118" name="PlaceHolder 3"/>
-          <p:cNvSpPr>
-            <a:spLocks noGrp="1"/>
-          </p:cNvSpPr>
-          <p:nvPr>
-            <p:ph type="body"/>
-          </p:nvPr>
-        </p:nvSpPr>
-        <p:spPr>
-          <a:xfrm>
-            <a:off x="3571560" y="1768680"/>
-            <a:ext cx="2921040" cy="2090880"/>
-          </a:xfrm>
-          <a:prstGeom prst="rect">
-            <a:avLst/>
-          </a:prstGeom>
-        </p:spPr>
-        <p:txBody>
-          <a:bodyPr lIns="0" rIns="0" tIns="0" bIns="0">
-            <a:normAutofit/>
-          </a:bodyPr>
-          <a:p>
-            <a:endParaRPr b="0" lang="fr-FR" sz="3200" spc="-1" strike="noStrike">
-              <a:latin typeface="Arial"/>
-            </a:endParaRPr>
-          </a:p>
-        </p:txBody>
-      </p:sp>
-      <p:sp>
-        <p:nvSpPr>
-          <p:cNvPr id="119" name="PlaceHolder 4"/>
-          <p:cNvSpPr>
-            <a:spLocks noGrp="1"/>
-          </p:cNvSpPr>
-          <p:nvPr>
-            <p:ph type="body"/>
-          </p:nvPr>
-        </p:nvSpPr>
-        <p:spPr>
-          <a:xfrm>
-            <a:off x="6639120" y="1768680"/>
-            <a:ext cx="2921040" cy="2090880"/>
-          </a:xfrm>
-          <a:prstGeom prst="rect">
-            <a:avLst/>
-          </a:prstGeom>
-        </p:spPr>
-        <p:txBody>
-          <a:bodyPr lIns="0" rIns="0" tIns="0" bIns="0">
-            <a:normAutofit/>
-          </a:bodyPr>
-          <a:p>
-            <a:endParaRPr b="0" lang="fr-FR" sz="3200" spc="-1" strike="noStrike">
-              <a:latin typeface="Arial"/>
-            </a:endParaRPr>
-          </a:p>
-        </p:txBody>
-      </p:sp>
-      <p:sp>
-        <p:nvSpPr>
-          <p:cNvPr id="120" name="PlaceHolder 5"/>
-          <p:cNvSpPr>
-            <a:spLocks noGrp="1"/>
-          </p:cNvSpPr>
-          <p:nvPr>
-            <p:ph type="body"/>
-          </p:nvPr>
-        </p:nvSpPr>
-        <p:spPr>
-          <a:xfrm>
-            <a:off x="504000" y="4058640"/>
-            <a:ext cx="2921040" cy="2090880"/>
-          </a:xfrm>
-          <a:prstGeom prst="rect">
-            <a:avLst/>
-          </a:prstGeom>
-        </p:spPr>
-        <p:txBody>
-          <a:bodyPr lIns="0" rIns="0" tIns="0" bIns="0">
-            <a:normAutofit/>
-          </a:bodyPr>
-          <a:p>
-            <a:endParaRPr b="0" lang="fr-FR" sz="3200" spc="-1" strike="noStrike">
-              <a:latin typeface="Arial"/>
-            </a:endParaRPr>
-          </a:p>
-        </p:txBody>
-      </p:sp>
-      <p:sp>
-        <p:nvSpPr>
-          <p:cNvPr id="121" name="PlaceHolder 6"/>
-          <p:cNvSpPr>
-            <a:spLocks noGrp="1"/>
-          </p:cNvSpPr>
-          <p:nvPr>
-            <p:ph type="body"/>
-          </p:nvPr>
-        </p:nvSpPr>
-        <p:spPr>
-          <a:xfrm>
-            <a:off x="3571560" y="4058640"/>
-            <a:ext cx="2921040" cy="2090880"/>
-          </a:xfrm>
-          <a:prstGeom prst="rect">
-            <a:avLst/>
-          </a:prstGeom>
-        </p:spPr>
-        <p:txBody>
-          <a:bodyPr lIns="0" rIns="0" tIns="0" bIns="0">
-            <a:normAutofit/>
-          </a:bodyPr>
-          <a:p>
-            <a:endParaRPr b="0" lang="fr-FR" sz="3200" spc="-1" strike="noStrike">
-              <a:latin typeface="Arial"/>
-            </a:endParaRPr>
-          </a:p>
-        </p:txBody>
-      </p:sp>
-      <p:sp>
-        <p:nvSpPr>
-          <p:cNvPr id="122" name="PlaceHolder 7"/>
-          <p:cNvSpPr>
-            <a:spLocks noGrp="1"/>
-          </p:cNvSpPr>
-          <p:nvPr>
-            <p:ph type="body"/>
-          </p:nvPr>
-        </p:nvSpPr>
-        <p:spPr>
-          <a:xfrm>
-            <a:off x="6639120" y="4058640"/>
-            <a:ext cx="2921040" cy="2090880"/>
           </a:xfrm>
           <a:prstGeom prst="rect">
             <a:avLst/>
@@ -4122,7 +2765,7 @@
         <p:spPr>
           <a:xfrm>
             <a:off x="0" y="3150000"/>
-            <a:ext cx="9717840" cy="1257840"/>
+            <a:ext cx="9716760" cy="1256760"/>
           </a:xfrm>
           <a:prstGeom prst="rect">
             <a:avLst/>
@@ -4410,7 +3053,7 @@
         <p:spPr>
           <a:xfrm>
             <a:off x="0" y="180000"/>
-            <a:ext cx="9717840" cy="1257840"/>
+            <a:ext cx="9716760" cy="1256760"/>
           </a:xfrm>
           <a:prstGeom prst="rect">
             <a:avLst/>
@@ -4438,7 +3081,7 @@
         <p:spPr>
           <a:xfrm>
             <a:off x="7560000" y="6840000"/>
-            <a:ext cx="2517840" cy="537840"/>
+            <a:ext cx="2516760" cy="536760"/>
           </a:xfrm>
           <a:prstGeom prst="rect">
             <a:avLst/>
@@ -4466,7 +3109,7 @@
         <p:spPr>
           <a:xfrm>
             <a:off x="900000" y="6840000"/>
-            <a:ext cx="6477840" cy="537840"/>
+            <a:ext cx="6476760" cy="536760"/>
           </a:xfrm>
           <a:prstGeom prst="rect">
             <a:avLst/>
@@ -4494,7 +3137,7 @@
         <p:spPr>
           <a:xfrm>
             <a:off x="180000" y="6840000"/>
-            <a:ext cx="537840" cy="537840"/>
+            <a:ext cx="536760" cy="536760"/>
           </a:xfrm>
           <a:prstGeom prst="rect">
             <a:avLst/>
@@ -4743,376 +3386,6 @@
     <p:sldLayoutId id="2147483671" r:id="rId11"/>
     <p:sldLayoutId id="2147483672" r:id="rId12"/>
     <p:sldLayoutId id="2147483673" r:id="rId13"/>
-  </p:sldLayoutIdLst>
-</p:sldMaster>
-</file>
-
-<file path=ppt/slideMasters/slideMaster3.xml><?xml version="1.0" encoding="utf-8"?>
-<p:sldMaster xmlns:a="http://schemas.openxmlformats.org/drawingml/2006/main" xmlns:p="http://schemas.openxmlformats.org/presentationml/2006/main" xmlns:r="http://schemas.openxmlformats.org/officeDocument/2006/relationships" xmlns:p14="http://schemas.microsoft.com/office/powerpoint/2010/main" xmlns:p15="http://schemas.microsoft.com/office/powerpoint/2012/main" xmlns:mc="http://schemas.openxmlformats.org/markup-compatibility/2006">
-  <p:cSld>
-    <p:bg>
-      <p:bgPr>
-        <a:solidFill>
-          <a:srgbClr val="ffffff"/>
-        </a:solidFill>
-      </p:bgPr>
-    </p:bg>
-    <p:spTree>
-      <p:nvGrpSpPr>
-        <p:cNvPr id="1" name=""/>
-        <p:cNvGrpSpPr/>
-        <p:nvPr/>
-      </p:nvGrpSpPr>
-      <p:grpSpPr>
-        <a:xfrm>
-          <a:off x="0" y="0"/>
-          <a:ext cx="0" cy="0"/>
-          <a:chOff x="0" y="0"/>
-          <a:chExt cx="0" cy="0"/>
-        </a:xfrm>
-      </p:grpSpPr>
-      <p:sp>
-        <p:nvSpPr>
-          <p:cNvPr id="81" name="CustomShape 1"/>
-          <p:cNvSpPr/>
-          <p:nvPr/>
-        </p:nvSpPr>
-        <p:spPr>
-          <a:xfrm>
-            <a:off x="0" y="180000"/>
-            <a:ext cx="9717840" cy="1257840"/>
-          </a:xfrm>
-          <a:prstGeom prst="rect">
-            <a:avLst/>
-          </a:prstGeom>
-          <a:solidFill>
-            <a:srgbClr val="e74c3c"/>
-          </a:solidFill>
-          <a:ln w="72000">
-            <a:noFill/>
-          </a:ln>
-        </p:spPr>
-        <p:style>
-          <a:lnRef idx="0"/>
-          <a:fillRef idx="0"/>
-          <a:effectRef idx="0"/>
-          <a:fontRef idx="minor"/>
-        </p:style>
-      </p:sp>
-      <p:sp>
-        <p:nvSpPr>
-          <p:cNvPr id="82" name="CustomShape 2"/>
-          <p:cNvSpPr/>
-          <p:nvPr/>
-        </p:nvSpPr>
-        <p:spPr>
-          <a:xfrm>
-            <a:off x="7560000" y="6840000"/>
-            <a:ext cx="2517840" cy="537840"/>
-          </a:xfrm>
-          <a:prstGeom prst="rect">
-            <a:avLst/>
-          </a:prstGeom>
-          <a:solidFill>
-            <a:srgbClr val="e74c3c"/>
-          </a:solidFill>
-          <a:ln w="72000">
-            <a:noFill/>
-          </a:ln>
-        </p:spPr>
-        <p:style>
-          <a:lnRef idx="0"/>
-          <a:fillRef idx="0"/>
-          <a:effectRef idx="0"/>
-          <a:fontRef idx="minor"/>
-        </p:style>
-      </p:sp>
-      <p:sp>
-        <p:nvSpPr>
-          <p:cNvPr id="83" name="CustomShape 3"/>
-          <p:cNvSpPr/>
-          <p:nvPr/>
-        </p:nvSpPr>
-        <p:spPr>
-          <a:xfrm>
-            <a:off x="900000" y="6840000"/>
-            <a:ext cx="6477840" cy="537840"/>
-          </a:xfrm>
-          <a:prstGeom prst="rect">
-            <a:avLst/>
-          </a:prstGeom>
-          <a:solidFill>
-            <a:srgbClr val="bdc3c7"/>
-          </a:solidFill>
-          <a:ln w="72000">
-            <a:noFill/>
-          </a:ln>
-        </p:spPr>
-        <p:style>
-          <a:lnRef idx="0"/>
-          <a:fillRef idx="0"/>
-          <a:effectRef idx="0"/>
-          <a:fontRef idx="minor"/>
-        </p:style>
-      </p:sp>
-      <p:sp>
-        <p:nvSpPr>
-          <p:cNvPr id="84" name="CustomShape 4"/>
-          <p:cNvSpPr/>
-          <p:nvPr/>
-        </p:nvSpPr>
-        <p:spPr>
-          <a:xfrm>
-            <a:off x="180000" y="6840000"/>
-            <a:ext cx="537840" cy="537840"/>
-          </a:xfrm>
-          <a:prstGeom prst="rect">
-            <a:avLst/>
-          </a:prstGeom>
-          <a:noFill/>
-          <a:ln w="72000">
-            <a:noFill/>
-          </a:ln>
-        </p:spPr>
-        <p:style>
-          <a:lnRef idx="0"/>
-          <a:fillRef idx="0"/>
-          <a:effectRef idx="0"/>
-          <a:fontRef idx="minor"/>
-        </p:style>
-      </p:sp>
-      <p:sp>
-        <p:nvSpPr>
-          <p:cNvPr id="85" name="PlaceHolder 5"/>
-          <p:cNvSpPr>
-            <a:spLocks noGrp="1"/>
-          </p:cNvSpPr>
-          <p:nvPr>
-            <p:ph type="title"/>
-          </p:nvPr>
-        </p:nvSpPr>
-        <p:spPr>
-          <a:xfrm>
-            <a:off x="504000" y="301320"/>
-            <a:ext cx="9072000" cy="1261800"/>
-          </a:xfrm>
-          <a:prstGeom prst="rect">
-            <a:avLst/>
-          </a:prstGeom>
-        </p:spPr>
-        <p:txBody>
-          <a:bodyPr lIns="0" rIns="0" tIns="0" bIns="0" anchor="ctr">
-            <a:noAutofit/>
-          </a:bodyPr>
-          <a:p>
-            <a:pPr algn="ctr"/>
-            <a:r>
-              <a:rPr b="0" lang="fr-FR" sz="4400" spc="-1" strike="noStrike">
-                <a:latin typeface="Arial"/>
-              </a:rPr>
-              <a:t>Cliquez pour éditer le format du texte-titre</a:t>
-            </a:r>
-            <a:endParaRPr b="0" lang="fr-FR" sz="4400" spc="-1" strike="noStrike">
-              <a:latin typeface="Arial"/>
-            </a:endParaRPr>
-          </a:p>
-        </p:txBody>
-      </p:sp>
-      <p:sp>
-        <p:nvSpPr>
-          <p:cNvPr id="86" name="PlaceHolder 6"/>
-          <p:cNvSpPr>
-            <a:spLocks noGrp="1"/>
-          </p:cNvSpPr>
-          <p:nvPr>
-            <p:ph type="body"/>
-          </p:nvPr>
-        </p:nvSpPr>
-        <p:spPr>
-          <a:xfrm>
-            <a:off x="504000" y="1768680"/>
-            <a:ext cx="9072000" cy="4384080"/>
-          </a:xfrm>
-          <a:prstGeom prst="rect">
-            <a:avLst/>
-          </a:prstGeom>
-        </p:spPr>
-        <p:txBody>
-          <a:bodyPr lIns="0" rIns="0" tIns="0" bIns="0">
-            <a:normAutofit/>
-          </a:bodyPr>
-          <a:p>
-            <a:pPr marL="432000" indent="-324000">
-              <a:spcBef>
-                <a:spcPts val="1417"/>
-              </a:spcBef>
-              <a:buClr>
-                <a:srgbClr val="000000"/>
-              </a:buClr>
-              <a:buSzPct val="45000"/>
-              <a:buFont typeface="Wingdings" charset="2"/>
-              <a:buChar char=""/>
-            </a:pPr>
-            <a:r>
-              <a:rPr b="0" lang="fr-FR" sz="3200" spc="-1" strike="noStrike">
-                <a:latin typeface="Arial"/>
-              </a:rPr>
-              <a:t>Cliquez pour éditer le format du plan de texte</a:t>
-            </a:r>
-            <a:endParaRPr b="0" lang="fr-FR" sz="3200" spc="-1" strike="noStrike">
-              <a:latin typeface="Arial"/>
-            </a:endParaRPr>
-          </a:p>
-          <a:p>
-            <a:pPr lvl="1" marL="864000" indent="-324000">
-              <a:spcBef>
-                <a:spcPts val="1134"/>
-              </a:spcBef>
-              <a:buClr>
-                <a:srgbClr val="000000"/>
-              </a:buClr>
-              <a:buSzPct val="75000"/>
-              <a:buFont typeface="Symbol" charset="2"/>
-              <a:buChar char=""/>
-            </a:pPr>
-            <a:r>
-              <a:rPr b="0" lang="fr-FR" sz="2800" spc="-1" strike="noStrike">
-                <a:latin typeface="Arial"/>
-              </a:rPr>
-              <a:t>Second niveau de plan</a:t>
-            </a:r>
-            <a:endParaRPr b="0" lang="fr-FR" sz="2800" spc="-1" strike="noStrike">
-              <a:latin typeface="Arial"/>
-            </a:endParaRPr>
-          </a:p>
-          <a:p>
-            <a:pPr lvl="2" marL="1296000" indent="-288000">
-              <a:spcBef>
-                <a:spcPts val="850"/>
-              </a:spcBef>
-              <a:buClr>
-                <a:srgbClr val="000000"/>
-              </a:buClr>
-              <a:buSzPct val="45000"/>
-              <a:buFont typeface="Wingdings" charset="2"/>
-              <a:buChar char=""/>
-            </a:pPr>
-            <a:r>
-              <a:rPr b="0" lang="fr-FR" sz="2400" spc="-1" strike="noStrike">
-                <a:latin typeface="Arial"/>
-              </a:rPr>
-              <a:t>Troisième niveau de plan</a:t>
-            </a:r>
-            <a:endParaRPr b="0" lang="fr-FR" sz="2400" spc="-1" strike="noStrike">
-              <a:latin typeface="Arial"/>
-            </a:endParaRPr>
-          </a:p>
-          <a:p>
-            <a:pPr lvl="3" marL="1728000" indent="-216000">
-              <a:spcBef>
-                <a:spcPts val="567"/>
-              </a:spcBef>
-              <a:buClr>
-                <a:srgbClr val="000000"/>
-              </a:buClr>
-              <a:buSzPct val="75000"/>
-              <a:buFont typeface="Symbol" charset="2"/>
-              <a:buChar char=""/>
-            </a:pPr>
-            <a:r>
-              <a:rPr b="0" lang="fr-FR" sz="2000" spc="-1" strike="noStrike">
-                <a:latin typeface="Arial"/>
-              </a:rPr>
-              <a:t>Quatrième niveau de plan</a:t>
-            </a:r>
-            <a:endParaRPr b="0" lang="fr-FR" sz="2000" spc="-1" strike="noStrike">
-              <a:latin typeface="Arial"/>
-            </a:endParaRPr>
-          </a:p>
-          <a:p>
-            <a:pPr lvl="4" marL="2160000" indent="-216000">
-              <a:spcBef>
-                <a:spcPts val="283"/>
-              </a:spcBef>
-              <a:buClr>
-                <a:srgbClr val="000000"/>
-              </a:buClr>
-              <a:buSzPct val="45000"/>
-              <a:buFont typeface="Wingdings" charset="2"/>
-              <a:buChar char=""/>
-            </a:pPr>
-            <a:r>
-              <a:rPr b="0" lang="fr-FR" sz="2000" spc="-1" strike="noStrike">
-                <a:latin typeface="Arial"/>
-              </a:rPr>
-              <a:t>Cinquième niveau de plan</a:t>
-            </a:r>
-            <a:endParaRPr b="0" lang="fr-FR" sz="2000" spc="-1" strike="noStrike">
-              <a:latin typeface="Arial"/>
-            </a:endParaRPr>
-          </a:p>
-          <a:p>
-            <a:pPr lvl="5" marL="2592000" indent="-216000">
-              <a:spcBef>
-                <a:spcPts val="283"/>
-              </a:spcBef>
-              <a:buClr>
-                <a:srgbClr val="000000"/>
-              </a:buClr>
-              <a:buSzPct val="45000"/>
-              <a:buFont typeface="Wingdings" charset="2"/>
-              <a:buChar char=""/>
-            </a:pPr>
-            <a:r>
-              <a:rPr b="0" lang="fr-FR" sz="2000" spc="-1" strike="noStrike">
-                <a:latin typeface="Arial"/>
-              </a:rPr>
-              <a:t>Sixième niveau de plan</a:t>
-            </a:r>
-            <a:endParaRPr b="0" lang="fr-FR" sz="2000" spc="-1" strike="noStrike">
-              <a:latin typeface="Arial"/>
-            </a:endParaRPr>
-          </a:p>
-          <a:p>
-            <a:pPr lvl="6" marL="3024000" indent="-216000">
-              <a:spcBef>
-                <a:spcPts val="283"/>
-              </a:spcBef>
-              <a:buClr>
-                <a:srgbClr val="000000"/>
-              </a:buClr>
-              <a:buSzPct val="45000"/>
-              <a:buFont typeface="Wingdings" charset="2"/>
-              <a:buChar char=""/>
-            </a:pPr>
-            <a:r>
-              <a:rPr b="0" lang="fr-FR" sz="2000" spc="-1" strike="noStrike">
-                <a:latin typeface="Arial"/>
-              </a:rPr>
-              <a:t>Septième niveau de plan</a:t>
-            </a:r>
-            <a:endParaRPr b="0" lang="fr-FR" sz="2000" spc="-1" strike="noStrike">
-              <a:latin typeface="Arial"/>
-            </a:endParaRPr>
-          </a:p>
-        </p:txBody>
-      </p:sp>
-    </p:spTree>
-  </p:cSld>
-  <p:clrMap bg1="lt1" bg2="lt2" tx1="dk1" tx2="dk2" accent1="accent1" accent2="accent2" accent3="accent3" accent4="accent4" accent5="accent5" accent6="accent6" hlink="hlink" folHlink="folHlink"/>
-  <p:sldLayoutIdLst>
-    <p:sldLayoutId id="2147483675" r:id="rId2"/>
-    <p:sldLayoutId id="2147483676" r:id="rId3"/>
-    <p:sldLayoutId id="2147483677" r:id="rId4"/>
-    <p:sldLayoutId id="2147483678" r:id="rId5"/>
-    <p:sldLayoutId id="2147483679" r:id="rId6"/>
-    <p:sldLayoutId id="2147483680" r:id="rId7"/>
-    <p:sldLayoutId id="2147483681" r:id="rId8"/>
-    <p:sldLayoutId id="2147483682" r:id="rId9"/>
-    <p:sldLayoutId id="2147483683" r:id="rId10"/>
-    <p:sldLayoutId id="2147483684" r:id="rId11"/>
-    <p:sldLayoutId id="2147483685" r:id="rId12"/>
-    <p:sldLayoutId id="2147483686" r:id="rId13"/>
   </p:sldLayoutIdLst>
 </p:sldMaster>
 </file>
@@ -5136,14 +3409,14 @@
       </p:grpSpPr>
       <p:sp>
         <p:nvSpPr>
-          <p:cNvPr id="123" name="CustomShape 1"/>
+          <p:cNvPr id="81" name="CustomShape 1"/>
           <p:cNvSpPr/>
           <p:nvPr/>
         </p:nvSpPr>
         <p:spPr>
           <a:xfrm>
             <a:off x="360000" y="3330000"/>
-            <a:ext cx="9357840" cy="897840"/>
+            <a:ext cx="9356760" cy="896760"/>
           </a:xfrm>
           <a:prstGeom prst="rect">
             <a:avLst/>
@@ -5187,14 +3460,14 @@
       </p:sp>
       <p:sp>
         <p:nvSpPr>
-          <p:cNvPr id="124" name="CustomShape 2"/>
+          <p:cNvPr id="82" name="CustomShape 2"/>
           <p:cNvSpPr/>
           <p:nvPr/>
         </p:nvSpPr>
         <p:spPr>
           <a:xfrm>
             <a:off x="5869440" y="6699240"/>
-            <a:ext cx="3848400" cy="498600"/>
+            <a:ext cx="3847320" cy="497520"/>
           </a:xfrm>
           <a:prstGeom prst="rect">
             <a:avLst/>
@@ -5238,14 +3511,14 @@
       </p:sp>
       <p:sp>
         <p:nvSpPr>
-          <p:cNvPr id="125" name="TextShape 3"/>
-          <p:cNvSpPr txBox="1"/>
+          <p:cNvPr id="83" name="CustomShape 3"/>
+          <p:cNvSpPr/>
           <p:nvPr/>
         </p:nvSpPr>
         <p:spPr>
           <a:xfrm>
             <a:off x="1584000" y="251640"/>
-            <a:ext cx="8280000" cy="828360"/>
+            <a:ext cx="8278920" cy="827280"/>
           </a:xfrm>
           <a:prstGeom prst="rect">
             <a:avLst/>
@@ -5255,17 +3528,29 @@
             <a:noFill/>
           </a:ln>
         </p:spPr>
+        <p:style>
+          <a:lnRef idx="0"/>
+          <a:fillRef idx="0"/>
+          <a:effectRef idx="0"/>
+          <a:fontRef idx="minor"/>
+        </p:style>
         <p:txBody>
           <a:bodyPr lIns="90000" rIns="90000" tIns="45000" bIns="45000">
             <a:noAutofit/>
           </a:bodyPr>
           <a:p>
+            <a:pPr>
+              <a:lnSpc>
+                <a:spcPct val="100000"/>
+              </a:lnSpc>
+            </a:pPr>
             <a:r>
               <a:rPr b="0" lang="fr-FR" sz="2600" spc="-1" strike="noStrike">
                 <a:solidFill>
                   <a:srgbClr val="666666"/>
                 </a:solidFill>
                 <a:latin typeface="Arial"/>
+                <a:ea typeface="DejaVu Sans"/>
               </a:rPr>
               <a:t>Projet 4 - </a:t>
             </a:r>
@@ -5280,9 +3565,6 @@
               <a:t>Analysez les besoins de votre client pour son groupe de pizzeria</a:t>
             </a:r>
             <a:endParaRPr b="0" lang="fr-FR" sz="2600" spc="-1" strike="noStrike">
-              <a:solidFill>
-                <a:srgbClr val="666666"/>
-              </a:solidFill>
               <a:latin typeface="Arial"/>
             </a:endParaRPr>
           </a:p>
@@ -5320,14 +3602,14 @@
       </p:grpSpPr>
       <p:sp>
         <p:nvSpPr>
-          <p:cNvPr id="126" name="CustomShape 1"/>
+          <p:cNvPr id="84" name="CustomShape 1"/>
           <p:cNvSpPr/>
           <p:nvPr/>
         </p:nvSpPr>
         <p:spPr>
           <a:xfrm>
             <a:off x="360000" y="360000"/>
-            <a:ext cx="9357840" cy="897840"/>
+            <a:ext cx="9356760" cy="896760"/>
           </a:xfrm>
           <a:prstGeom prst="rect">
             <a:avLst/>
@@ -5371,14 +3653,14 @@
       </p:sp>
       <p:sp>
         <p:nvSpPr>
-          <p:cNvPr id="127" name="CustomShape 2"/>
+          <p:cNvPr id="85" name="CustomShape 2"/>
           <p:cNvSpPr/>
           <p:nvPr/>
         </p:nvSpPr>
         <p:spPr>
           <a:xfrm>
             <a:off x="360000" y="1980000"/>
-            <a:ext cx="9177840" cy="4677840"/>
+            <a:ext cx="9176760" cy="4676760"/>
           </a:xfrm>
           <a:prstGeom prst="rect">
             <a:avLst/>
@@ -5396,7 +3678,7 @@
         </p:style>
         <p:txBody>
           <a:bodyPr lIns="0" rIns="0" tIns="0" bIns="0">
-            <a:normAutofit fontScale="87000"/>
+            <a:normAutofit fontScale="86000"/>
           </a:bodyPr>
           <a:p>
             <a:pPr>
@@ -5639,14 +3921,14 @@
       </p:grpSpPr>
       <p:sp>
         <p:nvSpPr>
-          <p:cNvPr id="128" name="CustomShape 1"/>
+          <p:cNvPr id="86" name="CustomShape 1"/>
           <p:cNvSpPr/>
           <p:nvPr/>
         </p:nvSpPr>
         <p:spPr>
           <a:xfrm>
             <a:off x="360000" y="360000"/>
-            <a:ext cx="9357840" cy="897840"/>
+            <a:ext cx="9356760" cy="896760"/>
           </a:xfrm>
           <a:prstGeom prst="rect">
             <a:avLst/>
@@ -5690,14 +3972,14 @@
       </p:sp>
       <p:sp>
         <p:nvSpPr>
-          <p:cNvPr id="129" name="CustomShape 2"/>
+          <p:cNvPr id="87" name="CustomShape 2"/>
           <p:cNvSpPr/>
           <p:nvPr/>
         </p:nvSpPr>
         <p:spPr>
           <a:xfrm>
             <a:off x="360000" y="1980000"/>
-            <a:ext cx="9177840" cy="4677840"/>
+            <a:ext cx="9176760" cy="4676760"/>
           </a:xfrm>
           <a:prstGeom prst="rect">
             <a:avLst/>
@@ -5826,17 +4108,7 @@
                 <a:latin typeface="Arial"/>
                 <a:ea typeface="DejaVu Sans"/>
               </a:rPr>
-              <a:t>Peuvent être communes à plusieurs acteurs ou propres à un acteur. Concernent l’administration du catalogue, l’enregistrement d’une commande ainsi que son suivi et son encaissement, la gestion des stocks, l’accès aux statistiques et aux recettes</a:t>
-            </a:r>
-            <a:r>
-              <a:rPr b="0" lang="fr-FR" sz="2050" spc="-1" strike="noStrike">
-                <a:solidFill>
-                  <a:srgbClr val="1c1c1c"/>
-                </a:solidFill>
-                <a:latin typeface="Arial"/>
-                <a:ea typeface="DejaVu Sans"/>
-              </a:rPr>
-              <a:t>.</a:t>
+              <a:t>Peuvent être propres à un ou plusieurs acteurs. Concernent l’administration du catalogue, l’enregistrement d’une commande ainsi que son suivi et son encaissement, la gestion des stocks, l’accès aux statistiques et aux recettes.</a:t>
             </a:r>
             <a:endParaRPr b="0" lang="fr-FR" sz="2050" spc="-1" strike="noStrike">
               <a:latin typeface="Arial"/>
@@ -5876,14 +4148,14 @@
       </p:grpSpPr>
       <p:sp>
         <p:nvSpPr>
-          <p:cNvPr id="130" name="CustomShape 1"/>
+          <p:cNvPr id="88" name="CustomShape 1"/>
           <p:cNvSpPr/>
           <p:nvPr/>
         </p:nvSpPr>
         <p:spPr>
           <a:xfrm>
             <a:off x="360000" y="360000"/>
-            <a:ext cx="9357840" cy="897840"/>
+            <a:ext cx="9356760" cy="896760"/>
           </a:xfrm>
           <a:prstGeom prst="rect">
             <a:avLst/>
@@ -5927,14 +4199,14 @@
       </p:sp>
       <p:sp>
         <p:nvSpPr>
-          <p:cNvPr id="131" name="CustomShape 2"/>
+          <p:cNvPr id="89" name="CustomShape 2"/>
           <p:cNvSpPr/>
           <p:nvPr/>
         </p:nvSpPr>
         <p:spPr>
           <a:xfrm>
-            <a:off x="360000" y="1980000"/>
-            <a:ext cx="9177840" cy="4677840"/>
+            <a:off x="254880" y="1728000"/>
+            <a:ext cx="9176760" cy="4895640"/>
           </a:xfrm>
           <a:prstGeom prst="rect">
             <a:avLst/>
@@ -5952,7 +4224,7 @@
         </p:style>
         <p:txBody>
           <a:bodyPr lIns="0" rIns="0" tIns="0" bIns="0">
-            <a:normAutofit/>
+            <a:normAutofit fontScale="97000"/>
           </a:bodyPr>
           <a:p>
             <a:pPr>
@@ -5982,9 +4254,6 @@
               <a:lnSpc>
                 <a:spcPct val="100000"/>
               </a:lnSpc>
-              <a:spcAft>
-                <a:spcPts val="1134"/>
-              </a:spcAft>
             </a:pPr>
             <a:r>
               <a:rPr b="0" lang="fr-FR" sz="2200" spc="-1" strike="noStrike">
@@ -6010,6 +4279,26 @@
               </a:spcAft>
             </a:pPr>
             <a:r>
+              <a:rPr b="0" i="1" lang="fr-FR" sz="1600" spc="-1" strike="noStrike">
+                <a:solidFill>
+                  <a:srgbClr val="1c1c1c"/>
+                </a:solidFill>
+                <a:latin typeface="Arial"/>
+                <a:ea typeface="DejaVu Sans"/>
+              </a:rPr>
+              <a:t>Responsable d’un point de vente, gère le fonctionnement au jour le jour</a:t>
+            </a:r>
+            <a:endParaRPr b="0" lang="fr-FR" sz="1600" spc="-1" strike="noStrike">
+              <a:latin typeface="Arial"/>
+            </a:endParaRPr>
+          </a:p>
+          <a:p>
+            <a:pPr marL="288000">
+              <a:lnSpc>
+                <a:spcPct val="100000"/>
+              </a:lnSpc>
+            </a:pPr>
+            <a:r>
               <a:rPr b="0" lang="fr-FR" sz="2200" spc="-1" strike="noStrike">
                 <a:solidFill>
                   <a:srgbClr val="1c1c1c"/>
@@ -6033,6 +4322,26 @@
               </a:spcAft>
             </a:pPr>
             <a:r>
+              <a:rPr b="0" i="1" lang="fr-FR" sz="1550" spc="-1" strike="noStrike">
+                <a:solidFill>
+                  <a:srgbClr val="1c1c1c"/>
+                </a:solidFill>
+                <a:latin typeface="Arial"/>
+                <a:ea typeface="DejaVu Sans"/>
+              </a:rPr>
+              <a:t>Prépare la commande</a:t>
+            </a:r>
+            <a:endParaRPr b="0" lang="fr-FR" sz="1550" spc="-1" strike="noStrike">
+              <a:latin typeface="Arial"/>
+            </a:endParaRPr>
+          </a:p>
+          <a:p>
+            <a:pPr marL="288000">
+              <a:lnSpc>
+                <a:spcPct val="100000"/>
+              </a:lnSpc>
+            </a:pPr>
+            <a:r>
               <a:rPr b="0" lang="fr-FR" sz="2200" spc="-1" strike="noStrike">
                 <a:solidFill>
                   <a:srgbClr val="1c1c1c"/>
@@ -6056,6 +4365,26 @@
               </a:spcAft>
             </a:pPr>
             <a:r>
+              <a:rPr b="0" i="1" lang="fr-FR" sz="1500" spc="-1" strike="noStrike">
+                <a:solidFill>
+                  <a:srgbClr val="1c1c1c"/>
+                </a:solidFill>
+                <a:latin typeface="Arial"/>
+                <a:ea typeface="DejaVu Sans"/>
+              </a:rPr>
+              <a:t>Livre la commande</a:t>
+            </a:r>
+            <a:endParaRPr b="0" lang="fr-FR" sz="1500" spc="-1" strike="noStrike">
+              <a:latin typeface="Arial"/>
+            </a:endParaRPr>
+          </a:p>
+          <a:p>
+            <a:pPr marL="288000">
+              <a:lnSpc>
+                <a:spcPct val="100000"/>
+              </a:lnSpc>
+            </a:pPr>
+            <a:r>
               <a:rPr b="0" lang="fr-FR" sz="2200" spc="-1" strike="noStrike">
                 <a:solidFill>
                   <a:srgbClr val="1c1c1c"/>
@@ -6079,6 +4408,26 @@
               </a:spcAft>
             </a:pPr>
             <a:r>
+              <a:rPr b="0" i="1" lang="fr-FR" sz="1500" spc="-1" strike="noStrike">
+                <a:solidFill>
+                  <a:srgbClr val="1c1c1c"/>
+                </a:solidFill>
+                <a:latin typeface="Arial"/>
+                <a:ea typeface="DejaVu Sans"/>
+              </a:rPr>
+              <a:t>Passe commande</a:t>
+            </a:r>
+            <a:endParaRPr b="0" lang="fr-FR" sz="1500" spc="-1" strike="noStrike">
+              <a:latin typeface="Arial"/>
+            </a:endParaRPr>
+          </a:p>
+          <a:p>
+            <a:pPr marL="288000">
+              <a:lnSpc>
+                <a:spcPct val="100000"/>
+              </a:lnSpc>
+            </a:pPr>
+            <a:r>
               <a:rPr b="0" lang="fr-FR" sz="2200" spc="-1" strike="noStrike">
                 <a:solidFill>
                   <a:srgbClr val="1c1c1c"/>
@@ -6089,6 +4438,29 @@
               <a:t>- Système bancaire</a:t>
             </a:r>
             <a:endParaRPr b="0" lang="fr-FR" sz="2200" spc="-1" strike="noStrike">
+              <a:latin typeface="Arial"/>
+            </a:endParaRPr>
+          </a:p>
+          <a:p>
+            <a:pPr marL="288000">
+              <a:lnSpc>
+                <a:spcPct val="100000"/>
+              </a:lnSpc>
+              <a:spcAft>
+                <a:spcPts val="1134"/>
+              </a:spcAft>
+            </a:pPr>
+            <a:r>
+              <a:rPr b="0" i="1" lang="fr-FR" sz="1500" spc="-1" strike="noStrike">
+                <a:solidFill>
+                  <a:srgbClr val="1c1c1c"/>
+                </a:solidFill>
+                <a:latin typeface="Arial"/>
+                <a:ea typeface="DejaVu Sans"/>
+              </a:rPr>
+              <a:t>Banque ou Paypal, effectue la transaction</a:t>
+            </a:r>
+            <a:endParaRPr b="0" lang="fr-FR" sz="1500" spc="-1" strike="noStrike">
               <a:latin typeface="Arial"/>
             </a:endParaRPr>
           </a:p>
@@ -6101,7 +4473,7 @@
                 <a:spcPts val="1142"/>
               </a:spcAft>
             </a:pPr>
-            <a:endParaRPr b="0" lang="fr-FR" sz="2200" spc="-1" strike="noStrike">
+            <a:endParaRPr b="0" lang="fr-FR" sz="1500" spc="-1" strike="noStrike">
               <a:latin typeface="Arial"/>
             </a:endParaRPr>
           </a:p>
@@ -6162,14 +4534,14 @@
       </p:grpSpPr>
       <p:sp>
         <p:nvSpPr>
-          <p:cNvPr id="132" name="CustomShape 1"/>
+          <p:cNvPr id="90" name="CustomShape 1"/>
           <p:cNvSpPr/>
           <p:nvPr/>
         </p:nvSpPr>
         <p:spPr>
           <a:xfrm>
             <a:off x="360000" y="360000"/>
-            <a:ext cx="9357840" cy="897840"/>
+            <a:ext cx="9356760" cy="896760"/>
           </a:xfrm>
           <a:prstGeom prst="rect">
             <a:avLst/>
@@ -6213,14 +4585,14 @@
       </p:sp>
       <p:sp>
         <p:nvSpPr>
-          <p:cNvPr id="133" name="CustomShape 2"/>
+          <p:cNvPr id="91" name="CustomShape 2"/>
           <p:cNvSpPr/>
           <p:nvPr/>
         </p:nvSpPr>
         <p:spPr>
           <a:xfrm>
             <a:off x="360000" y="1980000"/>
-            <a:ext cx="9177840" cy="4677840"/>
+            <a:ext cx="9176760" cy="4676760"/>
           </a:xfrm>
           <a:prstGeom prst="rect">
             <a:avLst/>
@@ -6386,14 +4758,14 @@
       </p:grpSpPr>
       <p:sp>
         <p:nvSpPr>
-          <p:cNvPr id="134" name="CustomShape 1"/>
+          <p:cNvPr id="92" name="CustomShape 1"/>
           <p:cNvSpPr/>
           <p:nvPr/>
         </p:nvSpPr>
         <p:spPr>
           <a:xfrm>
             <a:off x="360000" y="360000"/>
-            <a:ext cx="9357840" cy="897840"/>
+            <a:ext cx="9356760" cy="896760"/>
           </a:xfrm>
           <a:prstGeom prst="rect">
             <a:avLst/>
@@ -6437,14 +4809,14 @@
       </p:sp>
       <p:sp>
         <p:nvSpPr>
-          <p:cNvPr id="135" name="CustomShape 2"/>
+          <p:cNvPr id="93" name="CustomShape 2"/>
           <p:cNvSpPr/>
           <p:nvPr/>
         </p:nvSpPr>
         <p:spPr>
           <a:xfrm>
             <a:off x="360000" y="1980000"/>
-            <a:ext cx="9177840" cy="4677840"/>
+            <a:ext cx="9176760" cy="4676760"/>
           </a:xfrm>
           <a:prstGeom prst="rect">
             <a:avLst/>
@@ -6713,14 +5085,14 @@
       </p:grpSpPr>
       <p:sp>
         <p:nvSpPr>
-          <p:cNvPr id="136" name="CustomShape 1"/>
+          <p:cNvPr id="94" name="CustomShape 1"/>
           <p:cNvSpPr/>
           <p:nvPr/>
         </p:nvSpPr>
         <p:spPr>
           <a:xfrm>
             <a:off x="360000" y="360000"/>
-            <a:ext cx="9357840" cy="897840"/>
+            <a:ext cx="9356760" cy="896760"/>
           </a:xfrm>
           <a:prstGeom prst="rect">
             <a:avLst/>
@@ -6764,14 +5136,14 @@
       </p:sp>
       <p:sp>
         <p:nvSpPr>
-          <p:cNvPr id="137" name="TextShape 2"/>
-          <p:cNvSpPr txBox="1"/>
+          <p:cNvPr id="95" name="CustomShape 2"/>
+          <p:cNvSpPr/>
           <p:nvPr/>
         </p:nvSpPr>
         <p:spPr>
           <a:xfrm>
-            <a:off x="576000" y="1838520"/>
-            <a:ext cx="8712000" cy="4929480"/>
+            <a:off x="523800" y="1554480"/>
+            <a:ext cx="8710920" cy="4928400"/>
           </a:xfrm>
           <a:prstGeom prst="rect">
             <a:avLst/>
@@ -6781,12 +5153,18 @@
             <a:noFill/>
           </a:ln>
         </p:spPr>
+        <p:style>
+          <a:lnRef idx="0"/>
+          <a:fillRef idx="0"/>
+          <a:effectRef idx="0"/>
+          <a:fontRef idx="minor"/>
+        </p:style>
         <p:txBody>
           <a:bodyPr lIns="90000" rIns="90000" tIns="45000" bIns="45000">
             <a:noAutofit/>
           </a:bodyPr>
           <a:p>
-            <a:pPr marL="216000" indent="-216000">
+            <a:pPr marL="216000" indent="-214920">
               <a:lnSpc>
                 <a:spcPct val="100000"/>
               </a:lnSpc>
@@ -6808,6 +5186,7 @@
                   <a:srgbClr val="000000"/>
                 </a:solidFill>
                 <a:latin typeface="Arial"/>
+                <a:ea typeface="DejaVu Sans"/>
               </a:rPr>
               <a:t> </a:t>
             </a:r>
@@ -6817,19 +5196,16 @@
                   <a:srgbClr val="000000"/>
                 </a:solidFill>
                 <a:latin typeface="Arial"/>
+                <a:ea typeface="DejaVu Sans"/>
               </a:rPr>
               <a:t>Après réception par le restaurant choisi ou attribué, la commande est ajoutée à la liste des commandes à préparer</a:t>
             </a:r>
             <a:endParaRPr b="0" lang="fr-FR" sz="2000" spc="-1" strike="noStrike">
-              <a:solidFill>
-                <a:srgbClr val="000000"/>
-              </a:solidFill>
-              <a:latin typeface="Arial"/>
-              <a:ea typeface="Microsoft YaHei"/>
-            </a:endParaRPr>
-          </a:p>
-          <a:p>
-            <a:pPr marL="216000" indent="-216000">
+              <a:latin typeface="Arial"/>
+            </a:endParaRPr>
+          </a:p>
+          <a:p>
+            <a:pPr marL="216000" indent="-214920">
               <a:lnSpc>
                 <a:spcPct val="100000"/>
               </a:lnSpc>
@@ -6851,6 +5227,7 @@
                   <a:srgbClr val="000000"/>
                 </a:solidFill>
                 <a:latin typeface="Arial"/>
+                <a:ea typeface="DejaVu Sans"/>
               </a:rPr>
               <a:t> </a:t>
             </a:r>
@@ -6860,19 +5237,16 @@
                   <a:srgbClr val="000000"/>
                 </a:solidFill>
                 <a:latin typeface="Arial"/>
+                <a:ea typeface="DejaVu Sans"/>
               </a:rPr>
               <a:t>La commande est sélectionnée par le cuisinier, qui modifie son statut de « En attente de préparation » à  « En cours de préparation ». Désormais, le client ne peut plus modifier ou annuler sa commande.</a:t>
             </a:r>
             <a:endParaRPr b="0" lang="fr-FR" sz="2000" spc="-1" strike="noStrike">
-              <a:solidFill>
-                <a:srgbClr val="000000"/>
-              </a:solidFill>
-              <a:latin typeface="Arial"/>
-              <a:ea typeface="Microsoft YaHei"/>
-            </a:endParaRPr>
-          </a:p>
-          <a:p>
-            <a:pPr marL="216000" indent="-216000">
+              <a:latin typeface="Arial"/>
+            </a:endParaRPr>
+          </a:p>
+          <a:p>
+            <a:pPr marL="216000" indent="-214920">
               <a:lnSpc>
                 <a:spcPct val="100000"/>
               </a:lnSpc>
@@ -6894,6 +5268,7 @@
                   <a:srgbClr val="000000"/>
                 </a:solidFill>
                 <a:latin typeface="Arial"/>
+                <a:ea typeface="DejaVu Sans"/>
               </a:rPr>
               <a:t> </a:t>
             </a:r>
@@ -6903,19 +5278,16 @@
                   <a:srgbClr val="000000"/>
                 </a:solidFill>
                 <a:latin typeface="Arial"/>
+                <a:ea typeface="DejaVu Sans"/>
               </a:rPr>
               <a:t>Quand la commande est prête, il modifie son statut de « En cours de préparation » à « Prête à être livrée »</a:t>
             </a:r>
             <a:endParaRPr b="0" lang="fr-FR" sz="2000" spc="-1" strike="noStrike">
-              <a:solidFill>
-                <a:srgbClr val="000000"/>
-              </a:solidFill>
-              <a:latin typeface="Arial"/>
-              <a:ea typeface="Microsoft YaHei"/>
-            </a:endParaRPr>
-          </a:p>
-          <a:p>
-            <a:pPr marL="216000" indent="-216000">
+              <a:latin typeface="Arial"/>
+            </a:endParaRPr>
+          </a:p>
+          <a:p>
+            <a:pPr marL="216000" indent="-214920">
               <a:lnSpc>
                 <a:spcPct val="100000"/>
               </a:lnSpc>
@@ -6952,15 +5324,11 @@
               <a:t>Le livreur change le statut d’avancement « Prête à être livrée » à « En cours de livraison »</a:t>
             </a:r>
             <a:endParaRPr b="0" lang="fr-FR" sz="2000" spc="-1" strike="noStrike">
-              <a:solidFill>
-                <a:srgbClr val="000000"/>
-              </a:solidFill>
-              <a:latin typeface="Arial"/>
-              <a:ea typeface="Microsoft YaHei"/>
-            </a:endParaRPr>
-          </a:p>
-          <a:p>
-            <a:pPr marL="216000" indent="-216000">
+              <a:latin typeface="Arial"/>
+            </a:endParaRPr>
+          </a:p>
+          <a:p>
+            <a:pPr marL="216000" indent="-214920">
               <a:lnSpc>
                 <a:spcPct val="100000"/>
               </a:lnSpc>
@@ -6997,15 +5365,11 @@
               <a:t>Si la commande n’a pas le statut de paiement « Payée », le livreur encaisse la commande et met à jour le statut</a:t>
             </a:r>
             <a:endParaRPr b="0" lang="fr-FR" sz="2000" spc="-1" strike="noStrike">
-              <a:solidFill>
-                <a:srgbClr val="000000"/>
-              </a:solidFill>
-              <a:latin typeface="Arial"/>
-              <a:ea typeface="Microsoft YaHei"/>
-            </a:endParaRPr>
-          </a:p>
-          <a:p>
-            <a:pPr marL="216000" indent="-216000">
+              <a:latin typeface="Arial"/>
+            </a:endParaRPr>
+          </a:p>
+          <a:p>
+            <a:pPr marL="216000" indent="-214920">
               <a:lnSpc>
                 <a:spcPct val="100000"/>
               </a:lnSpc>
@@ -7052,15 +5416,11 @@
               <a:t> </a:t>
             </a:r>
             <a:endParaRPr b="0" lang="fr-FR" sz="2000" spc="-1" strike="noStrike">
-              <a:solidFill>
-                <a:srgbClr val="000000"/>
-              </a:solidFill>
-              <a:latin typeface="Arial"/>
-              <a:ea typeface="Microsoft YaHei"/>
-            </a:endParaRPr>
-          </a:p>
-          <a:p>
-            <a:pPr marL="216000" indent="-216000">
+              <a:latin typeface="Arial"/>
+            </a:endParaRPr>
+          </a:p>
+          <a:p>
+            <a:pPr marL="216000" indent="-214920">
               <a:lnSpc>
                 <a:spcPct val="100000"/>
               </a:lnSpc>
@@ -7084,14 +5444,20 @@
                 <a:latin typeface="Arial"/>
                 <a:ea typeface="Microsoft YaHei"/>
               </a:rPr>
+              <a:t> </a:t>
+            </a:r>
+            <a:r>
+              <a:rPr b="0" lang="fr-FR" sz="2000" spc="-1" strike="noStrike">
+                <a:solidFill>
+                  <a:srgbClr val="000000"/>
+                </a:solidFill>
+                <a:latin typeface="Arial"/>
+                <a:ea typeface="Microsoft YaHei"/>
+              </a:rPr>
               <a:t>Le client peut désormais noter le service sur le site web.</a:t>
             </a:r>
             <a:endParaRPr b="0" lang="fr-FR" sz="2000" spc="-1" strike="noStrike">
-              <a:solidFill>
-                <a:srgbClr val="000000"/>
-              </a:solidFill>
-              <a:latin typeface="Arial"/>
-              <a:ea typeface="Microsoft YaHei"/>
+              <a:latin typeface="Arial"/>
             </a:endParaRPr>
           </a:p>
         </p:txBody>
@@ -7128,14 +5494,14 @@
       </p:grpSpPr>
       <p:sp>
         <p:nvSpPr>
-          <p:cNvPr id="138" name="CustomShape 1"/>
+          <p:cNvPr id="96" name="CustomShape 1"/>
           <p:cNvSpPr/>
           <p:nvPr/>
         </p:nvSpPr>
         <p:spPr>
           <a:xfrm>
             <a:off x="360000" y="360000"/>
-            <a:ext cx="9357840" cy="897840"/>
+            <a:ext cx="9356760" cy="896760"/>
           </a:xfrm>
           <a:prstGeom prst="rect">
             <a:avLst/>
@@ -7179,14 +5545,14 @@
       </p:sp>
       <p:sp>
         <p:nvSpPr>
-          <p:cNvPr id="139" name="CustomShape 2"/>
+          <p:cNvPr id="97" name="CustomShape 2"/>
           <p:cNvSpPr/>
           <p:nvPr/>
         </p:nvSpPr>
         <p:spPr>
           <a:xfrm>
             <a:off x="360000" y="1980000"/>
-            <a:ext cx="9177840" cy="4677840"/>
+            <a:ext cx="9176760" cy="4676760"/>
           </a:xfrm>
           <a:prstGeom prst="rect">
             <a:avLst/>
@@ -7230,7 +5596,7 @@
             </a:endParaRPr>
           </a:p>
           <a:p>
-            <a:pPr marL="216000" indent="-216000">
+            <a:pPr marL="216000" indent="-214920">
               <a:lnSpc>
                 <a:spcPct val="100000"/>
               </a:lnSpc>
@@ -7240,7 +5606,7 @@
               <a:buClr>
                 <a:srgbClr val="1c1c1c"/>
               </a:buClr>
-              <a:buFont typeface="Symbol" charset="2"/>
+              <a:buFont typeface="Symbol"/>
               <a:buChar char=""/>
             </a:pPr>
             <a:r>
@@ -7268,7 +5634,7 @@
             </a:endParaRPr>
           </a:p>
           <a:p>
-            <a:pPr marL="216000" indent="-216000">
+            <a:pPr marL="216000" indent="-214920">
               <a:lnSpc>
                 <a:spcPct val="100000"/>
               </a:lnSpc>
@@ -7278,7 +5644,7 @@
               <a:buClr>
                 <a:srgbClr val="1c1c1c"/>
               </a:buClr>
-              <a:buFont typeface="Symbol" charset="2"/>
+              <a:buFont typeface="Symbol"/>
               <a:buChar char=""/>
             </a:pPr>
             <a:r>
@@ -7306,7 +5672,7 @@
             </a:endParaRPr>
           </a:p>
           <a:p>
-            <a:pPr marL="216000" indent="-216000">
+            <a:pPr marL="216000" indent="-214920">
               <a:lnSpc>
                 <a:spcPct val="100000"/>
               </a:lnSpc>
@@ -7316,7 +5682,7 @@
               <a:buClr>
                 <a:srgbClr val="1c1c1c"/>
               </a:buClr>
-              <a:buFont typeface="Symbol" charset="2"/>
+              <a:buFont typeface="Symbol"/>
               <a:buChar char=""/>
             </a:pPr>
             <a:r>
@@ -7535,17 +5901,7 @@
                 <a:latin typeface="Arial"/>
                 <a:ea typeface="DejaVu Sans"/>
               </a:rPr>
-              <a:t> : Android</a:t>
-            </a:r>
-            <a:r>
-              <a:rPr b="0" lang="fr-FR" sz="2000" spc="-1" strike="noStrike">
-                <a:solidFill>
-                  <a:srgbClr val="1c1c1c"/>
-                </a:solidFill>
-                <a:latin typeface="Arial"/>
-                <a:ea typeface="DejaVu Sans"/>
-              </a:rPr>
-              <a:t> </a:t>
+              <a:t> : Android </a:t>
             </a:r>
             <a:endParaRPr b="0" lang="fr-FR" sz="2000" spc="-1" strike="noStrike">
               <a:latin typeface="Arial"/>
@@ -8016,230 +6372,4 @@
     </a:fmtScheme>
   </a:themeElements>
 </a:theme>
-</file>
-
-<file path=ppt/theme/theme3.xml><?xml version="1.0" encoding="utf-8"?>
-<a:theme xmlns:a="http://schemas.openxmlformats.org/drawingml/2006/main" name="Office Theme">
-  <a:themeElements>
-    <a:clrScheme name="Office">
-      <a:dk1>
-        <a:sysClr val="windowText" lastClr="000000"/>
-      </a:dk1>
-      <a:lt1>
-        <a:sysClr val="window" lastClr="FFFFFF"/>
-      </a:lt1>
-      <a:dk2>
-        <a:srgbClr val="1f497d"/>
-      </a:dk2>
-      <a:lt2>
-        <a:srgbClr val="eeece1"/>
-      </a:lt2>
-      <a:accent1>
-        <a:srgbClr val="4f81bd"/>
-      </a:accent1>
-      <a:accent2>
-        <a:srgbClr val="c0504d"/>
-      </a:accent2>
-      <a:accent3>
-        <a:srgbClr val="9bbb59"/>
-      </a:accent3>
-      <a:accent4>
-        <a:srgbClr val="8064a2"/>
-      </a:accent4>
-      <a:accent5>
-        <a:srgbClr val="4bacc6"/>
-      </a:accent5>
-      <a:accent6>
-        <a:srgbClr val="f79646"/>
-      </a:accent6>
-      <a:hlink>
-        <a:srgbClr val="0000ff"/>
-      </a:hlink>
-      <a:folHlink>
-        <a:srgbClr val="800080"/>
-      </a:folHlink>
-    </a:clrScheme>
-    <a:fontScheme name="Office">
-      <a:majorFont>
-        <a:latin typeface="Arial"/>
-        <a:ea typeface="DejaVu Sans"/>
-        <a:cs typeface="DejaVu Sans"/>
-      </a:majorFont>
-      <a:minorFont>
-        <a:latin typeface="Arial"/>
-        <a:ea typeface="DejaVu Sans"/>
-        <a:cs typeface="DejaVu Sans"/>
-      </a:minorFont>
-    </a:fontScheme>
-    <a:fmtScheme name="Office">
-      <a:fillStyleLst>
-        <a:solidFill>
-          <a:schemeClr val="phClr"/>
-        </a:solidFill>
-        <a:gradFill rotWithShape="1">
-          <a:gsLst>
-            <a:gs pos="0">
-              <a:schemeClr val="phClr">
-                <a:tint val="50000"/>
-                <a:satMod val="300000"/>
-              </a:schemeClr>
-            </a:gs>
-            <a:gs pos="35000">
-              <a:schemeClr val="phClr">
-                <a:tint val="37000"/>
-                <a:satMod val="300000"/>
-              </a:schemeClr>
-            </a:gs>
-            <a:gs pos="100000">
-              <a:schemeClr val="phClr">
-                <a:tint val="15000"/>
-                <a:satMod val="350000"/>
-              </a:schemeClr>
-            </a:gs>
-          </a:gsLst>
-          <a:lin ang="16200000" scaled="1"/>
-        </a:gradFill>
-        <a:gradFill rotWithShape="1">
-          <a:gsLst>
-            <a:gs pos="0">
-              <a:schemeClr val="phClr">
-                <a:shade val="51000"/>
-                <a:satMod val="130000"/>
-              </a:schemeClr>
-            </a:gs>
-            <a:gs pos="80000">
-              <a:schemeClr val="phClr">
-                <a:shade val="93000"/>
-                <a:satMod val="130000"/>
-              </a:schemeClr>
-            </a:gs>
-            <a:gs pos="100000">
-              <a:schemeClr val="phClr">
-                <a:shade val="94000"/>
-                <a:satMod val="135000"/>
-              </a:schemeClr>
-            </a:gs>
-          </a:gsLst>
-          <a:lin ang="16200000" scaled="0"/>
-        </a:gradFill>
-      </a:fillStyleLst>
-      <a:lnStyleLst>
-        <a:ln w="9525" cap="flat" cmpd="sng" algn="ctr">
-          <a:solidFill>
-            <a:schemeClr val="phClr">
-              <a:shade val="95000"/>
-              <a:satMod val="105000"/>
-            </a:schemeClr>
-          </a:solidFill>
-          <a:prstDash val="solid"/>
-          <a:miter/>
-        </a:ln>
-        <a:ln w="25400" cap="flat" cmpd="sng" algn="ctr">
-          <a:solidFill>
-            <a:schemeClr val="phClr"/>
-          </a:solidFill>
-          <a:prstDash val="solid"/>
-          <a:miter/>
-        </a:ln>
-        <a:ln w="38100" cap="flat" cmpd="sng" algn="ctr">
-          <a:solidFill>
-            <a:schemeClr val="phClr"/>
-          </a:solidFill>
-          <a:prstDash val="solid"/>
-          <a:miter/>
-        </a:ln>
-      </a:lnStyleLst>
-      <a:effectStyleLst>
-        <a:effectStyle>
-          <a:effectLst>
-            <a:outerShdw blurRad="40000" dist="20000" dir="5400000" rotWithShape="0">
-              <a:srgbClr val="000000">
-                <a:alpha val="38000"/>
-              </a:srgbClr>
-            </a:outerShdw>
-          </a:effectLst>
-        </a:effectStyle>
-        <a:effectStyle>
-          <a:effectLst>
-            <a:outerShdw blurRad="40000" dist="23000" dir="5400000" rotWithShape="0">
-              <a:srgbClr val="000000">
-                <a:alpha val="35000"/>
-              </a:srgbClr>
-            </a:outerShdw>
-          </a:effectLst>
-        </a:effectStyle>
-        <a:effectStyle>
-          <a:effectLst>
-            <a:outerShdw blurRad="40000" dist="23000" dir="5400000" rotWithShape="0">
-              <a:srgbClr val="000000">
-                <a:alpha val="35000"/>
-              </a:srgbClr>
-            </a:outerShdw>
-          </a:effectLst>
-          <a:scene3d>
-            <a:camera prst="orthographicFront">
-              <a:rot lat="0" lon="0" rev="0"/>
-            </a:camera>
-            <a:lightRig rig="threePt" dir="t">
-              <a:rot lat="0" lon="0" rev="1200000"/>
-            </a:lightRig>
-          </a:scene3d>
-          <a:sp3d>
-            <a:bevelT w="63500" h="25400"/>
-          </a:sp3d>
-        </a:effectStyle>
-      </a:effectStyleLst>
-      <a:bgFillStyleLst>
-        <a:solidFill>
-          <a:schemeClr val="phClr"/>
-        </a:solidFill>
-        <a:gradFill rotWithShape="1">
-          <a:gsLst>
-            <a:gs pos="0">
-              <a:schemeClr val="phClr">
-                <a:tint val="40000"/>
-                <a:satMod val="350000"/>
-              </a:schemeClr>
-            </a:gs>
-            <a:gs pos="40000">
-              <a:schemeClr val="phClr">
-                <a:tint val="45000"/>
-                <a:shade val="99000"/>
-                <a:satMod val="350000"/>
-              </a:schemeClr>
-            </a:gs>
-            <a:gs pos="100000">
-              <a:schemeClr val="phClr">
-                <a:shade val="20000"/>
-                <a:satMod val="255000"/>
-              </a:schemeClr>
-            </a:gs>
-          </a:gsLst>
-          <a:path path="circle">
-            <a:fillToRect l="50000" t="-80000" r="50000" b="180000"/>
-          </a:path>
-        </a:gradFill>
-        <a:gradFill rotWithShape="1">
-          <a:gsLst>
-            <a:gs pos="0">
-              <a:schemeClr val="phClr">
-                <a:tint val="80000"/>
-                <a:satMod val="300000"/>
-              </a:schemeClr>
-            </a:gs>
-            <a:gs pos="100000">
-              <a:schemeClr val="phClr">
-                <a:shade val="30000"/>
-                <a:satMod val="200000"/>
-              </a:schemeClr>
-            </a:gs>
-          </a:gsLst>
-          <a:path path="circle">
-            <a:fillToRect l="50000" t="50000" r="50000" b="50000"/>
-          </a:path>
-        </a:gradFill>
-      </a:bgFillStyleLst>
-    </a:fmtScheme>
-  </a:themeElements>
-</a:theme>
 </file>
</xml_diff>